<commit_message>
navod: update na verzi 2.0
</commit_message>
<xml_diff>
--- a/jak zprovoznit CICD Powershell repo.pptx
+++ b/jak zprovoznit CICD Powershell repo.pptx
@@ -151,322 +151,158 @@
 <file path=ppt/changesInfos/changesInfo1.xml><?xml version="1.0" encoding="utf-8"?>
 <pc:chgInfo xmlns:a="http://schemas.openxmlformats.org/drawingml/2006/main" xmlns:r="http://schemas.openxmlformats.org/officeDocument/2006/relationships" xmlns:ac="http://schemas.microsoft.com/office/drawing/2013/main/command" xmlns:pc="http://schemas.microsoft.com/office/powerpoint/2013/main/command">
   <pc:docChgLst>
-    <pc:chgData clId="Web-{522F7EA5-CD5C-4A55-9D45-5F46260264D9}"/>
+    <pc:chgData clId="Web-{6DCBF5AE-E51D-4505-97CC-4E7605712290}"/>
     <pc:docChg chg="modSld">
-      <pc:chgData name="" userId="" providerId="" clId="Web-{522F7EA5-CD5C-4A55-9D45-5F46260264D9}" dt="2019-08-21T08:39:36.975" v="1" actId="20577"/>
+      <pc:chgData name="" userId="" providerId="" clId="Web-{6DCBF5AE-E51D-4505-97CC-4E7605712290}" dt="2019-08-21T07:24:30.770" v="75" actId="20577"/>
       <pc:docMkLst>
         <pc:docMk/>
       </pc:docMkLst>
       <pc:sldChg chg="modSp">
-        <pc:chgData name="" userId="" providerId="" clId="Web-{522F7EA5-CD5C-4A55-9D45-5F46260264D9}" dt="2019-08-21T08:39:36.975" v="1" actId="20577"/>
+        <pc:chgData name="" userId="" providerId="" clId="Web-{6DCBF5AE-E51D-4505-97CC-4E7605712290}" dt="2019-08-21T07:24:30.770" v="74" actId="20577"/>
         <pc:sldMkLst>
           <pc:docMk/>
-          <pc:sldMk cId="1475901908" sldId="312"/>
+          <pc:sldMk cId="3978066937" sldId="300"/>
         </pc:sldMkLst>
         <pc:spChg chg="mod">
-          <ac:chgData name="" userId="" providerId="" clId="Web-{522F7EA5-CD5C-4A55-9D45-5F46260264D9}" dt="2019-08-21T08:39:36.975" v="1" actId="20577"/>
+          <ac:chgData name="" userId="" providerId="" clId="Web-{6DCBF5AE-E51D-4505-97CC-4E7605712290}" dt="2019-08-21T07:24:30.770" v="74" actId="20577"/>
           <ac:spMkLst>
             <pc:docMk/>
-            <pc:sldMk cId="1475901908" sldId="312"/>
-            <ac:spMk id="2" creationId="{473337D4-861B-4891-BE23-A7699364AEA6}"/>
+            <pc:sldMk cId="3978066937" sldId="300"/>
+            <ac:spMk id="3" creationId="{728EBFD4-F2E5-4986-A25B-5DB6C2B3245C}"/>
           </ac:spMkLst>
         </pc:spChg>
       </pc:sldChg>
     </pc:docChg>
   </pc:docChgLst>
   <pc:docChgLst>
-    <pc:chgData clId="Web-{4F9B48CE-7BB1-45E9-A185-4EA699965818}"/>
+    <pc:chgData clId="Web-{9CB31BBE-7643-4598-AB74-C8DECDA9F88D}"/>
     <pc:docChg chg="modSld">
-      <pc:chgData name="" userId="" providerId="" clId="Web-{4F9B48CE-7BB1-45E9-A185-4EA699965818}" dt="2019-08-28T13:56:40.012" v="11" actId="20577"/>
+      <pc:chgData name="" userId="" providerId="" clId="Web-{9CB31BBE-7643-4598-AB74-C8DECDA9F88D}" dt="2019-08-21T14:17:25.348" v="189" actId="20577"/>
       <pc:docMkLst>
         <pc:docMk/>
       </pc:docMkLst>
       <pc:sldChg chg="modSp">
-        <pc:chgData name="" userId="" providerId="" clId="Web-{4F9B48CE-7BB1-45E9-A185-4EA699965818}" dt="2019-08-28T13:56:40.012" v="10" actId="20577"/>
+        <pc:chgData name="" userId="" providerId="" clId="Web-{9CB31BBE-7643-4598-AB74-C8DECDA9F88D}" dt="2019-08-21T13:56:41.496" v="30" actId="20577"/>
         <pc:sldMkLst>
           <pc:docMk/>
-          <pc:sldMk cId="966716395" sldId="271"/>
+          <pc:sldMk cId="3874318658" sldId="259"/>
         </pc:sldMkLst>
         <pc:spChg chg="mod">
-          <ac:chgData name="" userId="" providerId="" clId="Web-{4F9B48CE-7BB1-45E9-A185-4EA699965818}" dt="2019-08-28T13:56:40.012" v="10" actId="20577"/>
+          <ac:chgData name="" userId="" providerId="" clId="Web-{9CB31BBE-7643-4598-AB74-C8DECDA9F88D}" dt="2019-08-21T13:56:41.496" v="30" actId="20577"/>
           <ac:spMkLst>
             <pc:docMk/>
-            <pc:sldMk cId="966716395" sldId="271"/>
-            <ac:spMk id="3" creationId="{C149E1D9-0167-4CC4-A969-6A11A6A02303}"/>
+            <pc:sldMk cId="3874318658" sldId="259"/>
+            <ac:spMk id="3" creationId="{F058EF85-7A26-403D-8EC8-4D6B63992E90}"/>
+          </ac:spMkLst>
+        </pc:spChg>
+      </pc:sldChg>
+      <pc:sldChg chg="modSp">
+        <pc:chgData name="" userId="" providerId="" clId="Web-{9CB31BBE-7643-4598-AB74-C8DECDA9F88D}" dt="2019-08-21T14:10:47.528" v="137" actId="20577"/>
+        <pc:sldMkLst>
+          <pc:docMk/>
+          <pc:sldMk cId="3479937383" sldId="260"/>
+        </pc:sldMkLst>
+        <pc:spChg chg="mod">
+          <ac:chgData name="" userId="" providerId="" clId="Web-{9CB31BBE-7643-4598-AB74-C8DECDA9F88D}" dt="2019-08-21T14:10:47.528" v="137" actId="20577"/>
+          <ac:spMkLst>
+            <pc:docMk/>
+            <pc:sldMk cId="3479937383" sldId="260"/>
+            <ac:spMk id="3" creationId="{A006BD29-4002-41F9-ACEC-5CD14C05D00B}"/>
+          </ac:spMkLst>
+        </pc:spChg>
+      </pc:sldChg>
+      <pc:sldChg chg="modSp">
+        <pc:chgData name="" userId="" providerId="" clId="Web-{9CB31BBE-7643-4598-AB74-C8DECDA9F88D}" dt="2019-08-21T14:14:02.563" v="184" actId="20577"/>
+        <pc:sldMkLst>
+          <pc:docMk/>
+          <pc:sldMk cId="1378607874" sldId="261"/>
+        </pc:sldMkLst>
+        <pc:spChg chg="mod">
+          <ac:chgData name="" userId="" providerId="" clId="Web-{9CB31BBE-7643-4598-AB74-C8DECDA9F88D}" dt="2019-08-21T14:14:02.563" v="184" actId="20577"/>
+          <ac:spMkLst>
+            <pc:docMk/>
+            <pc:sldMk cId="1378607874" sldId="261"/>
+            <ac:spMk id="3" creationId="{A006BD29-4002-41F9-ACEC-5CD14C05D00B}"/>
+          </ac:spMkLst>
+        </pc:spChg>
+      </pc:sldChg>
+      <pc:sldChg chg="modSp">
+        <pc:chgData name="" userId="" providerId="" clId="Web-{9CB31BBE-7643-4598-AB74-C8DECDA9F88D}" dt="2019-08-21T14:17:25.348" v="188" actId="20577"/>
+        <pc:sldMkLst>
+          <pc:docMk/>
+          <pc:sldMk cId="96228185" sldId="262"/>
+        </pc:sldMkLst>
+        <pc:spChg chg="mod">
+          <ac:chgData name="" userId="" providerId="" clId="Web-{9CB31BBE-7643-4598-AB74-C8DECDA9F88D}" dt="2019-08-21T14:17:25.348" v="188" actId="20577"/>
+          <ac:spMkLst>
+            <pc:docMk/>
+            <pc:sldMk cId="96228185" sldId="262"/>
+            <ac:spMk id="3" creationId="{A006BD29-4002-41F9-ACEC-5CD14C05D00B}"/>
+          </ac:spMkLst>
+        </pc:spChg>
+      </pc:sldChg>
+      <pc:sldChg chg="modSp">
+        <pc:chgData name="" userId="" providerId="" clId="Web-{9CB31BBE-7643-4598-AB74-C8DECDA9F88D}" dt="2019-08-21T13:56:48.512" v="33" actId="20577"/>
+        <pc:sldMkLst>
+          <pc:docMk/>
+          <pc:sldMk cId="1885167440" sldId="289"/>
+        </pc:sldMkLst>
+        <pc:spChg chg="mod">
+          <ac:chgData name="" userId="" providerId="" clId="Web-{9CB31BBE-7643-4598-AB74-C8DECDA9F88D}" dt="2019-08-21T13:56:48.512" v="33" actId="20577"/>
+          <ac:spMkLst>
+            <pc:docMk/>
+            <pc:sldMk cId="1885167440" sldId="289"/>
+            <ac:spMk id="2" creationId="{CD55EF39-67AC-4AEB-A4F1-538265FC6DA6}"/>
+          </ac:spMkLst>
+        </pc:spChg>
+      </pc:sldChg>
+      <pc:sldChg chg="modSp">
+        <pc:chgData name="" userId="" providerId="" clId="Web-{9CB31BBE-7643-4598-AB74-C8DECDA9F88D}" dt="2019-08-21T13:56:51.606" v="34" actId="20577"/>
+        <pc:sldMkLst>
+          <pc:docMk/>
+          <pc:sldMk cId="472758218" sldId="290"/>
+        </pc:sldMkLst>
+        <pc:spChg chg="mod">
+          <ac:chgData name="" userId="" providerId="" clId="Web-{9CB31BBE-7643-4598-AB74-C8DECDA9F88D}" dt="2019-08-21T13:56:51.606" v="34" actId="20577"/>
+          <ac:spMkLst>
+            <pc:docMk/>
+            <pc:sldMk cId="472758218" sldId="290"/>
+            <ac:spMk id="2" creationId="{CD55EF39-67AC-4AEB-A4F1-538265FC6DA6}"/>
+          </ac:spMkLst>
+        </pc:spChg>
+      </pc:sldChg>
+      <pc:sldChg chg="modSp">
+        <pc:chgData name="" userId="" providerId="" clId="Web-{9CB31BBE-7643-4598-AB74-C8DECDA9F88D}" dt="2019-08-21T13:55:06.323" v="22" actId="20577"/>
+        <pc:sldMkLst>
+          <pc:docMk/>
+          <pc:sldMk cId="3978066937" sldId="300"/>
+        </pc:sldMkLst>
+        <pc:spChg chg="mod">
+          <ac:chgData name="" userId="" providerId="" clId="Web-{9CB31BBE-7643-4598-AB74-C8DECDA9F88D}" dt="2019-08-21T13:55:06.323" v="22" actId="20577"/>
+          <ac:spMkLst>
+            <pc:docMk/>
+            <pc:sldMk cId="3978066937" sldId="300"/>
+            <ac:spMk id="3" creationId="{728EBFD4-F2E5-4986-A25B-5DB6C2B3245C}"/>
           </ac:spMkLst>
         </pc:spChg>
       </pc:sldChg>
     </pc:docChg>
   </pc:docChgLst>
   <pc:docChgLst>
-    <pc:chgData clId="Web-{1F33DF1F-02C2-4CE1-9605-3D6DB7F96B98}"/>
-    <pc:docChg chg="addSld modSld sldOrd">
-      <pc:chgData name="" userId="" providerId="" clId="Web-{1F33DF1F-02C2-4CE1-9605-3D6DB7F96B98}" dt="2019-08-22T11:24:46.155" v="356" actId="1076"/>
+    <pc:chgData clId="Web-{B7B69C26-D791-464C-A38E-18237271614B}"/>
+    <pc:docChg chg="modSld">
+      <pc:chgData name="" userId="" providerId="" clId="Web-{B7B69C26-D791-464C-A38E-18237271614B}" dt="2019-08-28T12:57:40.477" v="329" actId="20577"/>
       <pc:docMkLst>
         <pc:docMk/>
       </pc:docMkLst>
       <pc:sldChg chg="modSp">
-        <pc:chgData name="" userId="" providerId="" clId="Web-{1F33DF1F-02C2-4CE1-9605-3D6DB7F96B98}" dt="2019-08-22T10:53:16.447" v="68" actId="20577"/>
-        <pc:sldMkLst>
-          <pc:docMk/>
-          <pc:sldMk cId="3234635994" sldId="266"/>
-        </pc:sldMkLst>
-        <pc:spChg chg="mod">
-          <ac:chgData name="" userId="" providerId="" clId="Web-{1F33DF1F-02C2-4CE1-9605-3D6DB7F96B98}" dt="2019-08-22T10:53:16.447" v="68" actId="20577"/>
-          <ac:spMkLst>
-            <pc:docMk/>
-            <pc:sldMk cId="3234635994" sldId="266"/>
-            <ac:spMk id="3" creationId="{62B993F5-9F21-4EFE-A5D9-D7F71AC75C49}"/>
-          </ac:spMkLst>
-        </pc:spChg>
-      </pc:sldChg>
-      <pc:sldChg chg="modSp">
-        <pc:chgData name="" userId="" providerId="" clId="Web-{1F33DF1F-02C2-4CE1-9605-3D6DB7F96B98}" dt="2019-08-22T10:45:56.223" v="52" actId="20577"/>
-        <pc:sldMkLst>
-          <pc:docMk/>
-          <pc:sldMk cId="966716395" sldId="271"/>
-        </pc:sldMkLst>
-        <pc:spChg chg="mod">
-          <ac:chgData name="" userId="" providerId="" clId="Web-{1F33DF1F-02C2-4CE1-9605-3D6DB7F96B98}" dt="2019-08-22T10:45:56.223" v="52" actId="20577"/>
-          <ac:spMkLst>
-            <pc:docMk/>
-            <pc:sldMk cId="966716395" sldId="271"/>
-            <ac:spMk id="3" creationId="{C149E1D9-0167-4CC4-A969-6A11A6A02303}"/>
-          </ac:spMkLst>
-        </pc:spChg>
-      </pc:sldChg>
-      <pc:sldChg chg="addSp delSp modSp new ord addCm delCm">
-        <pc:chgData name="" userId="" providerId="" clId="Web-{1F33DF1F-02C2-4CE1-9605-3D6DB7F96B98}" dt="2019-08-22T11:24:46.155" v="356" actId="1076"/>
-        <pc:sldMkLst>
-          <pc:docMk/>
-          <pc:sldMk cId="1838952640" sldId="316"/>
-        </pc:sldMkLst>
-        <pc:spChg chg="mod">
-          <ac:chgData name="" userId="" providerId="" clId="Web-{1F33DF1F-02C2-4CE1-9605-3D6DB7F96B98}" dt="2019-08-22T10:59:23.772" v="75" actId="20577"/>
-          <ac:spMkLst>
-            <pc:docMk/>
-            <pc:sldMk cId="1838952640" sldId="316"/>
-            <ac:spMk id="2" creationId="{9F87F0E9-B781-4373-98D4-81A9DB8E3300}"/>
-          </ac:spMkLst>
-        </pc:spChg>
-        <pc:spChg chg="del">
-          <ac:chgData name="" userId="" providerId="" clId="Web-{1F33DF1F-02C2-4CE1-9605-3D6DB7F96B98}" dt="2019-08-22T10:59:56.027" v="76"/>
-          <ac:spMkLst>
-            <pc:docMk/>
-            <pc:sldMk cId="1838952640" sldId="316"/>
-            <ac:spMk id="3" creationId="{B730D6D3-6DFD-42FA-8D34-ED853CF97753}"/>
-          </ac:spMkLst>
-        </pc:spChg>
-        <pc:spChg chg="add mod">
-          <ac:chgData name="" userId="" providerId="" clId="Web-{1F33DF1F-02C2-4CE1-9605-3D6DB7F96B98}" dt="2019-08-22T11:24:09.123" v="352" actId="1076"/>
-          <ac:spMkLst>
-            <pc:docMk/>
-            <pc:sldMk cId="1838952640" sldId="316"/>
-            <ac:spMk id="12" creationId="{7833296D-7095-44D3-933F-2E57FF032AA2}"/>
-          </ac:spMkLst>
-        </pc:spChg>
-        <pc:spChg chg="add mod">
-          <ac:chgData name="" userId="" providerId="" clId="Web-{1F33DF1F-02C2-4CE1-9605-3D6DB7F96B98}" dt="2019-08-22T11:24:29.561" v="354" actId="1076"/>
-          <ac:spMkLst>
-            <pc:docMk/>
-            <pc:sldMk cId="1838952640" sldId="316"/>
-            <ac:spMk id="13" creationId="{FD0A13B8-520C-4B82-BA74-20CB66405A76}"/>
-          </ac:spMkLst>
-        </pc:spChg>
-        <pc:spChg chg="add mod">
-          <ac:chgData name="" userId="" providerId="" clId="Web-{1F33DF1F-02C2-4CE1-9605-3D6DB7F96B98}" dt="2019-08-22T11:24:37.842" v="355" actId="1076"/>
-          <ac:spMkLst>
-            <pc:docMk/>
-            <pc:sldMk cId="1838952640" sldId="316"/>
-            <ac:spMk id="18" creationId="{13D850EF-90BA-4024-B9FE-EB1EA3DD5BF1}"/>
-          </ac:spMkLst>
-        </pc:spChg>
-        <pc:spChg chg="add mod">
-          <ac:chgData name="" userId="" providerId="" clId="Web-{1F33DF1F-02C2-4CE1-9605-3D6DB7F96B98}" dt="2019-08-22T11:24:46.155" v="356" actId="1076"/>
-          <ac:spMkLst>
-            <pc:docMk/>
-            <pc:sldMk cId="1838952640" sldId="316"/>
-            <ac:spMk id="19" creationId="{D194AF9F-B19C-42F8-BE64-53E45E39A082}"/>
-          </ac:spMkLst>
-        </pc:spChg>
-        <pc:spChg chg="add mod">
-          <ac:chgData name="" userId="" providerId="" clId="Web-{1F33DF1F-02C2-4CE1-9605-3D6DB7F96B98}" dt="2019-08-22T11:20:36.167" v="314" actId="1076"/>
-          <ac:spMkLst>
-            <pc:docMk/>
-            <pc:sldMk cId="1838952640" sldId="316"/>
-            <ac:spMk id="20" creationId="{225A791F-7354-4FDF-B68F-EA473114B50E}"/>
-          </ac:spMkLst>
-        </pc:spChg>
-        <pc:spChg chg="add mod">
-          <ac:chgData name="" userId="" providerId="" clId="Web-{1F33DF1F-02C2-4CE1-9605-3D6DB7F96B98}" dt="2019-08-22T11:23:40.967" v="339" actId="1076"/>
-          <ac:spMkLst>
-            <pc:docMk/>
-            <pc:sldMk cId="1838952640" sldId="316"/>
-            <ac:spMk id="21" creationId="{F15BE417-642B-4BD3-9932-77DE9FEB6A07}"/>
-          </ac:spMkLst>
-        </pc:spChg>
-        <pc:spChg chg="add mod">
-          <ac:chgData name="" userId="" providerId="" clId="Web-{1F33DF1F-02C2-4CE1-9605-3D6DB7F96B98}" dt="2019-08-22T11:20:27.324" v="305" actId="1076"/>
-          <ac:spMkLst>
-            <pc:docMk/>
-            <pc:sldMk cId="1838952640" sldId="316"/>
-            <ac:spMk id="24" creationId="{4298D746-95F7-40F0-A866-F217C5B21772}"/>
-          </ac:spMkLst>
-        </pc:spChg>
-        <pc:spChg chg="add mod ord">
-          <ac:chgData name="" userId="" providerId="" clId="Web-{1F33DF1F-02C2-4CE1-9605-3D6DB7F96B98}" dt="2019-08-22T11:20:27.308" v="303" actId="1076"/>
-          <ac:spMkLst>
-            <pc:docMk/>
-            <pc:sldMk cId="1838952640" sldId="316"/>
-            <ac:spMk id="25" creationId="{8F4C63AA-0A29-4F7A-96D2-1231B676AFE2}"/>
-          </ac:spMkLst>
-        </pc:spChg>
-        <pc:spChg chg="add del mod">
-          <ac:chgData name="" userId="" providerId="" clId="Web-{1F33DF1F-02C2-4CE1-9605-3D6DB7F96B98}" dt="2019-08-22T11:23:32.873" v="338"/>
-          <ac:spMkLst>
-            <pc:docMk/>
-            <pc:sldMk cId="1838952640" sldId="316"/>
-            <ac:spMk id="31" creationId="{F9320373-FD54-44EA-B12B-2262FAF76ABF}"/>
-          </ac:spMkLst>
-        </pc:spChg>
-        <pc:graphicFrameChg chg="add del modGraphic">
-          <ac:chgData name="" userId="" providerId="" clId="Web-{1F33DF1F-02C2-4CE1-9605-3D6DB7F96B98}" dt="2019-08-22T11:03:35.472" v="126"/>
-          <ac:graphicFrameMkLst>
-            <pc:docMk/>
-            <pc:sldMk cId="1838952640" sldId="316"/>
-            <ac:graphicFrameMk id="14" creationId="{F9FF5AC7-14A4-4B98-85C3-2A3636873CC8}"/>
-          </ac:graphicFrameMkLst>
-        </pc:graphicFrameChg>
-        <pc:picChg chg="add mod ord">
-          <ac:chgData name="" userId="" providerId="" clId="Web-{1F33DF1F-02C2-4CE1-9605-3D6DB7F96B98}" dt="2019-08-22T11:20:36.089" v="306" actId="1076"/>
-          <ac:picMkLst>
-            <pc:docMk/>
-            <pc:sldMk cId="1838952640" sldId="316"/>
-            <ac:picMk id="5" creationId="{88400B42-C49B-4719-92CB-A66B6368B815}"/>
-          </ac:picMkLst>
-        </pc:picChg>
-        <pc:picChg chg="add mod">
-          <ac:chgData name="" userId="" providerId="" clId="Web-{1F33DF1F-02C2-4CE1-9605-3D6DB7F96B98}" dt="2019-08-22T11:20:36.105" v="307" actId="1076"/>
-          <ac:picMkLst>
-            <pc:docMk/>
-            <pc:sldMk cId="1838952640" sldId="316"/>
-            <ac:picMk id="8" creationId="{DAD79ACD-8CC1-4512-84CA-A0CEF50D6A16}"/>
-          </ac:picMkLst>
-        </pc:picChg>
-        <pc:picChg chg="add mod">
-          <ac:chgData name="" userId="" providerId="" clId="Web-{1F33DF1F-02C2-4CE1-9605-3D6DB7F96B98}" dt="2019-08-22T11:20:36.121" v="308" actId="1076"/>
-          <ac:picMkLst>
-            <pc:docMk/>
-            <pc:sldMk cId="1838952640" sldId="316"/>
-            <ac:picMk id="10" creationId="{E07B398C-FBAE-476D-9518-410DE04C5A6C}"/>
-          </ac:picMkLst>
-        </pc:picChg>
-        <pc:picChg chg="add mod">
-          <ac:chgData name="" userId="" providerId="" clId="Web-{1F33DF1F-02C2-4CE1-9605-3D6DB7F96B98}" dt="2019-08-22T11:20:36.121" v="309" actId="1076"/>
-          <ac:picMkLst>
-            <pc:docMk/>
-            <pc:sldMk cId="1838952640" sldId="316"/>
-            <ac:picMk id="11" creationId="{CD981891-6F07-4B0B-BBFD-9020869EB112}"/>
-          </ac:picMkLst>
-        </pc:picChg>
-        <pc:picChg chg="add del">
-          <ac:chgData name="" userId="" providerId="" clId="Web-{1F33DF1F-02C2-4CE1-9605-3D6DB7F96B98}" dt="2019-08-22T11:03:37.925" v="127"/>
-          <ac:picMkLst>
-            <pc:docMk/>
-            <pc:sldMk cId="1838952640" sldId="316"/>
-            <ac:picMk id="17" creationId="{7F322FB4-A9B4-458B-B1F6-8D19A8485443}"/>
-          </ac:picMkLst>
-        </pc:picChg>
-        <pc:picChg chg="add mod">
-          <ac:chgData name="" userId="" providerId="" clId="Web-{1F33DF1F-02C2-4CE1-9605-3D6DB7F96B98}" dt="2019-08-22T11:20:27.308" v="304" actId="1076"/>
-          <ac:picMkLst>
-            <pc:docMk/>
-            <pc:sldMk cId="1838952640" sldId="316"/>
-            <ac:picMk id="22" creationId="{13CF3A24-4034-4B4C-ADC8-A17711649278}"/>
-          </ac:picMkLst>
-        </pc:picChg>
-        <pc:cxnChg chg="add del mod">
-          <ac:chgData name="" userId="" providerId="" clId="Web-{1F33DF1F-02C2-4CE1-9605-3D6DB7F96B98}" dt="2019-08-22T11:19:43.136" v="299"/>
-          <ac:cxnSpMkLst>
-            <pc:docMk/>
-            <pc:sldMk cId="1838952640" sldId="316"/>
-            <ac:cxnSpMk id="26" creationId="{F76A074C-13F3-4CEB-A641-92AB1E505739}"/>
-          </ac:cxnSpMkLst>
-        </pc:cxnChg>
-        <pc:cxnChg chg="add del mod">
-          <ac:chgData name="" userId="" providerId="" clId="Web-{1F33DF1F-02C2-4CE1-9605-3D6DB7F96B98}" dt="2019-08-22T11:19:33.432" v="297"/>
-          <ac:cxnSpMkLst>
-            <pc:docMk/>
-            <pc:sldMk cId="1838952640" sldId="316"/>
-            <ac:cxnSpMk id="27" creationId="{8A5A7A6B-397C-4F4F-BA6E-AA9A7BC9A7ED}"/>
-          </ac:cxnSpMkLst>
-        </pc:cxnChg>
-        <pc:cxnChg chg="add mod">
-          <ac:chgData name="" userId="" providerId="" clId="Web-{1F33DF1F-02C2-4CE1-9605-3D6DB7F96B98}" dt="2019-08-22T11:21:52.013" v="323"/>
-          <ac:cxnSpMkLst>
-            <pc:docMk/>
-            <pc:sldMk cId="1838952640" sldId="316"/>
-            <ac:cxnSpMk id="28" creationId="{5D7B2E40-83A0-4D47-BD36-0F3F36C4FA73}"/>
-          </ac:cxnSpMkLst>
-        </pc:cxnChg>
-        <pc:cxnChg chg="add mod">
-          <ac:chgData name="" userId="" providerId="" clId="Web-{1F33DF1F-02C2-4CE1-9605-3D6DB7F96B98}" dt="2019-08-22T11:22:21.263" v="328"/>
-          <ac:cxnSpMkLst>
-            <pc:docMk/>
-            <pc:sldMk cId="1838952640" sldId="316"/>
-            <ac:cxnSpMk id="29" creationId="{9BB9F841-893B-43C4-B234-43599B65C2DF}"/>
-          </ac:cxnSpMkLst>
-        </pc:cxnChg>
-        <pc:cxnChg chg="add mod">
-          <ac:chgData name="" userId="" providerId="" clId="Web-{1F33DF1F-02C2-4CE1-9605-3D6DB7F96B98}" dt="2019-08-22T11:22:40.544" v="331" actId="14100"/>
-          <ac:cxnSpMkLst>
-            <pc:docMk/>
-            <pc:sldMk cId="1838952640" sldId="316"/>
-            <ac:cxnSpMk id="30" creationId="{6A65F830-058A-41CE-BFCB-3C20C0779BE3}"/>
-          </ac:cxnSpMkLst>
-        </pc:cxnChg>
-      </pc:sldChg>
-    </pc:docChg>
-  </pc:docChgLst>
-  <pc:docChgLst>
-    <pc:chgData clId="Web-{3ED89547-50A4-4C8E-8526-F4B6D350C843}"/>
-    <pc:docChg chg="modSld">
-      <pc:chgData name="" userId="" providerId="" clId="Web-{3ED89547-50A4-4C8E-8526-F4B6D350C843}" dt="2019-08-21T14:18:56.600" v="15" actId="20577"/>
-      <pc:docMkLst>
-        <pc:docMk/>
-      </pc:docMkLst>
-      <pc:sldChg chg="modSp">
-        <pc:chgData name="" userId="" providerId="" clId="Web-{3ED89547-50A4-4C8E-8526-F4B6D350C843}" dt="2019-08-21T14:18:56.600" v="14" actId="20577"/>
-        <pc:sldMkLst>
-          <pc:docMk/>
-          <pc:sldMk cId="96228185" sldId="262"/>
-        </pc:sldMkLst>
-        <pc:spChg chg="mod">
-          <ac:chgData name="" userId="" providerId="" clId="Web-{3ED89547-50A4-4C8E-8526-F4B6D350C843}" dt="2019-08-21T14:18:56.600" v="14" actId="20577"/>
-          <ac:spMkLst>
-            <pc:docMk/>
-            <pc:sldMk cId="96228185" sldId="262"/>
-            <ac:spMk id="3" creationId="{A006BD29-4002-41F9-ACEC-5CD14C05D00B}"/>
-          </ac:spMkLst>
-        </pc:spChg>
-      </pc:sldChg>
-    </pc:docChg>
-  </pc:docChgLst>
-  <pc:docChgLst>
-    <pc:chgData clId="Web-{27517764-4E0F-456B-99BC-B77E11D93B28}"/>
-    <pc:docChg chg="delSld modSld">
-      <pc:chgData name="" userId="" providerId="" clId="Web-{27517764-4E0F-456B-99BC-B77E11D93B28}" dt="2019-08-26T12:12:49.054" v="587" actId="20577"/>
-      <pc:docMkLst>
-        <pc:docMk/>
-      </pc:docMkLst>
-      <pc:sldChg chg="modSp">
-        <pc:chgData name="" userId="" providerId="" clId="Web-{27517764-4E0F-456B-99BC-B77E11D93B28}" dt="2019-08-26T10:55:44.125" v="76" actId="20577"/>
+        <pc:chgData name="" userId="" providerId="" clId="Web-{B7B69C26-D791-464C-A38E-18237271614B}" dt="2019-08-28T12:57:29.883" v="322" actId="20577"/>
         <pc:sldMkLst>
           <pc:docMk/>
           <pc:sldMk cId="3874318658" sldId="259"/>
         </pc:sldMkLst>
         <pc:spChg chg="mod">
-          <ac:chgData name="" userId="" providerId="" clId="Web-{27517764-4E0F-456B-99BC-B77E11D93B28}" dt="2019-08-26T10:55:44.125" v="76" actId="20577"/>
+          <ac:chgData name="" userId="" providerId="" clId="Web-{B7B69C26-D791-464C-A38E-18237271614B}" dt="2019-08-28T12:57:29.883" v="322" actId="20577"/>
           <ac:spMkLst>
             <pc:docMk/>
             <pc:sldMk cId="3874318658" sldId="259"/>
@@ -475,141 +311,58 @@
         </pc:spChg>
       </pc:sldChg>
       <pc:sldChg chg="modSp">
-        <pc:chgData name="" userId="" providerId="" clId="Web-{27517764-4E0F-456B-99BC-B77E11D93B28}" dt="2019-08-26T11:38:09.050" v="471" actId="20577"/>
+        <pc:chgData name="" userId="" providerId="" clId="Web-{B7B69C26-D791-464C-A38E-18237271614B}" dt="2019-08-28T12:57:40.477" v="328" actId="20577"/>
         <pc:sldMkLst>
           <pc:docMk/>
-          <pc:sldMk cId="1378607874" sldId="261"/>
+          <pc:sldMk cId="3479937383" sldId="260"/>
         </pc:sldMkLst>
         <pc:spChg chg="mod">
-          <ac:chgData name="" userId="" providerId="" clId="Web-{27517764-4E0F-456B-99BC-B77E11D93B28}" dt="2019-08-26T11:38:09.050" v="471" actId="20577"/>
+          <ac:chgData name="" userId="" providerId="" clId="Web-{B7B69C26-D791-464C-A38E-18237271614B}" dt="2019-08-28T12:57:40.477" v="328" actId="20577"/>
           <ac:spMkLst>
             <pc:docMk/>
-            <pc:sldMk cId="1378607874" sldId="261"/>
+            <pc:sldMk cId="3479937383" sldId="260"/>
             <ac:spMk id="3" creationId="{A006BD29-4002-41F9-ACEC-5CD14C05D00B}"/>
           </ac:spMkLst>
         </pc:spChg>
       </pc:sldChg>
-      <pc:sldChg chg="modSp modNotes">
-        <pc:chgData name="" userId="" providerId="" clId="Web-{27517764-4E0F-456B-99BC-B77E11D93B28}" dt="2019-08-26T11:46:38.285" v="537" actId="20577"/>
+      <pc:sldChg chg="modSp">
+        <pc:chgData name="" userId="" providerId="" clId="Web-{B7B69C26-D791-464C-A38E-18237271614B}" dt="2019-08-28T12:48:46.662" v="224" actId="20577"/>
         <pc:sldMkLst>
           <pc:docMk/>
-          <pc:sldMk cId="96228185" sldId="262"/>
+          <pc:sldMk cId="399787957" sldId="293"/>
         </pc:sldMkLst>
         <pc:spChg chg="mod">
-          <ac:chgData name="" userId="" providerId="" clId="Web-{27517764-4E0F-456B-99BC-B77E11D93B28}" dt="2019-08-26T11:46:38.285" v="537" actId="20577"/>
+          <ac:chgData name="" userId="" providerId="" clId="Web-{B7B69C26-D791-464C-A38E-18237271614B}" dt="2019-08-28T12:48:46.662" v="224" actId="20577"/>
           <ac:spMkLst>
             <pc:docMk/>
-            <pc:sldMk cId="96228185" sldId="262"/>
-            <ac:spMk id="3" creationId="{A006BD29-4002-41F9-ACEC-5CD14C05D00B}"/>
-          </ac:spMkLst>
-        </pc:spChg>
-      </pc:sldChg>
-      <pc:sldChg chg="del">
-        <pc:chgData name="" userId="" providerId="" clId="Web-{27517764-4E0F-456B-99BC-B77E11D93B28}" dt="2019-08-26T11:48:23.491" v="541"/>
-        <pc:sldMkLst>
-          <pc:docMk/>
-          <pc:sldMk cId="27007685" sldId="263"/>
-        </pc:sldMkLst>
-      </pc:sldChg>
-      <pc:sldChg chg="del">
-        <pc:chgData name="" userId="" providerId="" clId="Web-{27517764-4E0F-456B-99BC-B77E11D93B28}" dt="2019-08-26T11:48:31.054" v="542"/>
-        <pc:sldMkLst>
-          <pc:docMk/>
-          <pc:sldMk cId="1835465480" sldId="264"/>
-        </pc:sldMkLst>
-      </pc:sldChg>
-      <pc:sldChg chg="modSp">
-        <pc:chgData name="" userId="" providerId="" clId="Web-{27517764-4E0F-456B-99BC-B77E11D93B28}" dt="2019-08-26T11:50:21.573" v="547" actId="20577"/>
-        <pc:sldMkLst>
-          <pc:docMk/>
-          <pc:sldMk cId="3234635994" sldId="266"/>
-        </pc:sldMkLst>
-        <pc:spChg chg="mod">
-          <ac:chgData name="" userId="" providerId="" clId="Web-{27517764-4E0F-456B-99BC-B77E11D93B28}" dt="2019-08-26T11:50:21.573" v="547" actId="20577"/>
-          <ac:spMkLst>
-            <pc:docMk/>
-            <pc:sldMk cId="3234635994" sldId="266"/>
-            <ac:spMk id="3" creationId="{62B993F5-9F21-4EFE-A5D9-D7F71AC75C49}"/>
+            <pc:sldMk cId="399787957" sldId="293"/>
+            <ac:spMk id="3" creationId="{48CD3CA2-4BA5-4026-972D-FC907156D6F4}"/>
           </ac:spMkLst>
         </pc:spChg>
       </pc:sldChg>
       <pc:sldChg chg="modSp">
-        <pc:chgData name="" userId="" providerId="" clId="Web-{27517764-4E0F-456B-99BC-B77E11D93B28}" dt="2019-08-26T12:12:49.054" v="586" actId="20577"/>
+        <pc:chgData name="" userId="" providerId="" clId="Web-{B7B69C26-D791-464C-A38E-18237271614B}" dt="2019-08-28T12:56:29.710" v="298" actId="20577"/>
         <pc:sldMkLst>
           <pc:docMk/>
-          <pc:sldMk cId="3604236605" sldId="267"/>
+          <pc:sldMk cId="1503452516" sldId="295"/>
         </pc:sldMkLst>
         <pc:spChg chg="mod">
-          <ac:chgData name="" userId="" providerId="" clId="Web-{27517764-4E0F-456B-99BC-B77E11D93B28}" dt="2019-08-26T12:12:49.054" v="586" actId="20577"/>
+          <ac:chgData name="" userId="" providerId="" clId="Web-{B7B69C26-D791-464C-A38E-18237271614B}" dt="2019-08-28T12:56:29.710" v="298" actId="20577"/>
           <ac:spMkLst>
             <pc:docMk/>
-            <pc:sldMk cId="3604236605" sldId="267"/>
-            <ac:spMk id="3" creationId="{4FE75E9A-5E07-4169-9BC9-B185E9E6E95E}"/>
+            <pc:sldMk cId="1503452516" sldId="295"/>
+            <ac:spMk id="3" creationId="{48CD3CA2-4BA5-4026-972D-FC907156D6F4}"/>
           </ac:spMkLst>
         </pc:spChg>
       </pc:sldChg>
       <pc:sldChg chg="modSp">
-        <pc:chgData name="" userId="" providerId="" clId="Web-{27517764-4E0F-456B-99BC-B77E11D93B28}" dt="2019-08-26T11:42:06.823" v="504" actId="20577"/>
-        <pc:sldMkLst>
-          <pc:docMk/>
-          <pc:sldMk cId="3108778045" sldId="317"/>
-        </pc:sldMkLst>
-        <pc:spChg chg="mod">
-          <ac:chgData name="" userId="" providerId="" clId="Web-{27517764-4E0F-456B-99BC-B77E11D93B28}" dt="2019-08-26T11:41:52.385" v="477" actId="20577"/>
-          <ac:spMkLst>
-            <pc:docMk/>
-            <pc:sldMk cId="3108778045" sldId="317"/>
-            <ac:spMk id="2" creationId="{D400E92E-E8F0-4A4C-B44D-033F1C5755C4}"/>
-          </ac:spMkLst>
-        </pc:spChg>
-        <pc:spChg chg="mod">
-          <ac:chgData name="" userId="" providerId="" clId="Web-{27517764-4E0F-456B-99BC-B77E11D93B28}" dt="2019-08-26T11:42:06.823" v="504" actId="20577"/>
-          <ac:spMkLst>
-            <pc:docMk/>
-            <pc:sldMk cId="3108778045" sldId="317"/>
-            <ac:spMk id="3" creationId="{A006BD29-4002-41F9-ACEC-5CD14C05D00B}"/>
-          </ac:spMkLst>
-        </pc:spChg>
-      </pc:sldChg>
-      <pc:sldChg chg="del">
-        <pc:chgData name="" userId="" providerId="" clId="Web-{27517764-4E0F-456B-99BC-B77E11D93B28}" dt="2019-08-26T11:48:16.194" v="540"/>
-        <pc:sldMkLst>
-          <pc:docMk/>
-          <pc:sldMk cId="190952704" sldId="318"/>
-        </pc:sldMkLst>
-      </pc:sldChg>
-    </pc:docChg>
-  </pc:docChgLst>
-  <pc:docChgLst>
-    <pc:chgData clId="Web-{610F10D9-7FD5-42A5-AABE-0DAB8F93D491}"/>
-    <pc:docChg chg="addSld modSld">
-      <pc:chgData name="" userId="" providerId="" clId="Web-{610F10D9-7FD5-42A5-AABE-0DAB8F93D491}" dt="2019-08-27T12:20:50.550" v="35" actId="20577"/>
-      <pc:docMkLst>
-        <pc:docMk/>
-      </pc:docMkLst>
-      <pc:sldChg chg="modSp">
-        <pc:chgData name="" userId="" providerId="" clId="Web-{610F10D9-7FD5-42A5-AABE-0DAB8F93D491}" dt="2019-08-27T12:18:13.219" v="10" actId="20577"/>
-        <pc:sldMkLst>
-          <pc:docMk/>
-          <pc:sldMk cId="3978066937" sldId="300"/>
-        </pc:sldMkLst>
-        <pc:spChg chg="mod">
-          <ac:chgData name="" userId="" providerId="" clId="Web-{610F10D9-7FD5-42A5-AABE-0DAB8F93D491}" dt="2019-08-27T12:18:13.219" v="10" actId="20577"/>
-          <ac:spMkLst>
-            <pc:docMk/>
-            <pc:sldMk cId="3978066937" sldId="300"/>
-            <ac:spMk id="3" creationId="{728EBFD4-F2E5-4986-A25B-5DB6C2B3245C}"/>
-          </ac:spMkLst>
-        </pc:spChg>
-      </pc:sldChg>
-      <pc:sldChg chg="modSp">
-        <pc:chgData name="" userId="" providerId="" clId="Web-{610F10D9-7FD5-42A5-AABE-0DAB8F93D491}" dt="2019-08-27T12:15:17.137" v="2" actId="20577"/>
+        <pc:chgData name="" userId="" providerId="" clId="Web-{B7B69C26-D791-464C-A38E-18237271614B}" dt="2019-08-28T12:46:37.635" v="220" actId="20577"/>
         <pc:sldMkLst>
           <pc:docMk/>
           <pc:sldMk cId="1373132171" sldId="310"/>
         </pc:sldMkLst>
         <pc:spChg chg="mod">
-          <ac:chgData name="" userId="" providerId="" clId="Web-{610F10D9-7FD5-42A5-AABE-0DAB8F93D491}" dt="2019-08-27T12:15:17.137" v="2" actId="20577"/>
+          <ac:chgData name="" userId="" providerId="" clId="Web-{B7B69C26-D791-464C-A38E-18237271614B}" dt="2019-08-28T12:46:37.635" v="220" actId="20577"/>
           <ac:spMkLst>
             <pc:docMk/>
             <pc:sldMk cId="1373132171" sldId="310"/>
@@ -617,245 +370,17 @@
           </ac:spMkLst>
         </pc:spChg>
       </pc:sldChg>
-      <pc:sldChg chg="addSp delSp modSp new mod modClrScheme chgLayout">
-        <pc:chgData name="" userId="" providerId="" clId="Web-{610F10D9-7FD5-42A5-AABE-0DAB8F93D491}" dt="2019-08-27T12:20:50.550" v="35" actId="20577"/>
+      <pc:sldChg chg="modSp">
+        <pc:chgData name="" userId="" providerId="" clId="Web-{B7B69C26-D791-464C-A38E-18237271614B}" dt="2019-08-28T12:54:08.037" v="254" actId="20577"/>
         <pc:sldMkLst>
           <pc:docMk/>
-          <pc:sldMk cId="3229540130" sldId="320"/>
-        </pc:sldMkLst>
-        <pc:spChg chg="mod ord">
-          <ac:chgData name="" userId="" providerId="" clId="Web-{610F10D9-7FD5-42A5-AABE-0DAB8F93D491}" dt="2019-08-27T12:20:50.550" v="35" actId="20577"/>
-          <ac:spMkLst>
-            <pc:docMk/>
-            <pc:sldMk cId="3229540130" sldId="320"/>
-            <ac:spMk id="2" creationId="{81EBA805-9FDF-4DF4-8D61-0E6E5F7C7E13}"/>
-          </ac:spMkLst>
-        </pc:spChg>
-        <pc:spChg chg="del mod ord">
-          <ac:chgData name="" userId="" providerId="" clId="Web-{610F10D9-7FD5-42A5-AABE-0DAB8F93D491}" dt="2019-08-27T12:19:07.001" v="27"/>
-          <ac:spMkLst>
-            <pc:docMk/>
-            <pc:sldMk cId="3229540130" sldId="320"/>
-            <ac:spMk id="3" creationId="{E8782563-C20C-46DC-A2B6-2B556489CB9C}"/>
-          </ac:spMkLst>
-        </pc:spChg>
-        <pc:spChg chg="del">
-          <ac:chgData name="" userId="" providerId="" clId="Web-{610F10D9-7FD5-42A5-AABE-0DAB8F93D491}" dt="2019-08-27T12:18:33.688" v="13"/>
-          <ac:spMkLst>
-            <pc:docMk/>
-            <pc:sldMk cId="3229540130" sldId="320"/>
-            <ac:spMk id="4" creationId="{A176ABB5-2394-45D4-A317-9EADFA142DD3}"/>
-          </ac:spMkLst>
-        </pc:spChg>
-        <pc:spChg chg="add del mod ord">
-          <ac:chgData name="" userId="" providerId="" clId="Web-{610F10D9-7FD5-42A5-AABE-0DAB8F93D491}" dt="2019-08-27T12:18:56.188" v="14"/>
-          <ac:spMkLst>
-            <pc:docMk/>
-            <pc:sldMk cId="3229540130" sldId="320"/>
-            <ac:spMk id="5" creationId="{C58EF393-BF56-4EA7-8AA6-8217A27B4243}"/>
-          </ac:spMkLst>
-        </pc:spChg>
-      </pc:sldChg>
-    </pc:docChg>
-  </pc:docChgLst>
-  <pc:docChgLst>
-    <pc:chgData clId="Web-{6CA45141-8142-4C89-ABF2-B7A7F0B41786}"/>
-    <pc:docChg chg="addSld modSld">
-      <pc:chgData name="" userId="" providerId="" clId="Web-{6CA45141-8142-4C89-ABF2-B7A7F0B41786}" dt="2019-08-16T07:00:59.829" v="362" actId="20577"/>
-      <pc:docMkLst>
-        <pc:docMk/>
-      </pc:docMkLst>
-      <pc:sldChg chg="modSp">
-        <pc:chgData name="" userId="" providerId="" clId="Web-{6CA45141-8142-4C89-ABF2-B7A7F0B41786}" dt="2019-08-16T07:00:59.829" v="361" actId="20577"/>
-        <pc:sldMkLst>
-          <pc:docMk/>
-          <pc:sldMk cId="2474134289" sldId="292"/>
+          <pc:sldMk cId="1549772417" sldId="311"/>
         </pc:sldMkLst>
         <pc:spChg chg="mod">
-          <ac:chgData name="" userId="" providerId="" clId="Web-{6CA45141-8142-4C89-ABF2-B7A7F0B41786}" dt="2019-08-16T07:00:59.829" v="361" actId="20577"/>
+          <ac:chgData name="" userId="" providerId="" clId="Web-{B7B69C26-D791-464C-A38E-18237271614B}" dt="2019-08-28T12:54:08.037" v="254" actId="20577"/>
           <ac:spMkLst>
             <pc:docMk/>
-            <pc:sldMk cId="2474134289" sldId="292"/>
-            <ac:spMk id="3" creationId="{48CD3CA2-4BA5-4026-972D-FC907156D6F4}"/>
-          </ac:spMkLst>
-        </pc:spChg>
-      </pc:sldChg>
-      <pc:sldChg chg="modSp">
-        <pc:chgData name="" userId="" providerId="" clId="Web-{6CA45141-8142-4C89-ABF2-B7A7F0B41786}" dt="2019-08-16T06:48:26.877" v="20" actId="20577"/>
-        <pc:sldMkLst>
-          <pc:docMk/>
-          <pc:sldMk cId="399787957" sldId="293"/>
-        </pc:sldMkLst>
-        <pc:spChg chg="mod">
-          <ac:chgData name="" userId="" providerId="" clId="Web-{6CA45141-8142-4C89-ABF2-B7A7F0B41786}" dt="2019-08-16T06:48:26.877" v="20" actId="20577"/>
-          <ac:spMkLst>
-            <pc:docMk/>
-            <pc:sldMk cId="399787957" sldId="293"/>
-            <ac:spMk id="3" creationId="{48CD3CA2-4BA5-4026-972D-FC907156D6F4}"/>
-          </ac:spMkLst>
-        </pc:spChg>
-      </pc:sldChg>
-      <pc:sldChg chg="modSp add replId">
-        <pc:chgData name="" userId="" providerId="" clId="Web-{6CA45141-8142-4C89-ABF2-B7A7F0B41786}" dt="2019-08-16T07:00:34.360" v="329" actId="20577"/>
-        <pc:sldMkLst>
-          <pc:docMk/>
-          <pc:sldMk cId="3749470640" sldId="309"/>
-        </pc:sldMkLst>
-        <pc:spChg chg="mod">
-          <ac:chgData name="" userId="" providerId="" clId="Web-{6CA45141-8142-4C89-ABF2-B7A7F0B41786}" dt="2019-08-16T07:00:34.360" v="329" actId="20577"/>
-          <ac:spMkLst>
-            <pc:docMk/>
-            <pc:sldMk cId="3749470640" sldId="309"/>
-            <ac:spMk id="3" creationId="{48CD3CA2-4BA5-4026-972D-FC907156D6F4}"/>
-          </ac:spMkLst>
-        </pc:spChg>
-      </pc:sldChg>
-    </pc:docChg>
-  </pc:docChgLst>
-  <pc:docChgLst>
-    <pc:chgData clId="Web-{02BDA07C-30E5-4B06-BBCE-B676B8EC38FC}"/>
-    <pc:docChg chg="modSld">
-      <pc:chgData name="" userId="" providerId="" clId="Web-{02BDA07C-30E5-4B06-BBCE-B676B8EC38FC}" dt="2019-08-21T12:22:54.904" v="218" actId="20577"/>
-      <pc:docMkLst>
-        <pc:docMk/>
-      </pc:docMkLst>
-      <pc:sldChg chg="addSp delSp modSp">
-        <pc:chgData name="" userId="" providerId="" clId="Web-{02BDA07C-30E5-4B06-BBCE-B676B8EC38FC}" dt="2019-08-21T12:11:08.515" v="216" actId="20577"/>
-        <pc:sldMkLst>
-          <pc:docMk/>
-          <pc:sldMk cId="532084759" sldId="315"/>
-        </pc:sldMkLst>
-        <pc:spChg chg="mod">
-          <ac:chgData name="" userId="" providerId="" clId="Web-{02BDA07C-30E5-4B06-BBCE-B676B8EC38FC}" dt="2019-08-21T12:11:08.515" v="216" actId="20577"/>
-          <ac:spMkLst>
-            <pc:docMk/>
-            <pc:sldMk cId="532084759" sldId="315"/>
-            <ac:spMk id="3" creationId="{F66845FC-E103-48DE-9A9F-3292745AF233}"/>
-          </ac:spMkLst>
-        </pc:spChg>
-        <pc:picChg chg="add mod">
-          <ac:chgData name="" userId="" providerId="" clId="Web-{02BDA07C-30E5-4B06-BBCE-B676B8EC38FC}" dt="2019-08-21T11:53:28.776" v="137" actId="14100"/>
-          <ac:picMkLst>
-            <pc:docMk/>
-            <pc:sldMk cId="532084759" sldId="315"/>
-            <ac:picMk id="4" creationId="{2C6F1FF2-2B8F-49D1-BC02-3E1B9D76B5F8}"/>
-          </ac:picMkLst>
-        </pc:picChg>
-        <pc:picChg chg="add mod">
-          <ac:chgData name="" userId="" providerId="" clId="Web-{02BDA07C-30E5-4B06-BBCE-B676B8EC38FC}" dt="2019-08-21T12:05:36.931" v="195" actId="1076"/>
-          <ac:picMkLst>
-            <pc:docMk/>
-            <pc:sldMk cId="532084759" sldId="315"/>
-            <ac:picMk id="6" creationId="{C3569123-B87B-4EBB-8947-519FBBACC331}"/>
-          </ac:picMkLst>
-        </pc:picChg>
-        <pc:picChg chg="add del mod">
-          <ac:chgData name="" userId="" providerId="" clId="Web-{02BDA07C-30E5-4B06-BBCE-B676B8EC38FC}" dt="2019-08-21T12:07:12.542" v="200"/>
-          <ac:picMkLst>
-            <pc:docMk/>
-            <pc:sldMk cId="532084759" sldId="315"/>
-            <ac:picMk id="8" creationId="{1F66282A-0A33-473F-969E-8A62261160CF}"/>
-          </ac:picMkLst>
-        </pc:picChg>
-        <pc:picChg chg="add del mod">
-          <ac:chgData name="" userId="" providerId="" clId="Web-{02BDA07C-30E5-4B06-BBCE-B676B8EC38FC}" dt="2019-08-21T12:07:08.433" v="199"/>
-          <ac:picMkLst>
-            <pc:docMk/>
-            <pc:sldMk cId="532084759" sldId="315"/>
-            <ac:picMk id="10" creationId="{44AA657B-AA60-4AE6-B344-71FEA77309EC}"/>
-          </ac:picMkLst>
-        </pc:picChg>
-        <pc:picChg chg="add mod">
-          <ac:chgData name="" userId="" providerId="" clId="Web-{02BDA07C-30E5-4B06-BBCE-B676B8EC38FC}" dt="2019-08-21T12:07:15.480" v="201" actId="1076"/>
-          <ac:picMkLst>
-            <pc:docMk/>
-            <pc:sldMk cId="532084759" sldId="315"/>
-            <ac:picMk id="12" creationId="{ACB96CE1-0376-4794-8360-71B534BF42CC}"/>
-          </ac:picMkLst>
-        </pc:picChg>
-      </pc:sldChg>
-    </pc:docChg>
-  </pc:docChgLst>
-  <pc:docChgLst>
-    <pc:chgData clId="Web-{0F21CEA2-9FB9-4C5E-9BF9-57F55B3C2973}"/>
-    <pc:docChg chg="modSld">
-      <pc:chgData name="" userId="" providerId="" clId="Web-{0F21CEA2-9FB9-4C5E-9BF9-57F55B3C2973}" dt="2019-08-22T09:39:17.615" v="76" actId="20577"/>
-      <pc:docMkLst>
-        <pc:docMk/>
-      </pc:docMkLst>
-      <pc:sldChg chg="modSp">
-        <pc:chgData name="" userId="" providerId="" clId="Web-{0F21CEA2-9FB9-4C5E-9BF9-57F55B3C2973}" dt="2019-08-22T09:39:17.615" v="75" actId="20577"/>
-        <pc:sldMkLst>
-          <pc:docMk/>
-          <pc:sldMk cId="3874318658" sldId="259"/>
-        </pc:sldMkLst>
-        <pc:spChg chg="mod">
-          <ac:chgData name="" userId="" providerId="" clId="Web-{0F21CEA2-9FB9-4C5E-9BF9-57F55B3C2973}" dt="2019-08-22T09:39:17.615" v="75" actId="20577"/>
-          <ac:spMkLst>
-            <pc:docMk/>
-            <pc:sldMk cId="3874318658" sldId="259"/>
-            <ac:spMk id="3" creationId="{F058EF85-7A26-403D-8EC8-4D6B63992E90}"/>
-          </ac:spMkLst>
-        </pc:spChg>
-      </pc:sldChg>
-      <pc:sldChg chg="modSp">
-        <pc:chgData name="" userId="" providerId="" clId="Web-{0F21CEA2-9FB9-4C5E-9BF9-57F55B3C2973}" dt="2019-08-22T09:39:01.255" v="62" actId="20577"/>
-        <pc:sldMkLst>
-          <pc:docMk/>
-          <pc:sldMk cId="3604236605" sldId="267"/>
-        </pc:sldMkLst>
-        <pc:spChg chg="mod">
-          <ac:chgData name="" userId="" providerId="" clId="Web-{0F21CEA2-9FB9-4C5E-9BF9-57F55B3C2973}" dt="2019-08-22T09:39:01.255" v="62" actId="20577"/>
-          <ac:spMkLst>
-            <pc:docMk/>
-            <pc:sldMk cId="3604236605" sldId="267"/>
-            <ac:spMk id="2" creationId="{87181B6F-95E3-4317-A223-ECC06FCEE759}"/>
-          </ac:spMkLst>
-        </pc:spChg>
-        <pc:spChg chg="mod">
-          <ac:chgData name="" userId="" providerId="" clId="Web-{0F21CEA2-9FB9-4C5E-9BF9-57F55B3C2973}" dt="2019-08-22T09:35:15.173" v="22" actId="20577"/>
-          <ac:spMkLst>
-            <pc:docMk/>
-            <pc:sldMk cId="3604236605" sldId="267"/>
-            <ac:spMk id="3" creationId="{4FE75E9A-5E07-4169-9BC9-B185E9E6E95E}"/>
-          </ac:spMkLst>
-        </pc:spChg>
-      </pc:sldChg>
-      <pc:sldChg chg="modSp">
-        <pc:chgData name="" userId="" providerId="" clId="Web-{0F21CEA2-9FB9-4C5E-9BF9-57F55B3C2973}" dt="2019-08-22T09:37:41.332" v="58" actId="20577"/>
-        <pc:sldMkLst>
-          <pc:docMk/>
-          <pc:sldMk cId="3121416065" sldId="298"/>
-        </pc:sldMkLst>
-        <pc:spChg chg="mod">
-          <ac:chgData name="" userId="" providerId="" clId="Web-{0F21CEA2-9FB9-4C5E-9BF9-57F55B3C2973}" dt="2019-08-22T09:37:41.332" v="58" actId="20577"/>
-          <ac:spMkLst>
-            <pc:docMk/>
-            <pc:sldMk cId="3121416065" sldId="298"/>
-            <ac:spMk id="3" creationId="{9F376D57-7E23-4CED-A222-AA9C8F994D2E}"/>
-          </ac:spMkLst>
-        </pc:spChg>
-      </pc:sldChg>
-    </pc:docChg>
-  </pc:docChgLst>
-  <pc:docChgLst>
-    <pc:chgData clId="Web-{737E9103-524B-4E08-85E9-1F1F785479AB}"/>
-    <pc:docChg chg="modSld">
-      <pc:chgData name="" userId="" providerId="" clId="Web-{737E9103-524B-4E08-85E9-1F1F785479AB}" dt="2019-08-27T11:57:52.289" v="29" actId="20577"/>
-      <pc:docMkLst>
-        <pc:docMk/>
-      </pc:docMkLst>
-      <pc:sldChg chg="modSp">
-        <pc:chgData name="" userId="" providerId="" clId="Web-{737E9103-524B-4E08-85E9-1F1F785479AB}" dt="2019-08-27T11:57:52.289" v="28" actId="20577"/>
-        <pc:sldMkLst>
-          <pc:docMk/>
-          <pc:sldMk cId="3749470640" sldId="309"/>
-        </pc:sldMkLst>
-        <pc:spChg chg="mod">
-          <ac:chgData name="" userId="" providerId="" clId="Web-{737E9103-524B-4E08-85E9-1F1F785479AB}" dt="2019-08-27T11:57:52.289" v="28" actId="20577"/>
-          <ac:spMkLst>
-            <pc:docMk/>
-            <pc:sldMk cId="3749470640" sldId="309"/>
+            <pc:sldMk cId="1549772417" sldId="311"/>
             <ac:spMk id="3" creationId="{48CD3CA2-4BA5-4026-972D-FC907156D6F4}"/>
           </ac:spMkLst>
         </pc:spChg>
@@ -887,203 +412,35 @@
     </pc:docChg>
   </pc:docChgLst>
   <pc:docChgLst>
-    <pc:chgData clId="Web-{9CB31BBE-7643-4598-AB74-C8DECDA9F88D}"/>
+    <pc:chgData clId="Web-{3BDB32A4-44BF-4B18-AD2D-2476B2076494}"/>
     <pc:docChg chg="modSld">
-      <pc:chgData name="" userId="" providerId="" clId="Web-{9CB31BBE-7643-4598-AB74-C8DECDA9F88D}" dt="2019-08-21T14:17:25.348" v="189" actId="20577"/>
+      <pc:chgData name="" userId="" providerId="" clId="Web-{3BDB32A4-44BF-4B18-AD2D-2476B2076494}" dt="2019-08-28T11:17:37.951" v="82" actId="20577"/>
       <pc:docMkLst>
         <pc:docMk/>
       </pc:docMkLst>
       <pc:sldChg chg="modSp">
-        <pc:chgData name="" userId="" providerId="" clId="Web-{9CB31BBE-7643-4598-AB74-C8DECDA9F88D}" dt="2019-08-21T13:56:41.496" v="30" actId="20577"/>
+        <pc:chgData name="" userId="" providerId="" clId="Web-{3BDB32A4-44BF-4B18-AD2D-2476B2076494}" dt="2019-08-28T11:02:02.746" v="0" actId="20577"/>
         <pc:sldMkLst>
           <pc:docMk/>
-          <pc:sldMk cId="3874318658" sldId="259"/>
+          <pc:sldMk cId="3207592105" sldId="286"/>
         </pc:sldMkLst>
         <pc:spChg chg="mod">
-          <ac:chgData name="" userId="" providerId="" clId="Web-{9CB31BBE-7643-4598-AB74-C8DECDA9F88D}" dt="2019-08-21T13:56:41.496" v="30" actId="20577"/>
+          <ac:chgData name="" userId="" providerId="" clId="Web-{3BDB32A4-44BF-4B18-AD2D-2476B2076494}" dt="2019-08-28T11:02:02.746" v="0" actId="20577"/>
           <ac:spMkLst>
             <pc:docMk/>
-            <pc:sldMk cId="3874318658" sldId="259"/>
-            <ac:spMk id="3" creationId="{F058EF85-7A26-403D-8EC8-4D6B63992E90}"/>
+            <pc:sldMk cId="3207592105" sldId="286"/>
+            <ac:spMk id="3" creationId="{6F37C898-71FB-49D0-B973-D1785CEB0342}"/>
           </ac:spMkLst>
         </pc:spChg>
       </pc:sldChg>
       <pc:sldChg chg="modSp">
-        <pc:chgData name="" userId="" providerId="" clId="Web-{9CB31BBE-7643-4598-AB74-C8DECDA9F88D}" dt="2019-08-21T14:10:47.528" v="137" actId="20577"/>
-        <pc:sldMkLst>
-          <pc:docMk/>
-          <pc:sldMk cId="3479937383" sldId="260"/>
-        </pc:sldMkLst>
-        <pc:spChg chg="mod">
-          <ac:chgData name="" userId="" providerId="" clId="Web-{9CB31BBE-7643-4598-AB74-C8DECDA9F88D}" dt="2019-08-21T14:10:47.528" v="137" actId="20577"/>
-          <ac:spMkLst>
-            <pc:docMk/>
-            <pc:sldMk cId="3479937383" sldId="260"/>
-            <ac:spMk id="3" creationId="{A006BD29-4002-41F9-ACEC-5CD14C05D00B}"/>
-          </ac:spMkLst>
-        </pc:spChg>
-      </pc:sldChg>
-      <pc:sldChg chg="modSp">
-        <pc:chgData name="" userId="" providerId="" clId="Web-{9CB31BBE-7643-4598-AB74-C8DECDA9F88D}" dt="2019-08-21T14:14:02.563" v="184" actId="20577"/>
-        <pc:sldMkLst>
-          <pc:docMk/>
-          <pc:sldMk cId="1378607874" sldId="261"/>
-        </pc:sldMkLst>
-        <pc:spChg chg="mod">
-          <ac:chgData name="" userId="" providerId="" clId="Web-{9CB31BBE-7643-4598-AB74-C8DECDA9F88D}" dt="2019-08-21T14:14:02.563" v="184" actId="20577"/>
-          <ac:spMkLst>
-            <pc:docMk/>
-            <pc:sldMk cId="1378607874" sldId="261"/>
-            <ac:spMk id="3" creationId="{A006BD29-4002-41F9-ACEC-5CD14C05D00B}"/>
-          </ac:spMkLst>
-        </pc:spChg>
-      </pc:sldChg>
-      <pc:sldChg chg="modSp">
-        <pc:chgData name="" userId="" providerId="" clId="Web-{9CB31BBE-7643-4598-AB74-C8DECDA9F88D}" dt="2019-08-21T14:17:25.348" v="188" actId="20577"/>
-        <pc:sldMkLst>
-          <pc:docMk/>
-          <pc:sldMk cId="96228185" sldId="262"/>
-        </pc:sldMkLst>
-        <pc:spChg chg="mod">
-          <ac:chgData name="" userId="" providerId="" clId="Web-{9CB31BBE-7643-4598-AB74-C8DECDA9F88D}" dt="2019-08-21T14:17:25.348" v="188" actId="20577"/>
-          <ac:spMkLst>
-            <pc:docMk/>
-            <pc:sldMk cId="96228185" sldId="262"/>
-            <ac:spMk id="3" creationId="{A006BD29-4002-41F9-ACEC-5CD14C05D00B}"/>
-          </ac:spMkLst>
-        </pc:spChg>
-      </pc:sldChg>
-      <pc:sldChg chg="modSp">
-        <pc:chgData name="" userId="" providerId="" clId="Web-{9CB31BBE-7643-4598-AB74-C8DECDA9F88D}" dt="2019-08-21T13:56:48.512" v="33" actId="20577"/>
-        <pc:sldMkLst>
-          <pc:docMk/>
-          <pc:sldMk cId="1885167440" sldId="289"/>
-        </pc:sldMkLst>
-        <pc:spChg chg="mod">
-          <ac:chgData name="" userId="" providerId="" clId="Web-{9CB31BBE-7643-4598-AB74-C8DECDA9F88D}" dt="2019-08-21T13:56:48.512" v="33" actId="20577"/>
-          <ac:spMkLst>
-            <pc:docMk/>
-            <pc:sldMk cId="1885167440" sldId="289"/>
-            <ac:spMk id="2" creationId="{CD55EF39-67AC-4AEB-A4F1-538265FC6DA6}"/>
-          </ac:spMkLst>
-        </pc:spChg>
-      </pc:sldChg>
-      <pc:sldChg chg="modSp">
-        <pc:chgData name="" userId="" providerId="" clId="Web-{9CB31BBE-7643-4598-AB74-C8DECDA9F88D}" dt="2019-08-21T13:56:51.606" v="34" actId="20577"/>
-        <pc:sldMkLst>
-          <pc:docMk/>
-          <pc:sldMk cId="472758218" sldId="290"/>
-        </pc:sldMkLst>
-        <pc:spChg chg="mod">
-          <ac:chgData name="" userId="" providerId="" clId="Web-{9CB31BBE-7643-4598-AB74-C8DECDA9F88D}" dt="2019-08-21T13:56:51.606" v="34" actId="20577"/>
-          <ac:spMkLst>
-            <pc:docMk/>
-            <pc:sldMk cId="472758218" sldId="290"/>
-            <ac:spMk id="2" creationId="{CD55EF39-67AC-4AEB-A4F1-538265FC6DA6}"/>
-          </ac:spMkLst>
-        </pc:spChg>
-      </pc:sldChg>
-      <pc:sldChg chg="modSp">
-        <pc:chgData name="" userId="" providerId="" clId="Web-{9CB31BBE-7643-4598-AB74-C8DECDA9F88D}" dt="2019-08-21T13:55:06.323" v="22" actId="20577"/>
-        <pc:sldMkLst>
-          <pc:docMk/>
-          <pc:sldMk cId="3978066937" sldId="300"/>
-        </pc:sldMkLst>
-        <pc:spChg chg="mod">
-          <ac:chgData name="" userId="" providerId="" clId="Web-{9CB31BBE-7643-4598-AB74-C8DECDA9F88D}" dt="2019-08-21T13:55:06.323" v="22" actId="20577"/>
-          <ac:spMkLst>
-            <pc:docMk/>
-            <pc:sldMk cId="3978066937" sldId="300"/>
-            <ac:spMk id="3" creationId="{728EBFD4-F2E5-4986-A25B-5DB6C2B3245C}"/>
-          </ac:spMkLst>
-        </pc:spChg>
-      </pc:sldChg>
-    </pc:docChg>
-  </pc:docChgLst>
-  <pc:docChgLst>
-    <pc:chgData clId="Web-{DC28F5D4-777E-4F56-9B7B-C903C0CF1842}"/>
-    <pc:docChg chg="modSld">
-      <pc:chgData name="" userId="" providerId="" clId="Web-{DC28F5D4-777E-4F56-9B7B-C903C0CF1842}" dt="2019-08-19T07:22:02.972" v="64" actId="20577"/>
-      <pc:docMkLst>
-        <pc:docMk/>
-      </pc:docMkLst>
-      <pc:sldChg chg="modSp">
-        <pc:chgData name="" userId="" providerId="" clId="Web-{DC28F5D4-777E-4F56-9B7B-C903C0CF1842}" dt="2019-08-19T07:22:02.971" v="63" actId="20577"/>
-        <pc:sldMkLst>
-          <pc:docMk/>
-          <pc:sldMk cId="3874318658" sldId="259"/>
-        </pc:sldMkLst>
-        <pc:spChg chg="mod">
-          <ac:chgData name="" userId="" providerId="" clId="Web-{DC28F5D4-777E-4F56-9B7B-C903C0CF1842}" dt="2019-08-19T07:22:02.971" v="63" actId="20577"/>
-          <ac:spMkLst>
-            <pc:docMk/>
-            <pc:sldMk cId="3874318658" sldId="259"/>
-            <ac:spMk id="3" creationId="{F058EF85-7A26-403D-8EC8-4D6B63992E90}"/>
-          </ac:spMkLst>
-        </pc:spChg>
-      </pc:sldChg>
-      <pc:sldChg chg="modSp">
-        <pc:chgData name="" userId="" providerId="" clId="Web-{DC28F5D4-777E-4F56-9B7B-C903C0CF1842}" dt="2019-08-19T07:21:07.975" v="51" actId="20577"/>
-        <pc:sldMkLst>
-          <pc:docMk/>
-          <pc:sldMk cId="472758218" sldId="290"/>
-        </pc:sldMkLst>
-        <pc:spChg chg="mod">
-          <ac:chgData name="" userId="" providerId="" clId="Web-{DC28F5D4-777E-4F56-9B7B-C903C0CF1842}" dt="2019-08-19T07:21:07.975" v="51" actId="20577"/>
-          <ac:spMkLst>
-            <pc:docMk/>
-            <pc:sldMk cId="472758218" sldId="290"/>
-            <ac:spMk id="3" creationId="{797A8D8B-6BAF-462D-815C-BF243EAB51D0}"/>
-          </ac:spMkLst>
-        </pc:spChg>
-      </pc:sldChg>
-    </pc:docChg>
-  </pc:docChgLst>
-  <pc:docChgLst>
-    <pc:chgData clId="Web-{B7B69C26-D791-464C-A38E-18237271614B}"/>
-    <pc:docChg chg="modSld">
-      <pc:chgData name="" userId="" providerId="" clId="Web-{B7B69C26-D791-464C-A38E-18237271614B}" dt="2019-08-28T12:57:40.477" v="329" actId="20577"/>
-      <pc:docMkLst>
-        <pc:docMk/>
-      </pc:docMkLst>
-      <pc:sldChg chg="modSp">
-        <pc:chgData name="" userId="" providerId="" clId="Web-{B7B69C26-D791-464C-A38E-18237271614B}" dt="2019-08-28T12:57:29.883" v="322" actId="20577"/>
-        <pc:sldMkLst>
-          <pc:docMk/>
-          <pc:sldMk cId="3874318658" sldId="259"/>
-        </pc:sldMkLst>
-        <pc:spChg chg="mod">
-          <ac:chgData name="" userId="" providerId="" clId="Web-{B7B69C26-D791-464C-A38E-18237271614B}" dt="2019-08-28T12:57:29.883" v="322" actId="20577"/>
-          <ac:spMkLst>
-            <pc:docMk/>
-            <pc:sldMk cId="3874318658" sldId="259"/>
-            <ac:spMk id="3" creationId="{F058EF85-7A26-403D-8EC8-4D6B63992E90}"/>
-          </ac:spMkLst>
-        </pc:spChg>
-      </pc:sldChg>
-      <pc:sldChg chg="modSp">
-        <pc:chgData name="" userId="" providerId="" clId="Web-{B7B69C26-D791-464C-A38E-18237271614B}" dt="2019-08-28T12:57:40.477" v="328" actId="20577"/>
-        <pc:sldMkLst>
-          <pc:docMk/>
-          <pc:sldMk cId="3479937383" sldId="260"/>
-        </pc:sldMkLst>
-        <pc:spChg chg="mod">
-          <ac:chgData name="" userId="" providerId="" clId="Web-{B7B69C26-D791-464C-A38E-18237271614B}" dt="2019-08-28T12:57:40.477" v="328" actId="20577"/>
-          <ac:spMkLst>
-            <pc:docMk/>
-            <pc:sldMk cId="3479937383" sldId="260"/>
-            <ac:spMk id="3" creationId="{A006BD29-4002-41F9-ACEC-5CD14C05D00B}"/>
-          </ac:spMkLst>
-        </pc:spChg>
-      </pc:sldChg>
-      <pc:sldChg chg="modSp">
-        <pc:chgData name="" userId="" providerId="" clId="Web-{B7B69C26-D791-464C-A38E-18237271614B}" dt="2019-08-28T12:48:46.662" v="224" actId="20577"/>
+        <pc:chgData name="" userId="" providerId="" clId="Web-{3BDB32A4-44BF-4B18-AD2D-2476B2076494}" dt="2019-08-28T11:17:37.951" v="81" actId="20577"/>
         <pc:sldMkLst>
           <pc:docMk/>
           <pc:sldMk cId="399787957" sldId="293"/>
         </pc:sldMkLst>
         <pc:spChg chg="mod">
-          <ac:chgData name="" userId="" providerId="" clId="Web-{B7B69C26-D791-464C-A38E-18237271614B}" dt="2019-08-28T12:48:46.662" v="224" actId="20577"/>
+          <ac:chgData name="" userId="" providerId="" clId="Web-{3BDB32A4-44BF-4B18-AD2D-2476B2076494}" dt="2019-08-28T11:17:37.951" v="81" actId="20577"/>
           <ac:spMkLst>
             <pc:docMk/>
             <pc:sldMk cId="399787957" sldId="293"/>
@@ -1092,706 +449,13 @@
         </pc:spChg>
       </pc:sldChg>
       <pc:sldChg chg="modSp">
-        <pc:chgData name="" userId="" providerId="" clId="Web-{B7B69C26-D791-464C-A38E-18237271614B}" dt="2019-08-28T12:56:29.710" v="298" actId="20577"/>
-        <pc:sldMkLst>
-          <pc:docMk/>
-          <pc:sldMk cId="1503452516" sldId="295"/>
-        </pc:sldMkLst>
-        <pc:spChg chg="mod">
-          <ac:chgData name="" userId="" providerId="" clId="Web-{B7B69C26-D791-464C-A38E-18237271614B}" dt="2019-08-28T12:56:29.710" v="298" actId="20577"/>
-          <ac:spMkLst>
-            <pc:docMk/>
-            <pc:sldMk cId="1503452516" sldId="295"/>
-            <ac:spMk id="3" creationId="{48CD3CA2-4BA5-4026-972D-FC907156D6F4}"/>
-          </ac:spMkLst>
-        </pc:spChg>
-      </pc:sldChg>
-      <pc:sldChg chg="modSp">
-        <pc:chgData name="" userId="" providerId="" clId="Web-{B7B69C26-D791-464C-A38E-18237271614B}" dt="2019-08-28T12:46:37.635" v="220" actId="20577"/>
+        <pc:chgData name="" userId="" providerId="" clId="Web-{3BDB32A4-44BF-4B18-AD2D-2476B2076494}" dt="2019-08-28T11:10:17.224" v="65" actId="20577"/>
         <pc:sldMkLst>
           <pc:docMk/>
           <pc:sldMk cId="1373132171" sldId="310"/>
         </pc:sldMkLst>
         <pc:spChg chg="mod">
-          <ac:chgData name="" userId="" providerId="" clId="Web-{B7B69C26-D791-464C-A38E-18237271614B}" dt="2019-08-28T12:46:37.635" v="220" actId="20577"/>
-          <ac:spMkLst>
-            <pc:docMk/>
-            <pc:sldMk cId="1373132171" sldId="310"/>
-            <ac:spMk id="3" creationId="{48CD3CA2-4BA5-4026-972D-FC907156D6F4}"/>
-          </ac:spMkLst>
-        </pc:spChg>
-      </pc:sldChg>
-      <pc:sldChg chg="modSp">
-        <pc:chgData name="" userId="" providerId="" clId="Web-{B7B69C26-D791-464C-A38E-18237271614B}" dt="2019-08-28T12:54:08.037" v="254" actId="20577"/>
-        <pc:sldMkLst>
-          <pc:docMk/>
-          <pc:sldMk cId="1549772417" sldId="311"/>
-        </pc:sldMkLst>
-        <pc:spChg chg="mod">
-          <ac:chgData name="" userId="" providerId="" clId="Web-{B7B69C26-D791-464C-A38E-18237271614B}" dt="2019-08-28T12:54:08.037" v="254" actId="20577"/>
-          <ac:spMkLst>
-            <pc:docMk/>
-            <pc:sldMk cId="1549772417" sldId="311"/>
-            <ac:spMk id="3" creationId="{48CD3CA2-4BA5-4026-972D-FC907156D6F4}"/>
-          </ac:spMkLst>
-        </pc:spChg>
-      </pc:sldChg>
-    </pc:docChg>
-  </pc:docChgLst>
-  <pc:docChgLst>
-    <pc:chgData clId="Web-{DC4AA95C-7B93-4BE8-95B6-0CFE319605A9}"/>
-    <pc:docChg chg="modSld">
-      <pc:chgData name="" userId="" providerId="" clId="Web-{DC4AA95C-7B93-4BE8-95B6-0CFE319605A9}" dt="2019-08-19T07:33:32.829" v="1" actId="14100"/>
-      <pc:docMkLst>
-        <pc:docMk/>
-      </pc:docMkLst>
-      <pc:sldChg chg="modSp">
-        <pc:chgData name="" userId="" providerId="" clId="Web-{DC4AA95C-7B93-4BE8-95B6-0CFE319605A9}" dt="2019-08-19T07:33:32.829" v="1" actId="14100"/>
-        <pc:sldMkLst>
-          <pc:docMk/>
-          <pc:sldMk cId="119092984" sldId="302"/>
-        </pc:sldMkLst>
-        <pc:graphicFrameChg chg="mod">
-          <ac:chgData name="" userId="" providerId="" clId="Web-{DC4AA95C-7B93-4BE8-95B6-0CFE319605A9}" dt="2019-08-19T07:33:32.829" v="1" actId="14100"/>
-          <ac:graphicFrameMkLst>
-            <pc:docMk/>
-            <pc:sldMk cId="119092984" sldId="302"/>
-            <ac:graphicFrameMk id="5" creationId="{00000000-0000-0000-0000-000000000000}"/>
-          </ac:graphicFrameMkLst>
-        </pc:graphicFrameChg>
-      </pc:sldChg>
-    </pc:docChg>
-  </pc:docChgLst>
-  <pc:docChgLst>
-    <pc:chgData clId="Web-{88B57755-15E1-4E48-B2F9-954B51594687}"/>
-    <pc:docChg chg="addSld modSld">
-      <pc:chgData name="" userId="" providerId="" clId="Web-{88B57755-15E1-4E48-B2F9-954B51594687}" dt="2019-08-20T05:58:16.685" v="2" actId="1076"/>
-      <pc:docMkLst>
-        <pc:docMk/>
-      </pc:docMkLst>
-      <pc:sldChg chg="addSp modSp new">
-        <pc:chgData name="" userId="" providerId="" clId="Web-{88B57755-15E1-4E48-B2F9-954B51594687}" dt="2019-08-20T05:58:16.685" v="2" actId="1076"/>
-        <pc:sldMkLst>
-          <pc:docMk/>
-          <pc:sldMk cId="4039594616" sldId="315"/>
-        </pc:sldMkLst>
-        <pc:spChg chg="add mod">
-          <ac:chgData name="" userId="" providerId="" clId="Web-{88B57755-15E1-4E48-B2F9-954B51594687}" dt="2019-08-20T05:58:16.685" v="2" actId="1076"/>
-          <ac:spMkLst>
-            <pc:docMk/>
-            <pc:sldMk cId="4039594616" sldId="315"/>
-            <ac:spMk id="5" creationId="{A67833DD-C346-4047-89AD-FD561592183C}"/>
-          </ac:spMkLst>
-        </pc:spChg>
-      </pc:sldChg>
-    </pc:docChg>
-  </pc:docChgLst>
-  <pc:docChgLst>
-    <pc:chgData clId="Web-{EB1AC5F5-222D-4709-B6DA-A14B54B2B7AF}"/>
-    <pc:docChg chg="addSld delSld modSld sldOrd">
-      <pc:chgData name="" userId="" providerId="" clId="Web-{EB1AC5F5-222D-4709-B6DA-A14B54B2B7AF}" dt="2019-08-26T13:42:22.960" v="827"/>
-      <pc:docMkLst>
-        <pc:docMk/>
-      </pc:docMkLst>
-      <pc:sldChg chg="modSp">
-        <pc:chgData name="" userId="" providerId="" clId="Web-{EB1AC5F5-222D-4709-B6DA-A14B54B2B7AF}" dt="2019-08-26T13:41:25.287" v="812" actId="20577"/>
-        <pc:sldMkLst>
-          <pc:docMk/>
-          <pc:sldMk cId="2035881997" sldId="265"/>
-        </pc:sldMkLst>
-        <pc:spChg chg="mod">
-          <ac:chgData name="" userId="" providerId="" clId="Web-{EB1AC5F5-222D-4709-B6DA-A14B54B2B7AF}" dt="2019-08-26T13:41:25.287" v="812" actId="20577"/>
-          <ac:spMkLst>
-            <pc:docMk/>
-            <pc:sldMk cId="2035881997" sldId="265"/>
-            <ac:spMk id="3" creationId="{D4AA290F-7FB7-4412-8CC4-491ED552AC79}"/>
-          </ac:spMkLst>
-        </pc:spChg>
-      </pc:sldChg>
-      <pc:sldChg chg="modSp">
-        <pc:chgData name="" userId="" providerId="" clId="Web-{EB1AC5F5-222D-4709-B6DA-A14B54B2B7AF}" dt="2019-08-26T12:45:03.241" v="242" actId="1076"/>
-        <pc:sldMkLst>
-          <pc:docMk/>
-          <pc:sldMk cId="3328933052" sldId="270"/>
-        </pc:sldMkLst>
-        <pc:spChg chg="mod">
-          <ac:chgData name="" userId="" providerId="" clId="Web-{EB1AC5F5-222D-4709-B6DA-A14B54B2B7AF}" dt="2019-08-26T12:36:40.959" v="108" actId="20577"/>
-          <ac:spMkLst>
-            <pc:docMk/>
-            <pc:sldMk cId="3328933052" sldId="270"/>
-            <ac:spMk id="3" creationId="{E0CD0271-3469-4097-8AEA-CCD26647543D}"/>
-          </ac:spMkLst>
-        </pc:spChg>
-        <pc:picChg chg="mod">
-          <ac:chgData name="" userId="" providerId="" clId="Web-{EB1AC5F5-222D-4709-B6DA-A14B54B2B7AF}" dt="2019-08-26T12:45:03.241" v="242" actId="1076"/>
-          <ac:picMkLst>
-            <pc:docMk/>
-            <pc:sldMk cId="3328933052" sldId="270"/>
-            <ac:picMk id="8" creationId="{87F651EF-A4BF-4C7D-83FC-D13275264B6B}"/>
-          </ac:picMkLst>
-        </pc:picChg>
-      </pc:sldChg>
-      <pc:sldChg chg="modSp">
-        <pc:chgData name="" userId="" providerId="" clId="Web-{EB1AC5F5-222D-4709-B6DA-A14B54B2B7AF}" dt="2019-08-26T12:36:30.131" v="102" actId="20577"/>
-        <pc:sldMkLst>
-          <pc:docMk/>
-          <pc:sldMk cId="3070959357" sldId="272"/>
-        </pc:sldMkLst>
-        <pc:spChg chg="mod">
-          <ac:chgData name="" userId="" providerId="" clId="Web-{EB1AC5F5-222D-4709-B6DA-A14B54B2B7AF}" dt="2019-08-26T12:36:30.131" v="102" actId="20577"/>
-          <ac:spMkLst>
-            <pc:docMk/>
-            <pc:sldMk cId="3070959357" sldId="272"/>
-            <ac:spMk id="3" creationId="{6C6F7F10-0B9F-4179-A277-EADC18422038}"/>
-          </ac:spMkLst>
-        </pc:spChg>
-        <pc:picChg chg="mod">
-          <ac:chgData name="" userId="" providerId="" clId="Web-{EB1AC5F5-222D-4709-B6DA-A14B54B2B7AF}" dt="2019-08-26T12:36:14.677" v="97" actId="1076"/>
-          <ac:picMkLst>
-            <pc:docMk/>
-            <pc:sldMk cId="3070959357" sldId="272"/>
-            <ac:picMk id="5" creationId="{8F587FA8-F26E-409B-9520-54BE28459E0D}"/>
-          </ac:picMkLst>
-        </pc:picChg>
-      </pc:sldChg>
-      <pc:sldChg chg="modSp addAnim delAnim modAnim">
-        <pc:chgData name="" userId="" providerId="" clId="Web-{EB1AC5F5-222D-4709-B6DA-A14B54B2B7AF}" dt="2019-08-26T12:48:09.997" v="305" actId="20577"/>
-        <pc:sldMkLst>
-          <pc:docMk/>
-          <pc:sldMk cId="187791988" sldId="273"/>
-        </pc:sldMkLst>
-        <pc:spChg chg="mod">
-          <ac:chgData name="" userId="" providerId="" clId="Web-{EB1AC5F5-222D-4709-B6DA-A14B54B2B7AF}" dt="2019-08-26T12:48:09.997" v="305" actId="20577"/>
-          <ac:spMkLst>
-            <pc:docMk/>
-            <pc:sldMk cId="187791988" sldId="273"/>
-            <ac:spMk id="3" creationId="{20EEFEFC-40F2-4E14-83A1-B664E911CB99}"/>
-          </ac:spMkLst>
-        </pc:spChg>
-        <pc:picChg chg="mod">
-          <ac:chgData name="" userId="" providerId="" clId="Web-{EB1AC5F5-222D-4709-B6DA-A14B54B2B7AF}" dt="2019-08-26T12:44:56.459" v="241" actId="1076"/>
-          <ac:picMkLst>
-            <pc:docMk/>
-            <pc:sldMk cId="187791988" sldId="273"/>
-            <ac:picMk id="5" creationId="{00000000-0000-0000-0000-000000000000}"/>
-          </ac:picMkLst>
-        </pc:picChg>
-      </pc:sldChg>
-      <pc:sldChg chg="modSp">
-        <pc:chgData name="" userId="" providerId="" clId="Web-{EB1AC5F5-222D-4709-B6DA-A14B54B2B7AF}" dt="2019-08-26T13:12:49.685" v="445" actId="20577"/>
-        <pc:sldMkLst>
-          <pc:docMk/>
-          <pc:sldMk cId="998402309" sldId="275"/>
-        </pc:sldMkLst>
-        <pc:spChg chg="mod">
-          <ac:chgData name="" userId="" providerId="" clId="Web-{EB1AC5F5-222D-4709-B6DA-A14B54B2B7AF}" dt="2019-08-26T13:12:49.685" v="445" actId="20577"/>
-          <ac:spMkLst>
-            <pc:docMk/>
-            <pc:sldMk cId="998402309" sldId="275"/>
-            <ac:spMk id="3" creationId="{514C4D4A-546B-4399-AD4C-643FF21D65FE}"/>
-          </ac:spMkLst>
-        </pc:spChg>
-      </pc:sldChg>
-      <pc:sldChg chg="modSp">
-        <pc:chgData name="" userId="" providerId="" clId="Web-{EB1AC5F5-222D-4709-B6DA-A14B54B2B7AF}" dt="2019-08-26T13:13:36.280" v="454" actId="1076"/>
-        <pc:sldMkLst>
-          <pc:docMk/>
-          <pc:sldMk cId="1169010977" sldId="277"/>
-        </pc:sldMkLst>
-        <pc:spChg chg="mod">
-          <ac:chgData name="" userId="" providerId="" clId="Web-{EB1AC5F5-222D-4709-B6DA-A14B54B2B7AF}" dt="2019-08-26T13:11:38.073" v="441" actId="20577"/>
-          <ac:spMkLst>
-            <pc:docMk/>
-            <pc:sldMk cId="1169010977" sldId="277"/>
-            <ac:spMk id="3" creationId="{48A20DC2-7F9B-4A6A-820D-94145CE780D4}"/>
-          </ac:spMkLst>
-        </pc:spChg>
-        <pc:picChg chg="mod">
-          <ac:chgData name="" userId="" providerId="" clId="Web-{EB1AC5F5-222D-4709-B6DA-A14B54B2B7AF}" dt="2019-08-26T13:13:29.655" v="453" actId="1076"/>
-          <ac:picMkLst>
-            <pc:docMk/>
-            <pc:sldMk cId="1169010977" sldId="277"/>
-            <ac:picMk id="4" creationId="{12F06931-BE46-4079-9B8E-A0AFF6ADE7A4}"/>
-          </ac:picMkLst>
-        </pc:picChg>
-        <pc:picChg chg="mod">
-          <ac:chgData name="" userId="" providerId="" clId="Web-{EB1AC5F5-222D-4709-B6DA-A14B54B2B7AF}" dt="2019-08-26T13:13:36.280" v="454" actId="1076"/>
-          <ac:picMkLst>
-            <pc:docMk/>
-            <pc:sldMk cId="1169010977" sldId="277"/>
-            <ac:picMk id="5" creationId="{84758901-5B45-48B3-8DA3-BFB48B32E2EE}"/>
-          </ac:picMkLst>
-        </pc:picChg>
-      </pc:sldChg>
-      <pc:sldChg chg="modSp">
-        <pc:chgData name="" userId="" providerId="" clId="Web-{EB1AC5F5-222D-4709-B6DA-A14B54B2B7AF}" dt="2019-08-26T13:19:58.949" v="547" actId="20577"/>
-        <pc:sldMkLst>
-          <pc:docMk/>
-          <pc:sldMk cId="833840719" sldId="279"/>
-        </pc:sldMkLst>
-        <pc:spChg chg="mod">
-          <ac:chgData name="" userId="" providerId="" clId="Web-{EB1AC5F5-222D-4709-B6DA-A14B54B2B7AF}" dt="2019-08-26T13:19:58.949" v="547" actId="20577"/>
-          <ac:spMkLst>
-            <pc:docMk/>
-            <pc:sldMk cId="833840719" sldId="279"/>
-            <ac:spMk id="3" creationId="{1DF8CC30-F456-42F2-BA6C-AF7568AED795}"/>
-          </ac:spMkLst>
-        </pc:spChg>
-        <pc:picChg chg="mod">
-          <ac:chgData name="" userId="" providerId="" clId="Web-{EB1AC5F5-222D-4709-B6DA-A14B54B2B7AF}" dt="2019-08-26T13:13:21.795" v="452" actId="1076"/>
-          <ac:picMkLst>
-            <pc:docMk/>
-            <pc:sldMk cId="833840719" sldId="279"/>
-            <ac:picMk id="5" creationId="{00000000-0000-0000-0000-000000000000}"/>
-          </ac:picMkLst>
-        </pc:picChg>
-      </pc:sldChg>
-      <pc:sldChg chg="modSp">
-        <pc:chgData name="" userId="" providerId="" clId="Web-{EB1AC5F5-222D-4709-B6DA-A14B54B2B7AF}" dt="2019-08-26T13:19:10.119" v="531" actId="20577"/>
-        <pc:sldMkLst>
-          <pc:docMk/>
-          <pc:sldMk cId="1349797421" sldId="280"/>
-        </pc:sldMkLst>
-        <pc:spChg chg="mod">
-          <ac:chgData name="" userId="" providerId="" clId="Web-{EB1AC5F5-222D-4709-B6DA-A14B54B2B7AF}" dt="2019-08-26T13:19:10.119" v="531" actId="20577"/>
-          <ac:spMkLst>
-            <pc:docMk/>
-            <pc:sldMk cId="1349797421" sldId="280"/>
-            <ac:spMk id="3" creationId="{C149E1D9-0167-4CC4-A969-6A11A6A02303}"/>
-          </ac:spMkLst>
-        </pc:spChg>
-      </pc:sldChg>
-      <pc:sldChg chg="modSp">
-        <pc:chgData name="" userId="" providerId="" clId="Web-{EB1AC5F5-222D-4709-B6DA-A14B54B2B7AF}" dt="2019-08-26T13:23:55.534" v="590" actId="1076"/>
-        <pc:sldMkLst>
-          <pc:docMk/>
-          <pc:sldMk cId="378540045" sldId="281"/>
-        </pc:sldMkLst>
-        <pc:spChg chg="mod">
-          <ac:chgData name="" userId="" providerId="" clId="Web-{EB1AC5F5-222D-4709-B6DA-A14B54B2B7AF}" dt="2019-08-26T13:22:03.249" v="555" actId="20577"/>
-          <ac:spMkLst>
-            <pc:docMk/>
-            <pc:sldMk cId="378540045" sldId="281"/>
-            <ac:spMk id="3" creationId="{C0C7CCA2-21D3-414F-8991-FF7195AB442C}"/>
-          </ac:spMkLst>
-        </pc:spChg>
-        <pc:picChg chg="mod">
-          <ac:chgData name="" userId="" providerId="" clId="Web-{EB1AC5F5-222D-4709-B6DA-A14B54B2B7AF}" dt="2019-08-26T13:23:55.534" v="590" actId="1076"/>
-          <ac:picMkLst>
-            <pc:docMk/>
-            <pc:sldMk cId="378540045" sldId="281"/>
-            <ac:picMk id="5" creationId="{00000000-0000-0000-0000-000000000000}"/>
-          </ac:picMkLst>
-        </pc:picChg>
-      </pc:sldChg>
-      <pc:sldChg chg="modSp">
-        <pc:chgData name="" userId="" providerId="" clId="Web-{EB1AC5F5-222D-4709-B6DA-A14B54B2B7AF}" dt="2019-08-26T13:24:01.988" v="591" actId="1076"/>
-        <pc:sldMkLst>
-          <pc:docMk/>
-          <pc:sldMk cId="230576329" sldId="282"/>
-        </pc:sldMkLst>
-        <pc:picChg chg="mod">
-          <ac:chgData name="" userId="" providerId="" clId="Web-{EB1AC5F5-222D-4709-B6DA-A14B54B2B7AF}" dt="2019-08-26T13:24:01.988" v="591" actId="1076"/>
-          <ac:picMkLst>
-            <pc:docMk/>
-            <pc:sldMk cId="230576329" sldId="282"/>
-            <ac:picMk id="4" creationId="{00000000-0000-0000-0000-000000000000}"/>
-          </ac:picMkLst>
-        </pc:picChg>
-      </pc:sldChg>
-      <pc:sldChg chg="modSp">
-        <pc:chgData name="" userId="" providerId="" clId="Web-{EB1AC5F5-222D-4709-B6DA-A14B54B2B7AF}" dt="2019-08-26T13:23:50.300" v="589" actId="1076"/>
-        <pc:sldMkLst>
-          <pc:docMk/>
-          <pc:sldMk cId="1454178254" sldId="283"/>
-        </pc:sldMkLst>
-        <pc:spChg chg="mod">
-          <ac:chgData name="" userId="" providerId="" clId="Web-{EB1AC5F5-222D-4709-B6DA-A14B54B2B7AF}" dt="2019-08-26T13:23:38.315" v="586" actId="20577"/>
-          <ac:spMkLst>
-            <pc:docMk/>
-            <pc:sldMk cId="1454178254" sldId="283"/>
-            <ac:spMk id="3" creationId="{C82B7E5E-81F5-4F0B-82FD-802385CD9A10}"/>
-          </ac:spMkLst>
-        </pc:spChg>
-        <pc:picChg chg="mod">
-          <ac:chgData name="" userId="" providerId="" clId="Web-{EB1AC5F5-222D-4709-B6DA-A14B54B2B7AF}" dt="2019-08-26T13:23:50.300" v="589" actId="1076"/>
-          <ac:picMkLst>
-            <pc:docMk/>
-            <pc:sldMk cId="1454178254" sldId="283"/>
-            <ac:picMk id="4" creationId="{00000000-0000-0000-0000-000000000000}"/>
-          </ac:picMkLst>
-        </pc:picChg>
-      </pc:sldChg>
-      <pc:sldChg chg="modSp">
-        <pc:chgData name="" userId="" providerId="" clId="Web-{EB1AC5F5-222D-4709-B6DA-A14B54B2B7AF}" dt="2019-08-26T13:30:38.828" v="594" actId="20577"/>
-        <pc:sldMkLst>
-          <pc:docMk/>
-          <pc:sldMk cId="761633851" sldId="288"/>
-        </pc:sldMkLst>
-        <pc:spChg chg="mod">
-          <ac:chgData name="" userId="" providerId="" clId="Web-{EB1AC5F5-222D-4709-B6DA-A14B54B2B7AF}" dt="2019-08-26T13:30:38.828" v="594" actId="20577"/>
-          <ac:spMkLst>
-            <pc:docMk/>
-            <pc:sldMk cId="761633851" sldId="288"/>
-            <ac:spMk id="3" creationId="{F07687A8-64DB-4954-96A8-C40A80C3A991}"/>
-          </ac:spMkLst>
-        </pc:spChg>
-      </pc:sldChg>
-      <pc:sldChg chg="modSp">
-        <pc:chgData name="" userId="" providerId="" clId="Web-{EB1AC5F5-222D-4709-B6DA-A14B54B2B7AF}" dt="2019-08-26T13:33:24.443" v="611" actId="20577"/>
-        <pc:sldMkLst>
-          <pc:docMk/>
-          <pc:sldMk cId="1885167440" sldId="289"/>
-        </pc:sldMkLst>
-        <pc:spChg chg="mod">
-          <ac:chgData name="" userId="" providerId="" clId="Web-{EB1AC5F5-222D-4709-B6DA-A14B54B2B7AF}" dt="2019-08-26T13:33:24.443" v="611" actId="20577"/>
-          <ac:spMkLst>
-            <pc:docMk/>
-            <pc:sldMk cId="1885167440" sldId="289"/>
-            <ac:spMk id="3" creationId="{797A8D8B-6BAF-462D-815C-BF243EAB51D0}"/>
-          </ac:spMkLst>
-        </pc:spChg>
-      </pc:sldChg>
-      <pc:sldChg chg="modSp">
-        <pc:chgData name="" userId="" providerId="" clId="Web-{EB1AC5F5-222D-4709-B6DA-A14B54B2B7AF}" dt="2019-08-26T13:38:02.093" v="751" actId="20577"/>
-        <pc:sldMkLst>
-          <pc:docMk/>
-          <pc:sldMk cId="472758218" sldId="290"/>
-        </pc:sldMkLst>
-        <pc:spChg chg="mod">
-          <ac:chgData name="" userId="" providerId="" clId="Web-{EB1AC5F5-222D-4709-B6DA-A14B54B2B7AF}" dt="2019-08-26T13:33:08.286" v="602" actId="20577"/>
-          <ac:spMkLst>
-            <pc:docMk/>
-            <pc:sldMk cId="472758218" sldId="290"/>
-            <ac:spMk id="2" creationId="{CD55EF39-67AC-4AEB-A4F1-538265FC6DA6}"/>
-          </ac:spMkLst>
-        </pc:spChg>
-        <pc:spChg chg="mod">
-          <ac:chgData name="" userId="" providerId="" clId="Web-{EB1AC5F5-222D-4709-B6DA-A14B54B2B7AF}" dt="2019-08-26T13:38:02.093" v="751" actId="20577"/>
-          <ac:spMkLst>
-            <pc:docMk/>
-            <pc:sldMk cId="472758218" sldId="290"/>
-            <ac:spMk id="3" creationId="{797A8D8B-6BAF-462D-815C-BF243EAB51D0}"/>
-          </ac:spMkLst>
-        </pc:spChg>
-      </pc:sldChg>
-      <pc:sldChg chg="del">
-        <pc:chgData name="" userId="" providerId="" clId="Web-{EB1AC5F5-222D-4709-B6DA-A14B54B2B7AF}" dt="2019-08-26T13:41:26.724" v="814"/>
-        <pc:sldMkLst>
-          <pc:docMk/>
-          <pc:sldMk cId="1526033100" sldId="291"/>
-        </pc:sldMkLst>
-      </pc:sldChg>
-      <pc:sldChg chg="modSp">
-        <pc:chgData name="" userId="" providerId="" clId="Web-{EB1AC5F5-222D-4709-B6DA-A14B54B2B7AF}" dt="2019-08-26T13:40:51.754" v="803" actId="20577"/>
-        <pc:sldMkLst>
-          <pc:docMk/>
-          <pc:sldMk cId="3121416065" sldId="298"/>
-        </pc:sldMkLst>
-        <pc:spChg chg="mod">
-          <ac:chgData name="" userId="" providerId="" clId="Web-{EB1AC5F5-222D-4709-B6DA-A14B54B2B7AF}" dt="2019-08-26T13:40:51.754" v="803" actId="20577"/>
-          <ac:spMkLst>
-            <pc:docMk/>
-            <pc:sldMk cId="3121416065" sldId="298"/>
-            <ac:spMk id="3" creationId="{9F376D57-7E23-4CED-A222-AA9C8F994D2E}"/>
-          </ac:spMkLst>
-        </pc:spChg>
-      </pc:sldChg>
-      <pc:sldChg chg="ord">
-        <pc:chgData name="" userId="" providerId="" clId="Web-{EB1AC5F5-222D-4709-B6DA-A14B54B2B7AF}" dt="2019-08-26T13:42:07.569" v="826"/>
-        <pc:sldMkLst>
-          <pc:docMk/>
-          <pc:sldMk cId="105066576" sldId="299"/>
-        </pc:sldMkLst>
-      </pc:sldChg>
-      <pc:sldChg chg="ord">
-        <pc:chgData name="" userId="" providerId="" clId="Web-{EB1AC5F5-222D-4709-B6DA-A14B54B2B7AF}" dt="2019-08-26T13:42:22.960" v="827"/>
-        <pc:sldMkLst>
-          <pc:docMk/>
-          <pc:sldMk cId="3978066937" sldId="300"/>
-        </pc:sldMkLst>
-      </pc:sldChg>
-      <pc:sldChg chg="modSp">
-        <pc:chgData name="" userId="" providerId="" clId="Web-{EB1AC5F5-222D-4709-B6DA-A14B54B2B7AF}" dt="2019-08-26T13:30:47.079" v="600" actId="20577"/>
-        <pc:sldMkLst>
-          <pc:docMk/>
-          <pc:sldMk cId="2078075699" sldId="304"/>
-        </pc:sldMkLst>
-        <pc:spChg chg="mod">
-          <ac:chgData name="" userId="" providerId="" clId="Web-{EB1AC5F5-222D-4709-B6DA-A14B54B2B7AF}" dt="2019-08-26T13:30:47.079" v="600" actId="20577"/>
-          <ac:spMkLst>
-            <pc:docMk/>
-            <pc:sldMk cId="2078075699" sldId="304"/>
-            <ac:spMk id="3" creationId="{F07687A8-64DB-4954-96A8-C40A80C3A991}"/>
-          </ac:spMkLst>
-        </pc:spChg>
-      </pc:sldChg>
-      <pc:sldChg chg="modSp">
-        <pc:chgData name="" userId="" providerId="" clId="Web-{EB1AC5F5-222D-4709-B6DA-A14B54B2B7AF}" dt="2019-08-26T12:37:22.773" v="122" actId="20577"/>
-        <pc:sldMkLst>
-          <pc:docMk/>
-          <pc:sldMk cId="2724069113" sldId="313"/>
-        </pc:sldMkLst>
-        <pc:spChg chg="mod">
-          <ac:chgData name="" userId="" providerId="" clId="Web-{EB1AC5F5-222D-4709-B6DA-A14B54B2B7AF}" dt="2019-08-26T12:37:22.773" v="122" actId="20577"/>
-          <ac:spMkLst>
-            <pc:docMk/>
-            <pc:sldMk cId="2724069113" sldId="313"/>
-            <ac:spMk id="3" creationId="{C149E1D9-0167-4CC4-A969-6A11A6A02303}"/>
-          </ac:spMkLst>
-        </pc:spChg>
-      </pc:sldChg>
-      <pc:sldChg chg="ord">
-        <pc:chgData name="" userId="" providerId="" clId="Web-{EB1AC5F5-222D-4709-B6DA-A14B54B2B7AF}" dt="2019-08-26T13:42:07.569" v="825"/>
-        <pc:sldMkLst>
-          <pc:docMk/>
-          <pc:sldMk cId="3781557145" sldId="314"/>
-        </pc:sldMkLst>
-      </pc:sldChg>
-      <pc:sldChg chg="ord">
-        <pc:chgData name="" userId="" providerId="" clId="Web-{EB1AC5F5-222D-4709-B6DA-A14B54B2B7AF}" dt="2019-08-26T13:42:07.569" v="824"/>
-        <pc:sldMkLst>
-          <pc:docMk/>
-          <pc:sldMk cId="532084759" sldId="315"/>
-        </pc:sldMkLst>
-      </pc:sldChg>
-      <pc:sldChg chg="add replId">
-        <pc:chgData name="" userId="" providerId="" clId="Web-{EB1AC5F5-222D-4709-B6DA-A14B54B2B7AF}" dt="2019-08-26T13:41:05.130" v="805"/>
-        <pc:sldMkLst>
-          <pc:docMk/>
-          <pc:sldMk cId="1569096513" sldId="318"/>
-        </pc:sldMkLst>
-      </pc:sldChg>
-    </pc:docChg>
-  </pc:docChgLst>
-  <pc:docChgLst>
-    <pc:chgData clId="Web-{A569DFDF-03C5-4444-86DD-0C77AE245AAE}"/>
-    <pc:docChg chg="modSld">
-      <pc:chgData name="" userId="" providerId="" clId="Web-{A569DFDF-03C5-4444-86DD-0C77AE245AAE}" dt="2019-07-05T07:04:46.608" v="98" actId="20577"/>
-      <pc:docMkLst>
-        <pc:docMk/>
-      </pc:docMkLst>
-      <pc:sldChg chg="modSp">
-        <pc:chgData name="" userId="" providerId="" clId="Web-{A569DFDF-03C5-4444-86DD-0C77AE245AAE}" dt="2019-07-05T07:04:46.608" v="97" actId="20577"/>
-        <pc:sldMkLst>
-          <pc:docMk/>
-          <pc:sldMk cId="3479937383" sldId="260"/>
-        </pc:sldMkLst>
-        <pc:spChg chg="mod">
-          <ac:chgData name="" userId="" providerId="" clId="Web-{A569DFDF-03C5-4444-86DD-0C77AE245AAE}" dt="2019-07-05T07:04:46.608" v="97" actId="20577"/>
-          <ac:spMkLst>
-            <pc:docMk/>
-            <pc:sldMk cId="3479937383" sldId="260"/>
-            <ac:spMk id="3" creationId="{A006BD29-4002-41F9-ACEC-5CD14C05D00B}"/>
-          </ac:spMkLst>
-        </pc:spChg>
-      </pc:sldChg>
-      <pc:sldChg chg="modSp">
-        <pc:chgData name="" userId="" providerId="" clId="Web-{A569DFDF-03C5-4444-86DD-0C77AE245AAE}" dt="2019-07-05T07:02:40.450" v="51" actId="20577"/>
-        <pc:sldMkLst>
-          <pc:docMk/>
-          <pc:sldMk cId="1378607874" sldId="261"/>
-        </pc:sldMkLst>
-        <pc:spChg chg="mod">
-          <ac:chgData name="" userId="" providerId="" clId="Web-{A569DFDF-03C5-4444-86DD-0C77AE245AAE}" dt="2019-07-05T07:02:40.450" v="51" actId="20577"/>
-          <ac:spMkLst>
-            <pc:docMk/>
-            <pc:sldMk cId="1378607874" sldId="261"/>
-            <ac:spMk id="3" creationId="{A006BD29-4002-41F9-ACEC-5CD14C05D00B}"/>
-          </ac:spMkLst>
-        </pc:spChg>
-      </pc:sldChg>
-    </pc:docChg>
-  </pc:docChgLst>
-  <pc:docChgLst>
-    <pc:chgData clId="Web-{3AC23917-2B73-4D43-8DF5-C2CA22EE809D}"/>
-    <pc:docChg chg="modSld">
-      <pc:chgData name="" userId="" providerId="" clId="Web-{3AC23917-2B73-4D43-8DF5-C2CA22EE809D}" dt="2019-08-22T13:03:57.144" v="29" actId="20577"/>
-      <pc:docMkLst>
-        <pc:docMk/>
-      </pc:docMkLst>
-      <pc:sldChg chg="modSp">
-        <pc:chgData name="" userId="" providerId="" clId="Web-{3AC23917-2B73-4D43-8DF5-C2CA22EE809D}" dt="2019-08-22T13:03:57.144" v="28" actId="20577"/>
-        <pc:sldMkLst>
-          <pc:docMk/>
-          <pc:sldMk cId="966716395" sldId="271"/>
-        </pc:sldMkLst>
-        <pc:spChg chg="mod">
-          <ac:chgData name="" userId="" providerId="" clId="Web-{3AC23917-2B73-4D43-8DF5-C2CA22EE809D}" dt="2019-08-22T13:03:57.144" v="28" actId="20577"/>
-          <ac:spMkLst>
-            <pc:docMk/>
-            <pc:sldMk cId="966716395" sldId="271"/>
-            <ac:spMk id="3" creationId="{C149E1D9-0167-4CC4-A969-6A11A6A02303}"/>
-          </ac:spMkLst>
-        </pc:spChg>
-      </pc:sldChg>
-    </pc:docChg>
-  </pc:docChgLst>
-  <pc:docChgLst>
-    <pc:chgData clId="Web-{F0BFF7F1-6BD8-4E81-B7FC-6BB18F77546B}"/>
-    <pc:docChg chg="modSld">
-      <pc:chgData name="" userId="" providerId="" clId="Web-{F0BFF7F1-6BD8-4E81-B7FC-6BB18F77546B}" dt="2019-08-19T13:12:13.789" v="215" actId="20577"/>
-      <pc:docMkLst>
-        <pc:docMk/>
-      </pc:docMkLst>
-      <pc:sldChg chg="modSp">
-        <pc:chgData name="" userId="" providerId="" clId="Web-{F0BFF7F1-6BD8-4E81-B7FC-6BB18F77546B}" dt="2019-08-19T12:45:29.695" v="47" actId="20577"/>
-        <pc:sldMkLst>
-          <pc:docMk/>
-          <pc:sldMk cId="3328933052" sldId="270"/>
-        </pc:sldMkLst>
-        <pc:spChg chg="mod">
-          <ac:chgData name="" userId="" providerId="" clId="Web-{F0BFF7F1-6BD8-4E81-B7FC-6BB18F77546B}" dt="2019-08-19T12:45:29.695" v="47" actId="20577"/>
-          <ac:spMkLst>
-            <pc:docMk/>
-            <pc:sldMk cId="3328933052" sldId="270"/>
-            <ac:spMk id="3" creationId="{E0CD0271-3469-4097-8AEA-CCD26647543D}"/>
-          </ac:spMkLst>
-        </pc:spChg>
-      </pc:sldChg>
-      <pc:sldChg chg="modSp">
-        <pc:chgData name="" userId="" providerId="" clId="Web-{F0BFF7F1-6BD8-4E81-B7FC-6BB18F77546B}" dt="2019-08-19T12:48:47.887" v="87" actId="20577"/>
-        <pc:sldMkLst>
-          <pc:docMk/>
-          <pc:sldMk cId="966716395" sldId="271"/>
-        </pc:sldMkLst>
-        <pc:spChg chg="mod">
-          <ac:chgData name="" userId="" providerId="" clId="Web-{F0BFF7F1-6BD8-4E81-B7FC-6BB18F77546B}" dt="2019-08-19T12:48:47.887" v="87" actId="20577"/>
-          <ac:spMkLst>
-            <pc:docMk/>
-            <pc:sldMk cId="966716395" sldId="271"/>
-            <ac:spMk id="3" creationId="{C149E1D9-0167-4CC4-A969-6A11A6A02303}"/>
-          </ac:spMkLst>
-        </pc:spChg>
-      </pc:sldChg>
-      <pc:sldChg chg="modSp">
-        <pc:chgData name="" userId="" providerId="" clId="Web-{F0BFF7F1-6BD8-4E81-B7FC-6BB18F77546B}" dt="2019-08-19T12:49:20.778" v="97" actId="20577"/>
-        <pc:sldMkLst>
-          <pc:docMk/>
-          <pc:sldMk cId="3070959357" sldId="272"/>
-        </pc:sldMkLst>
-        <pc:spChg chg="mod">
-          <ac:chgData name="" userId="" providerId="" clId="Web-{F0BFF7F1-6BD8-4E81-B7FC-6BB18F77546B}" dt="2019-08-19T12:49:20.778" v="97" actId="20577"/>
-          <ac:spMkLst>
-            <pc:docMk/>
-            <pc:sldMk cId="3070959357" sldId="272"/>
-            <ac:spMk id="3" creationId="{6C6F7F10-0B9F-4179-A277-EADC18422038}"/>
-          </ac:spMkLst>
-        </pc:spChg>
-      </pc:sldChg>
-      <pc:sldChg chg="modSp">
-        <pc:chgData name="" userId="" providerId="" clId="Web-{F0BFF7F1-6BD8-4E81-B7FC-6BB18F77546B}" dt="2019-08-19T12:50:10.076" v="101" actId="20577"/>
-        <pc:sldMkLst>
-          <pc:docMk/>
-          <pc:sldMk cId="187791988" sldId="273"/>
-        </pc:sldMkLst>
-        <pc:spChg chg="mod">
-          <ac:chgData name="" userId="" providerId="" clId="Web-{F0BFF7F1-6BD8-4E81-B7FC-6BB18F77546B}" dt="2019-08-19T12:50:10.076" v="101" actId="20577"/>
-          <ac:spMkLst>
-            <pc:docMk/>
-            <pc:sldMk cId="187791988" sldId="273"/>
-            <ac:spMk id="3" creationId="{20EEFEFC-40F2-4E14-83A1-B664E911CB99}"/>
-          </ac:spMkLst>
-        </pc:spChg>
-      </pc:sldChg>
-      <pc:sldChg chg="modSp">
-        <pc:chgData name="" userId="" providerId="" clId="Web-{F0BFF7F1-6BD8-4E81-B7FC-6BB18F77546B}" dt="2019-08-19T12:52:03.656" v="129" actId="20577"/>
-        <pc:sldMkLst>
-          <pc:docMk/>
-          <pc:sldMk cId="4205077524" sldId="274"/>
-        </pc:sldMkLst>
-        <pc:spChg chg="mod">
-          <ac:chgData name="" userId="" providerId="" clId="Web-{F0BFF7F1-6BD8-4E81-B7FC-6BB18F77546B}" dt="2019-08-19T12:52:03.656" v="129" actId="20577"/>
-          <ac:spMkLst>
-            <pc:docMk/>
-            <pc:sldMk cId="4205077524" sldId="274"/>
-            <ac:spMk id="3" creationId="{C149E1D9-0167-4CC4-A969-6A11A6A02303}"/>
-          </ac:spMkLst>
-        </pc:spChg>
-      </pc:sldChg>
-      <pc:sldChg chg="modSp">
-        <pc:chgData name="" userId="" providerId="" clId="Web-{F0BFF7F1-6BD8-4E81-B7FC-6BB18F77546B}" dt="2019-08-19T12:55:23.675" v="152" actId="20577"/>
-        <pc:sldMkLst>
-          <pc:docMk/>
-          <pc:sldMk cId="998402309" sldId="275"/>
-        </pc:sldMkLst>
-        <pc:spChg chg="mod">
-          <ac:chgData name="" userId="" providerId="" clId="Web-{F0BFF7F1-6BD8-4E81-B7FC-6BB18F77546B}" dt="2019-08-19T12:55:23.675" v="152" actId="20577"/>
-          <ac:spMkLst>
-            <pc:docMk/>
-            <pc:sldMk cId="998402309" sldId="275"/>
-            <ac:spMk id="3" creationId="{514C4D4A-546B-4399-AD4C-643FF21D65FE}"/>
-          </ac:spMkLst>
-        </pc:spChg>
-      </pc:sldChg>
-      <pc:sldChg chg="modSp">
-        <pc:chgData name="" userId="" providerId="" clId="Web-{F0BFF7F1-6BD8-4E81-B7FC-6BB18F77546B}" dt="2019-08-19T12:57:13.396" v="166" actId="20577"/>
-        <pc:sldMkLst>
-          <pc:docMk/>
-          <pc:sldMk cId="1666642885" sldId="278"/>
-        </pc:sldMkLst>
-        <pc:spChg chg="mod">
-          <ac:chgData name="" userId="" providerId="" clId="Web-{F0BFF7F1-6BD8-4E81-B7FC-6BB18F77546B}" dt="2019-08-19T12:57:13.396" v="166" actId="20577"/>
-          <ac:spMkLst>
-            <pc:docMk/>
-            <pc:sldMk cId="1666642885" sldId="278"/>
-            <ac:spMk id="3" creationId="{C149E1D9-0167-4CC4-A969-6A11A6A02303}"/>
-          </ac:spMkLst>
-        </pc:spChg>
-      </pc:sldChg>
-      <pc:sldChg chg="modSp">
-        <pc:chgData name="" userId="" providerId="" clId="Web-{F0BFF7F1-6BD8-4E81-B7FC-6BB18F77546B}" dt="2019-08-19T12:57:30.115" v="178" actId="20577"/>
-        <pc:sldMkLst>
-          <pc:docMk/>
-          <pc:sldMk cId="378540045" sldId="281"/>
-        </pc:sldMkLst>
-        <pc:spChg chg="mod">
-          <ac:chgData name="" userId="" providerId="" clId="Web-{F0BFF7F1-6BD8-4E81-B7FC-6BB18F77546B}" dt="2019-08-19T12:57:30.115" v="178" actId="20577"/>
-          <ac:spMkLst>
-            <pc:docMk/>
-            <pc:sldMk cId="378540045" sldId="281"/>
-            <ac:spMk id="3" creationId="{C0C7CCA2-21D3-414F-8991-FF7195AB442C}"/>
-          </ac:spMkLst>
-        </pc:spChg>
-      </pc:sldChg>
-      <pc:sldChg chg="modSp">
-        <pc:chgData name="" userId="" providerId="" clId="Web-{F0BFF7F1-6BD8-4E81-B7FC-6BB18F77546B}" dt="2019-08-19T12:58:41.976" v="208" actId="20577"/>
-        <pc:sldMkLst>
-          <pc:docMk/>
-          <pc:sldMk cId="1454178254" sldId="283"/>
-        </pc:sldMkLst>
-        <pc:spChg chg="mod">
-          <ac:chgData name="" userId="" providerId="" clId="Web-{F0BFF7F1-6BD8-4E81-B7FC-6BB18F77546B}" dt="2019-08-19T12:58:41.976" v="208" actId="20577"/>
-          <ac:spMkLst>
-            <pc:docMk/>
-            <pc:sldMk cId="1454178254" sldId="283"/>
-            <ac:spMk id="3" creationId="{C82B7E5E-81F5-4F0B-82FD-802385CD9A10}"/>
-          </ac:spMkLst>
-        </pc:spChg>
-      </pc:sldChg>
-      <pc:sldChg chg="modSp">
-        <pc:chgData name="" userId="" providerId="" clId="Web-{F0BFF7F1-6BD8-4E81-B7FC-6BB18F77546B}" dt="2019-08-19T12:59:03.180" v="212" actId="20577"/>
-        <pc:sldMkLst>
-          <pc:docMk/>
-          <pc:sldMk cId="4255218620" sldId="285"/>
-        </pc:sldMkLst>
-        <pc:spChg chg="mod">
-          <ac:chgData name="" userId="" providerId="" clId="Web-{F0BFF7F1-6BD8-4E81-B7FC-6BB18F77546B}" dt="2019-08-19T12:59:03.180" v="212" actId="20577"/>
-          <ac:spMkLst>
-            <pc:docMk/>
-            <pc:sldMk cId="4255218620" sldId="285"/>
-            <ac:spMk id="2" creationId="{F83BBECD-EB90-468B-98D0-E319EE7E656C}"/>
-          </ac:spMkLst>
-        </pc:spChg>
-      </pc:sldChg>
-      <pc:sldChg chg="modSp">
-        <pc:chgData name="" userId="" providerId="" clId="Web-{F0BFF7F1-6BD8-4E81-B7FC-6BB18F77546B}" dt="2019-08-19T13:05:54.797" v="213" actId="20577"/>
-        <pc:sldMkLst>
-          <pc:docMk/>
-          <pc:sldMk cId="1373132171" sldId="310"/>
-        </pc:sldMkLst>
-        <pc:spChg chg="mod">
-          <ac:chgData name="" userId="" providerId="" clId="Web-{F0BFF7F1-6BD8-4E81-B7FC-6BB18F77546B}" dt="2019-08-19T13:05:54.797" v="213" actId="20577"/>
+          <ac:chgData name="" userId="" providerId="" clId="Web-{3BDB32A4-44BF-4B18-AD2D-2476B2076494}" dt="2019-08-28T11:10:17.224" v="65" actId="20577"/>
           <ac:spMkLst>
             <pc:docMk/>
             <pc:sldMk cId="1373132171" sldId="310"/>
@@ -1802,26 +466,232 @@
     </pc:docChg>
   </pc:docChgLst>
   <pc:docChgLst>
-    <pc:chgData clId="Web-{6DCBF5AE-E51D-4505-97CC-4E7605712290}"/>
-    <pc:docChg chg="modSld">
-      <pc:chgData name="" userId="" providerId="" clId="Web-{6DCBF5AE-E51D-4505-97CC-4E7605712290}" dt="2019-08-21T07:24:30.770" v="75" actId="20577"/>
+    <pc:chgData clId="Web-{1F33DF1F-02C2-4CE1-9605-3D6DB7F96B98}"/>
+    <pc:docChg chg="addSld modSld sldOrd">
+      <pc:chgData name="" userId="" providerId="" clId="Web-{1F33DF1F-02C2-4CE1-9605-3D6DB7F96B98}" dt="2019-08-22T11:24:46.155" v="356" actId="1076"/>
       <pc:docMkLst>
         <pc:docMk/>
       </pc:docMkLst>
       <pc:sldChg chg="modSp">
-        <pc:chgData name="" userId="" providerId="" clId="Web-{6DCBF5AE-E51D-4505-97CC-4E7605712290}" dt="2019-08-21T07:24:30.770" v="74" actId="20577"/>
+        <pc:chgData name="" userId="" providerId="" clId="Web-{1F33DF1F-02C2-4CE1-9605-3D6DB7F96B98}" dt="2019-08-22T10:53:16.447" v="68" actId="20577"/>
         <pc:sldMkLst>
           <pc:docMk/>
-          <pc:sldMk cId="3978066937" sldId="300"/>
+          <pc:sldMk cId="3234635994" sldId="266"/>
         </pc:sldMkLst>
         <pc:spChg chg="mod">
-          <ac:chgData name="" userId="" providerId="" clId="Web-{6DCBF5AE-E51D-4505-97CC-4E7605712290}" dt="2019-08-21T07:24:30.770" v="74" actId="20577"/>
+          <ac:chgData name="" userId="" providerId="" clId="Web-{1F33DF1F-02C2-4CE1-9605-3D6DB7F96B98}" dt="2019-08-22T10:53:16.447" v="68" actId="20577"/>
           <ac:spMkLst>
             <pc:docMk/>
-            <pc:sldMk cId="3978066937" sldId="300"/>
-            <ac:spMk id="3" creationId="{728EBFD4-F2E5-4986-A25B-5DB6C2B3245C}"/>
+            <pc:sldMk cId="3234635994" sldId="266"/>
+            <ac:spMk id="3" creationId="{62B993F5-9F21-4EFE-A5D9-D7F71AC75C49}"/>
           </ac:spMkLst>
         </pc:spChg>
+      </pc:sldChg>
+      <pc:sldChg chg="modSp">
+        <pc:chgData name="" userId="" providerId="" clId="Web-{1F33DF1F-02C2-4CE1-9605-3D6DB7F96B98}" dt="2019-08-22T10:45:56.223" v="52" actId="20577"/>
+        <pc:sldMkLst>
+          <pc:docMk/>
+          <pc:sldMk cId="966716395" sldId="271"/>
+        </pc:sldMkLst>
+        <pc:spChg chg="mod">
+          <ac:chgData name="" userId="" providerId="" clId="Web-{1F33DF1F-02C2-4CE1-9605-3D6DB7F96B98}" dt="2019-08-22T10:45:56.223" v="52" actId="20577"/>
+          <ac:spMkLst>
+            <pc:docMk/>
+            <pc:sldMk cId="966716395" sldId="271"/>
+            <ac:spMk id="3" creationId="{C149E1D9-0167-4CC4-A969-6A11A6A02303}"/>
+          </ac:spMkLst>
+        </pc:spChg>
+      </pc:sldChg>
+      <pc:sldChg chg="addSp delSp modSp new ord addCm delCm">
+        <pc:chgData name="" userId="" providerId="" clId="Web-{1F33DF1F-02C2-4CE1-9605-3D6DB7F96B98}" dt="2019-08-22T11:24:46.155" v="356" actId="1076"/>
+        <pc:sldMkLst>
+          <pc:docMk/>
+          <pc:sldMk cId="1838952640" sldId="316"/>
+        </pc:sldMkLst>
+        <pc:spChg chg="mod">
+          <ac:chgData name="" userId="" providerId="" clId="Web-{1F33DF1F-02C2-4CE1-9605-3D6DB7F96B98}" dt="2019-08-22T10:59:23.772" v="75" actId="20577"/>
+          <ac:spMkLst>
+            <pc:docMk/>
+            <pc:sldMk cId="1838952640" sldId="316"/>
+            <ac:spMk id="2" creationId="{9F87F0E9-B781-4373-98D4-81A9DB8E3300}"/>
+          </ac:spMkLst>
+        </pc:spChg>
+        <pc:spChg chg="del">
+          <ac:chgData name="" userId="" providerId="" clId="Web-{1F33DF1F-02C2-4CE1-9605-3D6DB7F96B98}" dt="2019-08-22T10:59:56.027" v="76"/>
+          <ac:spMkLst>
+            <pc:docMk/>
+            <pc:sldMk cId="1838952640" sldId="316"/>
+            <ac:spMk id="3" creationId="{B730D6D3-6DFD-42FA-8D34-ED853CF97753}"/>
+          </ac:spMkLst>
+        </pc:spChg>
+        <pc:spChg chg="add mod">
+          <ac:chgData name="" userId="" providerId="" clId="Web-{1F33DF1F-02C2-4CE1-9605-3D6DB7F96B98}" dt="2019-08-22T11:24:09.123" v="352" actId="1076"/>
+          <ac:spMkLst>
+            <pc:docMk/>
+            <pc:sldMk cId="1838952640" sldId="316"/>
+            <ac:spMk id="12" creationId="{7833296D-7095-44D3-933F-2E57FF032AA2}"/>
+          </ac:spMkLst>
+        </pc:spChg>
+        <pc:spChg chg="add mod">
+          <ac:chgData name="" userId="" providerId="" clId="Web-{1F33DF1F-02C2-4CE1-9605-3D6DB7F96B98}" dt="2019-08-22T11:24:29.561" v="354" actId="1076"/>
+          <ac:spMkLst>
+            <pc:docMk/>
+            <pc:sldMk cId="1838952640" sldId="316"/>
+            <ac:spMk id="13" creationId="{FD0A13B8-520C-4B82-BA74-20CB66405A76}"/>
+          </ac:spMkLst>
+        </pc:spChg>
+        <pc:spChg chg="add mod">
+          <ac:chgData name="" userId="" providerId="" clId="Web-{1F33DF1F-02C2-4CE1-9605-3D6DB7F96B98}" dt="2019-08-22T11:24:37.842" v="355" actId="1076"/>
+          <ac:spMkLst>
+            <pc:docMk/>
+            <pc:sldMk cId="1838952640" sldId="316"/>
+            <ac:spMk id="18" creationId="{13D850EF-90BA-4024-B9FE-EB1EA3DD5BF1}"/>
+          </ac:spMkLst>
+        </pc:spChg>
+        <pc:spChg chg="add mod">
+          <ac:chgData name="" userId="" providerId="" clId="Web-{1F33DF1F-02C2-4CE1-9605-3D6DB7F96B98}" dt="2019-08-22T11:24:46.155" v="356" actId="1076"/>
+          <ac:spMkLst>
+            <pc:docMk/>
+            <pc:sldMk cId="1838952640" sldId="316"/>
+            <ac:spMk id="19" creationId="{D194AF9F-B19C-42F8-BE64-53E45E39A082}"/>
+          </ac:spMkLst>
+        </pc:spChg>
+        <pc:spChg chg="add mod">
+          <ac:chgData name="" userId="" providerId="" clId="Web-{1F33DF1F-02C2-4CE1-9605-3D6DB7F96B98}" dt="2019-08-22T11:20:36.167" v="314" actId="1076"/>
+          <ac:spMkLst>
+            <pc:docMk/>
+            <pc:sldMk cId="1838952640" sldId="316"/>
+            <ac:spMk id="20" creationId="{225A791F-7354-4FDF-B68F-EA473114B50E}"/>
+          </ac:spMkLst>
+        </pc:spChg>
+        <pc:spChg chg="add mod">
+          <ac:chgData name="" userId="" providerId="" clId="Web-{1F33DF1F-02C2-4CE1-9605-3D6DB7F96B98}" dt="2019-08-22T11:23:40.967" v="339" actId="1076"/>
+          <ac:spMkLst>
+            <pc:docMk/>
+            <pc:sldMk cId="1838952640" sldId="316"/>
+            <ac:spMk id="21" creationId="{F15BE417-642B-4BD3-9932-77DE9FEB6A07}"/>
+          </ac:spMkLst>
+        </pc:spChg>
+        <pc:spChg chg="add mod">
+          <ac:chgData name="" userId="" providerId="" clId="Web-{1F33DF1F-02C2-4CE1-9605-3D6DB7F96B98}" dt="2019-08-22T11:20:27.324" v="305" actId="1076"/>
+          <ac:spMkLst>
+            <pc:docMk/>
+            <pc:sldMk cId="1838952640" sldId="316"/>
+            <ac:spMk id="24" creationId="{4298D746-95F7-40F0-A866-F217C5B21772}"/>
+          </ac:spMkLst>
+        </pc:spChg>
+        <pc:spChg chg="add mod ord">
+          <ac:chgData name="" userId="" providerId="" clId="Web-{1F33DF1F-02C2-4CE1-9605-3D6DB7F96B98}" dt="2019-08-22T11:20:27.308" v="303" actId="1076"/>
+          <ac:spMkLst>
+            <pc:docMk/>
+            <pc:sldMk cId="1838952640" sldId="316"/>
+            <ac:spMk id="25" creationId="{8F4C63AA-0A29-4F7A-96D2-1231B676AFE2}"/>
+          </ac:spMkLst>
+        </pc:spChg>
+        <pc:spChg chg="add del mod">
+          <ac:chgData name="" userId="" providerId="" clId="Web-{1F33DF1F-02C2-4CE1-9605-3D6DB7F96B98}" dt="2019-08-22T11:23:32.873" v="338"/>
+          <ac:spMkLst>
+            <pc:docMk/>
+            <pc:sldMk cId="1838952640" sldId="316"/>
+            <ac:spMk id="31" creationId="{F9320373-FD54-44EA-B12B-2262FAF76ABF}"/>
+          </ac:spMkLst>
+        </pc:spChg>
+        <pc:graphicFrameChg chg="add del modGraphic">
+          <ac:chgData name="" userId="" providerId="" clId="Web-{1F33DF1F-02C2-4CE1-9605-3D6DB7F96B98}" dt="2019-08-22T11:03:35.472" v="126"/>
+          <ac:graphicFrameMkLst>
+            <pc:docMk/>
+            <pc:sldMk cId="1838952640" sldId="316"/>
+            <ac:graphicFrameMk id="14" creationId="{F9FF5AC7-14A4-4B98-85C3-2A3636873CC8}"/>
+          </ac:graphicFrameMkLst>
+        </pc:graphicFrameChg>
+        <pc:picChg chg="add mod ord">
+          <ac:chgData name="" userId="" providerId="" clId="Web-{1F33DF1F-02C2-4CE1-9605-3D6DB7F96B98}" dt="2019-08-22T11:20:36.089" v="306" actId="1076"/>
+          <ac:picMkLst>
+            <pc:docMk/>
+            <pc:sldMk cId="1838952640" sldId="316"/>
+            <ac:picMk id="5" creationId="{88400B42-C49B-4719-92CB-A66B6368B815}"/>
+          </ac:picMkLst>
+        </pc:picChg>
+        <pc:picChg chg="add mod">
+          <ac:chgData name="" userId="" providerId="" clId="Web-{1F33DF1F-02C2-4CE1-9605-3D6DB7F96B98}" dt="2019-08-22T11:20:36.105" v="307" actId="1076"/>
+          <ac:picMkLst>
+            <pc:docMk/>
+            <pc:sldMk cId="1838952640" sldId="316"/>
+            <ac:picMk id="8" creationId="{DAD79ACD-8CC1-4512-84CA-A0CEF50D6A16}"/>
+          </ac:picMkLst>
+        </pc:picChg>
+        <pc:picChg chg="add mod">
+          <ac:chgData name="" userId="" providerId="" clId="Web-{1F33DF1F-02C2-4CE1-9605-3D6DB7F96B98}" dt="2019-08-22T11:20:36.121" v="308" actId="1076"/>
+          <ac:picMkLst>
+            <pc:docMk/>
+            <pc:sldMk cId="1838952640" sldId="316"/>
+            <ac:picMk id="10" creationId="{E07B398C-FBAE-476D-9518-410DE04C5A6C}"/>
+          </ac:picMkLst>
+        </pc:picChg>
+        <pc:picChg chg="add mod">
+          <ac:chgData name="" userId="" providerId="" clId="Web-{1F33DF1F-02C2-4CE1-9605-3D6DB7F96B98}" dt="2019-08-22T11:20:36.121" v="309" actId="1076"/>
+          <ac:picMkLst>
+            <pc:docMk/>
+            <pc:sldMk cId="1838952640" sldId="316"/>
+            <ac:picMk id="11" creationId="{CD981891-6F07-4B0B-BBFD-9020869EB112}"/>
+          </ac:picMkLst>
+        </pc:picChg>
+        <pc:picChg chg="add del">
+          <ac:chgData name="" userId="" providerId="" clId="Web-{1F33DF1F-02C2-4CE1-9605-3D6DB7F96B98}" dt="2019-08-22T11:03:37.925" v="127"/>
+          <ac:picMkLst>
+            <pc:docMk/>
+            <pc:sldMk cId="1838952640" sldId="316"/>
+            <ac:picMk id="17" creationId="{7F322FB4-A9B4-458B-B1F6-8D19A8485443}"/>
+          </ac:picMkLst>
+        </pc:picChg>
+        <pc:picChg chg="add mod">
+          <ac:chgData name="" userId="" providerId="" clId="Web-{1F33DF1F-02C2-4CE1-9605-3D6DB7F96B98}" dt="2019-08-22T11:20:27.308" v="304" actId="1076"/>
+          <ac:picMkLst>
+            <pc:docMk/>
+            <pc:sldMk cId="1838952640" sldId="316"/>
+            <ac:picMk id="22" creationId="{13CF3A24-4034-4B4C-ADC8-A17711649278}"/>
+          </ac:picMkLst>
+        </pc:picChg>
+        <pc:cxnChg chg="add del mod">
+          <ac:chgData name="" userId="" providerId="" clId="Web-{1F33DF1F-02C2-4CE1-9605-3D6DB7F96B98}" dt="2019-08-22T11:19:43.136" v="299"/>
+          <ac:cxnSpMkLst>
+            <pc:docMk/>
+            <pc:sldMk cId="1838952640" sldId="316"/>
+            <ac:cxnSpMk id="26" creationId="{F76A074C-13F3-4CEB-A641-92AB1E505739}"/>
+          </ac:cxnSpMkLst>
+        </pc:cxnChg>
+        <pc:cxnChg chg="add del mod">
+          <ac:chgData name="" userId="" providerId="" clId="Web-{1F33DF1F-02C2-4CE1-9605-3D6DB7F96B98}" dt="2019-08-22T11:19:33.432" v="297"/>
+          <ac:cxnSpMkLst>
+            <pc:docMk/>
+            <pc:sldMk cId="1838952640" sldId="316"/>
+            <ac:cxnSpMk id="27" creationId="{8A5A7A6B-397C-4F4F-BA6E-AA9A7BC9A7ED}"/>
+          </ac:cxnSpMkLst>
+        </pc:cxnChg>
+        <pc:cxnChg chg="add mod">
+          <ac:chgData name="" userId="" providerId="" clId="Web-{1F33DF1F-02C2-4CE1-9605-3D6DB7F96B98}" dt="2019-08-22T11:21:52.013" v="323"/>
+          <ac:cxnSpMkLst>
+            <pc:docMk/>
+            <pc:sldMk cId="1838952640" sldId="316"/>
+            <ac:cxnSpMk id="28" creationId="{5D7B2E40-83A0-4D47-BD36-0F3F36C4FA73}"/>
+          </ac:cxnSpMkLst>
+        </pc:cxnChg>
+        <pc:cxnChg chg="add mod">
+          <ac:chgData name="" userId="" providerId="" clId="Web-{1F33DF1F-02C2-4CE1-9605-3D6DB7F96B98}" dt="2019-08-22T11:22:21.263" v="328"/>
+          <ac:cxnSpMkLst>
+            <pc:docMk/>
+            <pc:sldMk cId="1838952640" sldId="316"/>
+            <ac:cxnSpMk id="29" creationId="{9BB9F841-893B-43C4-B234-43599B65C2DF}"/>
+          </ac:cxnSpMkLst>
+        </pc:cxnChg>
+        <pc:cxnChg chg="add mod">
+          <ac:chgData name="" userId="" providerId="" clId="Web-{1F33DF1F-02C2-4CE1-9605-3D6DB7F96B98}" dt="2019-08-22T11:22:40.544" v="331" actId="14100"/>
+          <ac:cxnSpMkLst>
+            <pc:docMk/>
+            <pc:sldMk cId="1838952640" sldId="316"/>
+            <ac:cxnSpMk id="30" creationId="{6A65F830-058A-41CE-BFCB-3C20C0779BE3}"/>
+          </ac:cxnSpMkLst>
+        </pc:cxnChg>
       </pc:sldChg>
     </pc:docChg>
   </pc:docChgLst>
@@ -1946,70 +816,96 @@
     </pc:docChg>
   </pc:docChgLst>
   <pc:docChgLst>
-    <pc:chgData clId="Web-{CAB5EA10-C98D-43FC-B0A9-283D1C5EC0A1}"/>
+    <pc:chgData clId="Web-{DC4AA95C-7B93-4BE8-95B6-0CFE319605A9}"/>
     <pc:docChg chg="modSld">
-      <pc:chgData name="" userId="" providerId="" clId="Web-{CAB5EA10-C98D-43FC-B0A9-283D1C5EC0A1}" dt="2019-08-22T07:25:07.742" v="2"/>
+      <pc:chgData name="" userId="" providerId="" clId="Web-{DC4AA95C-7B93-4BE8-95B6-0CFE319605A9}" dt="2019-08-19T07:33:32.829" v="1" actId="14100"/>
       <pc:docMkLst>
         <pc:docMk/>
       </pc:docMkLst>
-      <pc:sldChg chg="modNotes">
-        <pc:chgData name="" userId="" providerId="" clId="Web-{CAB5EA10-C98D-43FC-B0A9-283D1C5EC0A1}" dt="2019-08-22T07:25:07.742" v="2"/>
+      <pc:sldChg chg="modSp">
+        <pc:chgData name="" userId="" providerId="" clId="Web-{DC4AA95C-7B93-4BE8-95B6-0CFE319605A9}" dt="2019-08-19T07:33:32.829" v="1" actId="14100"/>
         <pc:sldMkLst>
           <pc:docMk/>
           <pc:sldMk cId="119092984" sldId="302"/>
         </pc:sldMkLst>
+        <pc:graphicFrameChg chg="mod">
+          <ac:chgData name="" userId="" providerId="" clId="Web-{DC4AA95C-7B93-4BE8-95B6-0CFE319605A9}" dt="2019-08-19T07:33:32.829" v="1" actId="14100"/>
+          <ac:graphicFrameMkLst>
+            <pc:docMk/>
+            <pc:sldMk cId="119092984" sldId="302"/>
+            <ac:graphicFrameMk id="5" creationId="{00000000-0000-0000-0000-000000000000}"/>
+          </ac:graphicFrameMkLst>
+        </pc:graphicFrameChg>
       </pc:sldChg>
     </pc:docChg>
   </pc:docChgLst>
   <pc:docChgLst>
-    <pc:chgData clId="Web-{3BDB32A4-44BF-4B18-AD2D-2476B2076494}"/>
+    <pc:chgData clId="Web-{522F7EA5-CD5C-4A55-9D45-5F46260264D9}"/>
     <pc:docChg chg="modSld">
-      <pc:chgData name="" userId="" providerId="" clId="Web-{3BDB32A4-44BF-4B18-AD2D-2476B2076494}" dt="2019-08-28T11:17:37.951" v="82" actId="20577"/>
+      <pc:chgData name="" userId="" providerId="" clId="Web-{522F7EA5-CD5C-4A55-9D45-5F46260264D9}" dt="2019-08-21T08:39:36.975" v="1" actId="20577"/>
       <pc:docMkLst>
         <pc:docMk/>
       </pc:docMkLst>
       <pc:sldChg chg="modSp">
-        <pc:chgData name="" userId="" providerId="" clId="Web-{3BDB32A4-44BF-4B18-AD2D-2476B2076494}" dt="2019-08-28T11:02:02.746" v="0" actId="20577"/>
+        <pc:chgData name="" userId="" providerId="" clId="Web-{522F7EA5-CD5C-4A55-9D45-5F46260264D9}" dt="2019-08-21T08:39:36.975" v="1" actId="20577"/>
         <pc:sldMkLst>
           <pc:docMk/>
-          <pc:sldMk cId="3207592105" sldId="286"/>
+          <pc:sldMk cId="1475901908" sldId="312"/>
         </pc:sldMkLst>
         <pc:spChg chg="mod">
-          <ac:chgData name="" userId="" providerId="" clId="Web-{3BDB32A4-44BF-4B18-AD2D-2476B2076494}" dt="2019-08-28T11:02:02.746" v="0" actId="20577"/>
+          <ac:chgData name="" userId="" providerId="" clId="Web-{522F7EA5-CD5C-4A55-9D45-5F46260264D9}" dt="2019-08-21T08:39:36.975" v="1" actId="20577"/>
           <ac:spMkLst>
             <pc:docMk/>
-            <pc:sldMk cId="3207592105" sldId="286"/>
-            <ac:spMk id="3" creationId="{6F37C898-71FB-49D0-B973-D1785CEB0342}"/>
+            <pc:sldMk cId="1475901908" sldId="312"/>
+            <ac:spMk id="2" creationId="{473337D4-861B-4891-BE23-A7699364AEA6}"/>
           </ac:spMkLst>
         </pc:spChg>
       </pc:sldChg>
+    </pc:docChg>
+  </pc:docChgLst>
+  <pc:docChgLst>
+    <pc:chgData clId="Web-{737E9103-524B-4E08-85E9-1F1F785479AB}"/>
+    <pc:docChg chg="modSld">
+      <pc:chgData name="" userId="" providerId="" clId="Web-{737E9103-524B-4E08-85E9-1F1F785479AB}" dt="2019-08-27T11:57:52.289" v="29" actId="20577"/>
+      <pc:docMkLst>
+        <pc:docMk/>
+      </pc:docMkLst>
       <pc:sldChg chg="modSp">
-        <pc:chgData name="" userId="" providerId="" clId="Web-{3BDB32A4-44BF-4B18-AD2D-2476B2076494}" dt="2019-08-28T11:17:37.951" v="81" actId="20577"/>
+        <pc:chgData name="" userId="" providerId="" clId="Web-{737E9103-524B-4E08-85E9-1F1F785479AB}" dt="2019-08-27T11:57:52.289" v="28" actId="20577"/>
         <pc:sldMkLst>
           <pc:docMk/>
-          <pc:sldMk cId="399787957" sldId="293"/>
+          <pc:sldMk cId="3749470640" sldId="309"/>
         </pc:sldMkLst>
         <pc:spChg chg="mod">
-          <ac:chgData name="" userId="" providerId="" clId="Web-{3BDB32A4-44BF-4B18-AD2D-2476B2076494}" dt="2019-08-28T11:17:37.951" v="81" actId="20577"/>
+          <ac:chgData name="" userId="" providerId="" clId="Web-{737E9103-524B-4E08-85E9-1F1F785479AB}" dt="2019-08-27T11:57:52.289" v="28" actId="20577"/>
           <ac:spMkLst>
             <pc:docMk/>
-            <pc:sldMk cId="399787957" sldId="293"/>
+            <pc:sldMk cId="3749470640" sldId="309"/>
             <ac:spMk id="3" creationId="{48CD3CA2-4BA5-4026-972D-FC907156D6F4}"/>
           </ac:spMkLst>
         </pc:spChg>
       </pc:sldChg>
+    </pc:docChg>
+  </pc:docChgLst>
+  <pc:docChgLst>
+    <pc:chgData clId="Web-{4F9B48CE-7BB1-45E9-A185-4EA699965818}"/>
+    <pc:docChg chg="modSld">
+      <pc:chgData name="" userId="" providerId="" clId="Web-{4F9B48CE-7BB1-45E9-A185-4EA699965818}" dt="2019-08-28T13:56:40.012" v="11" actId="20577"/>
+      <pc:docMkLst>
+        <pc:docMk/>
+      </pc:docMkLst>
       <pc:sldChg chg="modSp">
-        <pc:chgData name="" userId="" providerId="" clId="Web-{3BDB32A4-44BF-4B18-AD2D-2476B2076494}" dt="2019-08-28T11:10:17.224" v="65" actId="20577"/>
+        <pc:chgData name="" userId="" providerId="" clId="Web-{4F9B48CE-7BB1-45E9-A185-4EA699965818}" dt="2019-08-28T13:56:40.012" v="10" actId="20577"/>
         <pc:sldMkLst>
           <pc:docMk/>
-          <pc:sldMk cId="1373132171" sldId="310"/>
+          <pc:sldMk cId="966716395" sldId="271"/>
         </pc:sldMkLst>
         <pc:spChg chg="mod">
-          <ac:chgData name="" userId="" providerId="" clId="Web-{3BDB32A4-44BF-4B18-AD2D-2476B2076494}" dt="2019-08-28T11:10:17.224" v="65" actId="20577"/>
+          <ac:chgData name="" userId="" providerId="" clId="Web-{4F9B48CE-7BB1-45E9-A185-4EA699965818}" dt="2019-08-28T13:56:40.012" v="10" actId="20577"/>
           <ac:spMkLst>
             <pc:docMk/>
-            <pc:sldMk cId="1373132171" sldId="310"/>
-            <ac:spMk id="3" creationId="{48CD3CA2-4BA5-4026-972D-FC907156D6F4}"/>
+            <pc:sldMk cId="966716395" sldId="271"/>
+            <ac:spMk id="3" creationId="{C149E1D9-0167-4CC4-A969-6A11A6A02303}"/>
           </ac:spMkLst>
         </pc:spChg>
       </pc:sldChg>
@@ -2049,6 +945,1110 @@
             <pc:docMk/>
             <pc:sldMk cId="3749470640" sldId="309"/>
             <ac:spMk id="3" creationId="{48CD3CA2-4BA5-4026-972D-FC907156D6F4}"/>
+          </ac:spMkLst>
+        </pc:spChg>
+      </pc:sldChg>
+    </pc:docChg>
+  </pc:docChgLst>
+  <pc:docChgLst>
+    <pc:chgData clId="Web-{610F10D9-7FD5-42A5-AABE-0DAB8F93D491}"/>
+    <pc:docChg chg="addSld modSld">
+      <pc:chgData name="" userId="" providerId="" clId="Web-{610F10D9-7FD5-42A5-AABE-0DAB8F93D491}" dt="2019-08-27T12:20:50.550" v="35" actId="20577"/>
+      <pc:docMkLst>
+        <pc:docMk/>
+      </pc:docMkLst>
+      <pc:sldChg chg="modSp">
+        <pc:chgData name="" userId="" providerId="" clId="Web-{610F10D9-7FD5-42A5-AABE-0DAB8F93D491}" dt="2019-08-27T12:18:13.219" v="10" actId="20577"/>
+        <pc:sldMkLst>
+          <pc:docMk/>
+          <pc:sldMk cId="3978066937" sldId="300"/>
+        </pc:sldMkLst>
+        <pc:spChg chg="mod">
+          <ac:chgData name="" userId="" providerId="" clId="Web-{610F10D9-7FD5-42A5-AABE-0DAB8F93D491}" dt="2019-08-27T12:18:13.219" v="10" actId="20577"/>
+          <ac:spMkLst>
+            <pc:docMk/>
+            <pc:sldMk cId="3978066937" sldId="300"/>
+            <ac:spMk id="3" creationId="{728EBFD4-F2E5-4986-A25B-5DB6C2B3245C}"/>
+          </ac:spMkLst>
+        </pc:spChg>
+      </pc:sldChg>
+      <pc:sldChg chg="modSp">
+        <pc:chgData name="" userId="" providerId="" clId="Web-{610F10D9-7FD5-42A5-AABE-0DAB8F93D491}" dt="2019-08-27T12:15:17.137" v="2" actId="20577"/>
+        <pc:sldMkLst>
+          <pc:docMk/>
+          <pc:sldMk cId="1373132171" sldId="310"/>
+        </pc:sldMkLst>
+        <pc:spChg chg="mod">
+          <ac:chgData name="" userId="" providerId="" clId="Web-{610F10D9-7FD5-42A5-AABE-0DAB8F93D491}" dt="2019-08-27T12:15:17.137" v="2" actId="20577"/>
+          <ac:spMkLst>
+            <pc:docMk/>
+            <pc:sldMk cId="1373132171" sldId="310"/>
+            <ac:spMk id="3" creationId="{48CD3CA2-4BA5-4026-972D-FC907156D6F4}"/>
+          </ac:spMkLst>
+        </pc:spChg>
+      </pc:sldChg>
+      <pc:sldChg chg="addSp delSp modSp new mod modClrScheme chgLayout">
+        <pc:chgData name="" userId="" providerId="" clId="Web-{610F10D9-7FD5-42A5-AABE-0DAB8F93D491}" dt="2019-08-27T12:20:50.550" v="35" actId="20577"/>
+        <pc:sldMkLst>
+          <pc:docMk/>
+          <pc:sldMk cId="3229540130" sldId="320"/>
+        </pc:sldMkLst>
+        <pc:spChg chg="mod ord">
+          <ac:chgData name="" userId="" providerId="" clId="Web-{610F10D9-7FD5-42A5-AABE-0DAB8F93D491}" dt="2019-08-27T12:20:50.550" v="35" actId="20577"/>
+          <ac:spMkLst>
+            <pc:docMk/>
+            <pc:sldMk cId="3229540130" sldId="320"/>
+            <ac:spMk id="2" creationId="{81EBA805-9FDF-4DF4-8D61-0E6E5F7C7E13}"/>
+          </ac:spMkLst>
+        </pc:spChg>
+        <pc:spChg chg="del mod ord">
+          <ac:chgData name="" userId="" providerId="" clId="Web-{610F10D9-7FD5-42A5-AABE-0DAB8F93D491}" dt="2019-08-27T12:19:07.001" v="27"/>
+          <ac:spMkLst>
+            <pc:docMk/>
+            <pc:sldMk cId="3229540130" sldId="320"/>
+            <ac:spMk id="3" creationId="{E8782563-C20C-46DC-A2B6-2B556489CB9C}"/>
+          </ac:spMkLst>
+        </pc:spChg>
+        <pc:spChg chg="del">
+          <ac:chgData name="" userId="" providerId="" clId="Web-{610F10D9-7FD5-42A5-AABE-0DAB8F93D491}" dt="2019-08-27T12:18:33.688" v="13"/>
+          <ac:spMkLst>
+            <pc:docMk/>
+            <pc:sldMk cId="3229540130" sldId="320"/>
+            <ac:spMk id="4" creationId="{A176ABB5-2394-45D4-A317-9EADFA142DD3}"/>
+          </ac:spMkLst>
+        </pc:spChg>
+        <pc:spChg chg="add del mod ord">
+          <ac:chgData name="" userId="" providerId="" clId="Web-{610F10D9-7FD5-42A5-AABE-0DAB8F93D491}" dt="2019-08-27T12:18:56.188" v="14"/>
+          <ac:spMkLst>
+            <pc:docMk/>
+            <pc:sldMk cId="3229540130" sldId="320"/>
+            <ac:spMk id="5" creationId="{C58EF393-BF56-4EA7-8AA6-8217A27B4243}"/>
+          </ac:spMkLst>
+        </pc:spChg>
+      </pc:sldChg>
+    </pc:docChg>
+  </pc:docChgLst>
+  <pc:docChgLst>
+    <pc:chgData clId="Web-{F0BFF7F1-6BD8-4E81-B7FC-6BB18F77546B}"/>
+    <pc:docChg chg="modSld">
+      <pc:chgData name="" userId="" providerId="" clId="Web-{F0BFF7F1-6BD8-4E81-B7FC-6BB18F77546B}" dt="2019-08-19T13:12:13.789" v="215" actId="20577"/>
+      <pc:docMkLst>
+        <pc:docMk/>
+      </pc:docMkLst>
+      <pc:sldChg chg="modSp">
+        <pc:chgData name="" userId="" providerId="" clId="Web-{F0BFF7F1-6BD8-4E81-B7FC-6BB18F77546B}" dt="2019-08-19T12:45:29.695" v="47" actId="20577"/>
+        <pc:sldMkLst>
+          <pc:docMk/>
+          <pc:sldMk cId="3328933052" sldId="270"/>
+        </pc:sldMkLst>
+        <pc:spChg chg="mod">
+          <ac:chgData name="" userId="" providerId="" clId="Web-{F0BFF7F1-6BD8-4E81-B7FC-6BB18F77546B}" dt="2019-08-19T12:45:29.695" v="47" actId="20577"/>
+          <ac:spMkLst>
+            <pc:docMk/>
+            <pc:sldMk cId="3328933052" sldId="270"/>
+            <ac:spMk id="3" creationId="{E0CD0271-3469-4097-8AEA-CCD26647543D}"/>
+          </ac:spMkLst>
+        </pc:spChg>
+      </pc:sldChg>
+      <pc:sldChg chg="modSp">
+        <pc:chgData name="" userId="" providerId="" clId="Web-{F0BFF7F1-6BD8-4E81-B7FC-6BB18F77546B}" dt="2019-08-19T12:48:47.887" v="87" actId="20577"/>
+        <pc:sldMkLst>
+          <pc:docMk/>
+          <pc:sldMk cId="966716395" sldId="271"/>
+        </pc:sldMkLst>
+        <pc:spChg chg="mod">
+          <ac:chgData name="" userId="" providerId="" clId="Web-{F0BFF7F1-6BD8-4E81-B7FC-6BB18F77546B}" dt="2019-08-19T12:48:47.887" v="87" actId="20577"/>
+          <ac:spMkLst>
+            <pc:docMk/>
+            <pc:sldMk cId="966716395" sldId="271"/>
+            <ac:spMk id="3" creationId="{C149E1D9-0167-4CC4-A969-6A11A6A02303}"/>
+          </ac:spMkLst>
+        </pc:spChg>
+      </pc:sldChg>
+      <pc:sldChg chg="modSp">
+        <pc:chgData name="" userId="" providerId="" clId="Web-{F0BFF7F1-6BD8-4E81-B7FC-6BB18F77546B}" dt="2019-08-19T12:49:20.778" v="97" actId="20577"/>
+        <pc:sldMkLst>
+          <pc:docMk/>
+          <pc:sldMk cId="3070959357" sldId="272"/>
+        </pc:sldMkLst>
+        <pc:spChg chg="mod">
+          <ac:chgData name="" userId="" providerId="" clId="Web-{F0BFF7F1-6BD8-4E81-B7FC-6BB18F77546B}" dt="2019-08-19T12:49:20.778" v="97" actId="20577"/>
+          <ac:spMkLst>
+            <pc:docMk/>
+            <pc:sldMk cId="3070959357" sldId="272"/>
+            <ac:spMk id="3" creationId="{6C6F7F10-0B9F-4179-A277-EADC18422038}"/>
+          </ac:spMkLst>
+        </pc:spChg>
+      </pc:sldChg>
+      <pc:sldChg chg="modSp">
+        <pc:chgData name="" userId="" providerId="" clId="Web-{F0BFF7F1-6BD8-4E81-B7FC-6BB18F77546B}" dt="2019-08-19T12:50:10.076" v="101" actId="20577"/>
+        <pc:sldMkLst>
+          <pc:docMk/>
+          <pc:sldMk cId="187791988" sldId="273"/>
+        </pc:sldMkLst>
+        <pc:spChg chg="mod">
+          <ac:chgData name="" userId="" providerId="" clId="Web-{F0BFF7F1-6BD8-4E81-B7FC-6BB18F77546B}" dt="2019-08-19T12:50:10.076" v="101" actId="20577"/>
+          <ac:spMkLst>
+            <pc:docMk/>
+            <pc:sldMk cId="187791988" sldId="273"/>
+            <ac:spMk id="3" creationId="{20EEFEFC-40F2-4E14-83A1-B664E911CB99}"/>
+          </ac:spMkLst>
+        </pc:spChg>
+      </pc:sldChg>
+      <pc:sldChg chg="modSp">
+        <pc:chgData name="" userId="" providerId="" clId="Web-{F0BFF7F1-6BD8-4E81-B7FC-6BB18F77546B}" dt="2019-08-19T12:52:03.656" v="129" actId="20577"/>
+        <pc:sldMkLst>
+          <pc:docMk/>
+          <pc:sldMk cId="4205077524" sldId="274"/>
+        </pc:sldMkLst>
+        <pc:spChg chg="mod">
+          <ac:chgData name="" userId="" providerId="" clId="Web-{F0BFF7F1-6BD8-4E81-B7FC-6BB18F77546B}" dt="2019-08-19T12:52:03.656" v="129" actId="20577"/>
+          <ac:spMkLst>
+            <pc:docMk/>
+            <pc:sldMk cId="4205077524" sldId="274"/>
+            <ac:spMk id="3" creationId="{C149E1D9-0167-4CC4-A969-6A11A6A02303}"/>
+          </ac:spMkLst>
+        </pc:spChg>
+      </pc:sldChg>
+      <pc:sldChg chg="modSp">
+        <pc:chgData name="" userId="" providerId="" clId="Web-{F0BFF7F1-6BD8-4E81-B7FC-6BB18F77546B}" dt="2019-08-19T12:55:23.675" v="152" actId="20577"/>
+        <pc:sldMkLst>
+          <pc:docMk/>
+          <pc:sldMk cId="998402309" sldId="275"/>
+        </pc:sldMkLst>
+        <pc:spChg chg="mod">
+          <ac:chgData name="" userId="" providerId="" clId="Web-{F0BFF7F1-6BD8-4E81-B7FC-6BB18F77546B}" dt="2019-08-19T12:55:23.675" v="152" actId="20577"/>
+          <ac:spMkLst>
+            <pc:docMk/>
+            <pc:sldMk cId="998402309" sldId="275"/>
+            <ac:spMk id="3" creationId="{514C4D4A-546B-4399-AD4C-643FF21D65FE}"/>
+          </ac:spMkLst>
+        </pc:spChg>
+      </pc:sldChg>
+      <pc:sldChg chg="modSp">
+        <pc:chgData name="" userId="" providerId="" clId="Web-{F0BFF7F1-6BD8-4E81-B7FC-6BB18F77546B}" dt="2019-08-19T12:57:13.396" v="166" actId="20577"/>
+        <pc:sldMkLst>
+          <pc:docMk/>
+          <pc:sldMk cId="1666642885" sldId="278"/>
+        </pc:sldMkLst>
+        <pc:spChg chg="mod">
+          <ac:chgData name="" userId="" providerId="" clId="Web-{F0BFF7F1-6BD8-4E81-B7FC-6BB18F77546B}" dt="2019-08-19T12:57:13.396" v="166" actId="20577"/>
+          <ac:spMkLst>
+            <pc:docMk/>
+            <pc:sldMk cId="1666642885" sldId="278"/>
+            <ac:spMk id="3" creationId="{C149E1D9-0167-4CC4-A969-6A11A6A02303}"/>
+          </ac:spMkLst>
+        </pc:spChg>
+      </pc:sldChg>
+      <pc:sldChg chg="modSp">
+        <pc:chgData name="" userId="" providerId="" clId="Web-{F0BFF7F1-6BD8-4E81-B7FC-6BB18F77546B}" dt="2019-08-19T12:57:30.115" v="178" actId="20577"/>
+        <pc:sldMkLst>
+          <pc:docMk/>
+          <pc:sldMk cId="378540045" sldId="281"/>
+        </pc:sldMkLst>
+        <pc:spChg chg="mod">
+          <ac:chgData name="" userId="" providerId="" clId="Web-{F0BFF7F1-6BD8-4E81-B7FC-6BB18F77546B}" dt="2019-08-19T12:57:30.115" v="178" actId="20577"/>
+          <ac:spMkLst>
+            <pc:docMk/>
+            <pc:sldMk cId="378540045" sldId="281"/>
+            <ac:spMk id="3" creationId="{C0C7CCA2-21D3-414F-8991-FF7195AB442C}"/>
+          </ac:spMkLst>
+        </pc:spChg>
+      </pc:sldChg>
+      <pc:sldChg chg="modSp">
+        <pc:chgData name="" userId="" providerId="" clId="Web-{F0BFF7F1-6BD8-4E81-B7FC-6BB18F77546B}" dt="2019-08-19T12:58:41.976" v="208" actId="20577"/>
+        <pc:sldMkLst>
+          <pc:docMk/>
+          <pc:sldMk cId="1454178254" sldId="283"/>
+        </pc:sldMkLst>
+        <pc:spChg chg="mod">
+          <ac:chgData name="" userId="" providerId="" clId="Web-{F0BFF7F1-6BD8-4E81-B7FC-6BB18F77546B}" dt="2019-08-19T12:58:41.976" v="208" actId="20577"/>
+          <ac:spMkLst>
+            <pc:docMk/>
+            <pc:sldMk cId="1454178254" sldId="283"/>
+            <ac:spMk id="3" creationId="{C82B7E5E-81F5-4F0B-82FD-802385CD9A10}"/>
+          </ac:spMkLst>
+        </pc:spChg>
+      </pc:sldChg>
+      <pc:sldChg chg="modSp">
+        <pc:chgData name="" userId="" providerId="" clId="Web-{F0BFF7F1-6BD8-4E81-B7FC-6BB18F77546B}" dt="2019-08-19T12:59:03.180" v="212" actId="20577"/>
+        <pc:sldMkLst>
+          <pc:docMk/>
+          <pc:sldMk cId="4255218620" sldId="285"/>
+        </pc:sldMkLst>
+        <pc:spChg chg="mod">
+          <ac:chgData name="" userId="" providerId="" clId="Web-{F0BFF7F1-6BD8-4E81-B7FC-6BB18F77546B}" dt="2019-08-19T12:59:03.180" v="212" actId="20577"/>
+          <ac:spMkLst>
+            <pc:docMk/>
+            <pc:sldMk cId="4255218620" sldId="285"/>
+            <ac:spMk id="2" creationId="{F83BBECD-EB90-468B-98D0-E319EE7E656C}"/>
+          </ac:spMkLst>
+        </pc:spChg>
+      </pc:sldChg>
+      <pc:sldChg chg="modSp">
+        <pc:chgData name="" userId="" providerId="" clId="Web-{F0BFF7F1-6BD8-4E81-B7FC-6BB18F77546B}" dt="2019-08-19T13:05:54.797" v="213" actId="20577"/>
+        <pc:sldMkLst>
+          <pc:docMk/>
+          <pc:sldMk cId="1373132171" sldId="310"/>
+        </pc:sldMkLst>
+        <pc:spChg chg="mod">
+          <ac:chgData name="" userId="" providerId="" clId="Web-{F0BFF7F1-6BD8-4E81-B7FC-6BB18F77546B}" dt="2019-08-19T13:05:54.797" v="213" actId="20577"/>
+          <ac:spMkLst>
+            <pc:docMk/>
+            <pc:sldMk cId="1373132171" sldId="310"/>
+            <ac:spMk id="3" creationId="{48CD3CA2-4BA5-4026-972D-FC907156D6F4}"/>
+          </ac:spMkLst>
+        </pc:spChg>
+      </pc:sldChg>
+    </pc:docChg>
+  </pc:docChgLst>
+  <pc:docChgLst>
+    <pc:chgData clId="Web-{EB1AC5F5-222D-4709-B6DA-A14B54B2B7AF}"/>
+    <pc:docChg chg="addSld delSld modSld sldOrd">
+      <pc:chgData name="" userId="" providerId="" clId="Web-{EB1AC5F5-222D-4709-B6DA-A14B54B2B7AF}" dt="2019-08-26T13:42:22.960" v="827"/>
+      <pc:docMkLst>
+        <pc:docMk/>
+      </pc:docMkLst>
+      <pc:sldChg chg="modSp">
+        <pc:chgData name="" userId="" providerId="" clId="Web-{EB1AC5F5-222D-4709-B6DA-A14B54B2B7AF}" dt="2019-08-26T13:41:25.287" v="812" actId="20577"/>
+        <pc:sldMkLst>
+          <pc:docMk/>
+          <pc:sldMk cId="2035881997" sldId="265"/>
+        </pc:sldMkLst>
+        <pc:spChg chg="mod">
+          <ac:chgData name="" userId="" providerId="" clId="Web-{EB1AC5F5-222D-4709-B6DA-A14B54B2B7AF}" dt="2019-08-26T13:41:25.287" v="812" actId="20577"/>
+          <ac:spMkLst>
+            <pc:docMk/>
+            <pc:sldMk cId="2035881997" sldId="265"/>
+            <ac:spMk id="3" creationId="{D4AA290F-7FB7-4412-8CC4-491ED552AC79}"/>
+          </ac:spMkLst>
+        </pc:spChg>
+      </pc:sldChg>
+      <pc:sldChg chg="modSp">
+        <pc:chgData name="" userId="" providerId="" clId="Web-{EB1AC5F5-222D-4709-B6DA-A14B54B2B7AF}" dt="2019-08-26T12:45:03.241" v="242" actId="1076"/>
+        <pc:sldMkLst>
+          <pc:docMk/>
+          <pc:sldMk cId="3328933052" sldId="270"/>
+        </pc:sldMkLst>
+        <pc:spChg chg="mod">
+          <ac:chgData name="" userId="" providerId="" clId="Web-{EB1AC5F5-222D-4709-B6DA-A14B54B2B7AF}" dt="2019-08-26T12:36:40.959" v="108" actId="20577"/>
+          <ac:spMkLst>
+            <pc:docMk/>
+            <pc:sldMk cId="3328933052" sldId="270"/>
+            <ac:spMk id="3" creationId="{E0CD0271-3469-4097-8AEA-CCD26647543D}"/>
+          </ac:spMkLst>
+        </pc:spChg>
+        <pc:picChg chg="mod">
+          <ac:chgData name="" userId="" providerId="" clId="Web-{EB1AC5F5-222D-4709-B6DA-A14B54B2B7AF}" dt="2019-08-26T12:45:03.241" v="242" actId="1076"/>
+          <ac:picMkLst>
+            <pc:docMk/>
+            <pc:sldMk cId="3328933052" sldId="270"/>
+            <ac:picMk id="8" creationId="{87F651EF-A4BF-4C7D-83FC-D13275264B6B}"/>
+          </ac:picMkLst>
+        </pc:picChg>
+      </pc:sldChg>
+      <pc:sldChg chg="modSp">
+        <pc:chgData name="" userId="" providerId="" clId="Web-{EB1AC5F5-222D-4709-B6DA-A14B54B2B7AF}" dt="2019-08-26T12:36:30.131" v="102" actId="20577"/>
+        <pc:sldMkLst>
+          <pc:docMk/>
+          <pc:sldMk cId="3070959357" sldId="272"/>
+        </pc:sldMkLst>
+        <pc:spChg chg="mod">
+          <ac:chgData name="" userId="" providerId="" clId="Web-{EB1AC5F5-222D-4709-B6DA-A14B54B2B7AF}" dt="2019-08-26T12:36:30.131" v="102" actId="20577"/>
+          <ac:spMkLst>
+            <pc:docMk/>
+            <pc:sldMk cId="3070959357" sldId="272"/>
+            <ac:spMk id="3" creationId="{6C6F7F10-0B9F-4179-A277-EADC18422038}"/>
+          </ac:spMkLst>
+        </pc:spChg>
+        <pc:picChg chg="mod">
+          <ac:chgData name="" userId="" providerId="" clId="Web-{EB1AC5F5-222D-4709-B6DA-A14B54B2B7AF}" dt="2019-08-26T12:36:14.677" v="97" actId="1076"/>
+          <ac:picMkLst>
+            <pc:docMk/>
+            <pc:sldMk cId="3070959357" sldId="272"/>
+            <ac:picMk id="5" creationId="{8F587FA8-F26E-409B-9520-54BE28459E0D}"/>
+          </ac:picMkLst>
+        </pc:picChg>
+      </pc:sldChg>
+      <pc:sldChg chg="modSp addAnim delAnim modAnim">
+        <pc:chgData name="" userId="" providerId="" clId="Web-{EB1AC5F5-222D-4709-B6DA-A14B54B2B7AF}" dt="2019-08-26T12:48:09.997" v="305" actId="20577"/>
+        <pc:sldMkLst>
+          <pc:docMk/>
+          <pc:sldMk cId="187791988" sldId="273"/>
+        </pc:sldMkLst>
+        <pc:spChg chg="mod">
+          <ac:chgData name="" userId="" providerId="" clId="Web-{EB1AC5F5-222D-4709-B6DA-A14B54B2B7AF}" dt="2019-08-26T12:48:09.997" v="305" actId="20577"/>
+          <ac:spMkLst>
+            <pc:docMk/>
+            <pc:sldMk cId="187791988" sldId="273"/>
+            <ac:spMk id="3" creationId="{20EEFEFC-40F2-4E14-83A1-B664E911CB99}"/>
+          </ac:spMkLst>
+        </pc:spChg>
+        <pc:picChg chg="mod">
+          <ac:chgData name="" userId="" providerId="" clId="Web-{EB1AC5F5-222D-4709-B6DA-A14B54B2B7AF}" dt="2019-08-26T12:44:56.459" v="241" actId="1076"/>
+          <ac:picMkLst>
+            <pc:docMk/>
+            <pc:sldMk cId="187791988" sldId="273"/>
+            <ac:picMk id="5" creationId="{00000000-0000-0000-0000-000000000000}"/>
+          </ac:picMkLst>
+        </pc:picChg>
+      </pc:sldChg>
+      <pc:sldChg chg="modSp">
+        <pc:chgData name="" userId="" providerId="" clId="Web-{EB1AC5F5-222D-4709-B6DA-A14B54B2B7AF}" dt="2019-08-26T13:12:49.685" v="445" actId="20577"/>
+        <pc:sldMkLst>
+          <pc:docMk/>
+          <pc:sldMk cId="998402309" sldId="275"/>
+        </pc:sldMkLst>
+        <pc:spChg chg="mod">
+          <ac:chgData name="" userId="" providerId="" clId="Web-{EB1AC5F5-222D-4709-B6DA-A14B54B2B7AF}" dt="2019-08-26T13:12:49.685" v="445" actId="20577"/>
+          <ac:spMkLst>
+            <pc:docMk/>
+            <pc:sldMk cId="998402309" sldId="275"/>
+            <ac:spMk id="3" creationId="{514C4D4A-546B-4399-AD4C-643FF21D65FE}"/>
+          </ac:spMkLst>
+        </pc:spChg>
+      </pc:sldChg>
+      <pc:sldChg chg="modSp">
+        <pc:chgData name="" userId="" providerId="" clId="Web-{EB1AC5F5-222D-4709-B6DA-A14B54B2B7AF}" dt="2019-08-26T13:13:36.280" v="454" actId="1076"/>
+        <pc:sldMkLst>
+          <pc:docMk/>
+          <pc:sldMk cId="1169010977" sldId="277"/>
+        </pc:sldMkLst>
+        <pc:spChg chg="mod">
+          <ac:chgData name="" userId="" providerId="" clId="Web-{EB1AC5F5-222D-4709-B6DA-A14B54B2B7AF}" dt="2019-08-26T13:11:38.073" v="441" actId="20577"/>
+          <ac:spMkLst>
+            <pc:docMk/>
+            <pc:sldMk cId="1169010977" sldId="277"/>
+            <ac:spMk id="3" creationId="{48A20DC2-7F9B-4A6A-820D-94145CE780D4}"/>
+          </ac:spMkLst>
+        </pc:spChg>
+        <pc:picChg chg="mod">
+          <ac:chgData name="" userId="" providerId="" clId="Web-{EB1AC5F5-222D-4709-B6DA-A14B54B2B7AF}" dt="2019-08-26T13:13:29.655" v="453" actId="1076"/>
+          <ac:picMkLst>
+            <pc:docMk/>
+            <pc:sldMk cId="1169010977" sldId="277"/>
+            <ac:picMk id="4" creationId="{12F06931-BE46-4079-9B8E-A0AFF6ADE7A4}"/>
+          </ac:picMkLst>
+        </pc:picChg>
+        <pc:picChg chg="mod">
+          <ac:chgData name="" userId="" providerId="" clId="Web-{EB1AC5F5-222D-4709-B6DA-A14B54B2B7AF}" dt="2019-08-26T13:13:36.280" v="454" actId="1076"/>
+          <ac:picMkLst>
+            <pc:docMk/>
+            <pc:sldMk cId="1169010977" sldId="277"/>
+            <ac:picMk id="5" creationId="{84758901-5B45-48B3-8DA3-BFB48B32E2EE}"/>
+          </ac:picMkLst>
+        </pc:picChg>
+      </pc:sldChg>
+      <pc:sldChg chg="modSp">
+        <pc:chgData name="" userId="" providerId="" clId="Web-{EB1AC5F5-222D-4709-B6DA-A14B54B2B7AF}" dt="2019-08-26T13:19:58.949" v="547" actId="20577"/>
+        <pc:sldMkLst>
+          <pc:docMk/>
+          <pc:sldMk cId="833840719" sldId="279"/>
+        </pc:sldMkLst>
+        <pc:spChg chg="mod">
+          <ac:chgData name="" userId="" providerId="" clId="Web-{EB1AC5F5-222D-4709-B6DA-A14B54B2B7AF}" dt="2019-08-26T13:19:58.949" v="547" actId="20577"/>
+          <ac:spMkLst>
+            <pc:docMk/>
+            <pc:sldMk cId="833840719" sldId="279"/>
+            <ac:spMk id="3" creationId="{1DF8CC30-F456-42F2-BA6C-AF7568AED795}"/>
+          </ac:spMkLst>
+        </pc:spChg>
+        <pc:picChg chg="mod">
+          <ac:chgData name="" userId="" providerId="" clId="Web-{EB1AC5F5-222D-4709-B6DA-A14B54B2B7AF}" dt="2019-08-26T13:13:21.795" v="452" actId="1076"/>
+          <ac:picMkLst>
+            <pc:docMk/>
+            <pc:sldMk cId="833840719" sldId="279"/>
+            <ac:picMk id="5" creationId="{00000000-0000-0000-0000-000000000000}"/>
+          </ac:picMkLst>
+        </pc:picChg>
+      </pc:sldChg>
+      <pc:sldChg chg="modSp">
+        <pc:chgData name="" userId="" providerId="" clId="Web-{EB1AC5F5-222D-4709-B6DA-A14B54B2B7AF}" dt="2019-08-26T13:19:10.119" v="531" actId="20577"/>
+        <pc:sldMkLst>
+          <pc:docMk/>
+          <pc:sldMk cId="1349797421" sldId="280"/>
+        </pc:sldMkLst>
+        <pc:spChg chg="mod">
+          <ac:chgData name="" userId="" providerId="" clId="Web-{EB1AC5F5-222D-4709-B6DA-A14B54B2B7AF}" dt="2019-08-26T13:19:10.119" v="531" actId="20577"/>
+          <ac:spMkLst>
+            <pc:docMk/>
+            <pc:sldMk cId="1349797421" sldId="280"/>
+            <ac:spMk id="3" creationId="{C149E1D9-0167-4CC4-A969-6A11A6A02303}"/>
+          </ac:spMkLst>
+        </pc:spChg>
+      </pc:sldChg>
+      <pc:sldChg chg="modSp">
+        <pc:chgData name="" userId="" providerId="" clId="Web-{EB1AC5F5-222D-4709-B6DA-A14B54B2B7AF}" dt="2019-08-26T13:23:55.534" v="590" actId="1076"/>
+        <pc:sldMkLst>
+          <pc:docMk/>
+          <pc:sldMk cId="378540045" sldId="281"/>
+        </pc:sldMkLst>
+        <pc:spChg chg="mod">
+          <ac:chgData name="" userId="" providerId="" clId="Web-{EB1AC5F5-222D-4709-B6DA-A14B54B2B7AF}" dt="2019-08-26T13:22:03.249" v="555" actId="20577"/>
+          <ac:spMkLst>
+            <pc:docMk/>
+            <pc:sldMk cId="378540045" sldId="281"/>
+            <ac:spMk id="3" creationId="{C0C7CCA2-21D3-414F-8991-FF7195AB442C}"/>
+          </ac:spMkLst>
+        </pc:spChg>
+        <pc:picChg chg="mod">
+          <ac:chgData name="" userId="" providerId="" clId="Web-{EB1AC5F5-222D-4709-B6DA-A14B54B2B7AF}" dt="2019-08-26T13:23:55.534" v="590" actId="1076"/>
+          <ac:picMkLst>
+            <pc:docMk/>
+            <pc:sldMk cId="378540045" sldId="281"/>
+            <ac:picMk id="5" creationId="{00000000-0000-0000-0000-000000000000}"/>
+          </ac:picMkLst>
+        </pc:picChg>
+      </pc:sldChg>
+      <pc:sldChg chg="modSp">
+        <pc:chgData name="" userId="" providerId="" clId="Web-{EB1AC5F5-222D-4709-B6DA-A14B54B2B7AF}" dt="2019-08-26T13:24:01.988" v="591" actId="1076"/>
+        <pc:sldMkLst>
+          <pc:docMk/>
+          <pc:sldMk cId="230576329" sldId="282"/>
+        </pc:sldMkLst>
+        <pc:picChg chg="mod">
+          <ac:chgData name="" userId="" providerId="" clId="Web-{EB1AC5F5-222D-4709-B6DA-A14B54B2B7AF}" dt="2019-08-26T13:24:01.988" v="591" actId="1076"/>
+          <ac:picMkLst>
+            <pc:docMk/>
+            <pc:sldMk cId="230576329" sldId="282"/>
+            <ac:picMk id="4" creationId="{00000000-0000-0000-0000-000000000000}"/>
+          </ac:picMkLst>
+        </pc:picChg>
+      </pc:sldChg>
+      <pc:sldChg chg="modSp">
+        <pc:chgData name="" userId="" providerId="" clId="Web-{EB1AC5F5-222D-4709-B6DA-A14B54B2B7AF}" dt="2019-08-26T13:23:50.300" v="589" actId="1076"/>
+        <pc:sldMkLst>
+          <pc:docMk/>
+          <pc:sldMk cId="1454178254" sldId="283"/>
+        </pc:sldMkLst>
+        <pc:spChg chg="mod">
+          <ac:chgData name="" userId="" providerId="" clId="Web-{EB1AC5F5-222D-4709-B6DA-A14B54B2B7AF}" dt="2019-08-26T13:23:38.315" v="586" actId="20577"/>
+          <ac:spMkLst>
+            <pc:docMk/>
+            <pc:sldMk cId="1454178254" sldId="283"/>
+            <ac:spMk id="3" creationId="{C82B7E5E-81F5-4F0B-82FD-802385CD9A10}"/>
+          </ac:spMkLst>
+        </pc:spChg>
+        <pc:picChg chg="mod">
+          <ac:chgData name="" userId="" providerId="" clId="Web-{EB1AC5F5-222D-4709-B6DA-A14B54B2B7AF}" dt="2019-08-26T13:23:50.300" v="589" actId="1076"/>
+          <ac:picMkLst>
+            <pc:docMk/>
+            <pc:sldMk cId="1454178254" sldId="283"/>
+            <ac:picMk id="4" creationId="{00000000-0000-0000-0000-000000000000}"/>
+          </ac:picMkLst>
+        </pc:picChg>
+      </pc:sldChg>
+      <pc:sldChg chg="modSp">
+        <pc:chgData name="" userId="" providerId="" clId="Web-{EB1AC5F5-222D-4709-B6DA-A14B54B2B7AF}" dt="2019-08-26T13:30:38.828" v="594" actId="20577"/>
+        <pc:sldMkLst>
+          <pc:docMk/>
+          <pc:sldMk cId="761633851" sldId="288"/>
+        </pc:sldMkLst>
+        <pc:spChg chg="mod">
+          <ac:chgData name="" userId="" providerId="" clId="Web-{EB1AC5F5-222D-4709-B6DA-A14B54B2B7AF}" dt="2019-08-26T13:30:38.828" v="594" actId="20577"/>
+          <ac:spMkLst>
+            <pc:docMk/>
+            <pc:sldMk cId="761633851" sldId="288"/>
+            <ac:spMk id="3" creationId="{F07687A8-64DB-4954-96A8-C40A80C3A991}"/>
+          </ac:spMkLst>
+        </pc:spChg>
+      </pc:sldChg>
+      <pc:sldChg chg="modSp">
+        <pc:chgData name="" userId="" providerId="" clId="Web-{EB1AC5F5-222D-4709-B6DA-A14B54B2B7AF}" dt="2019-08-26T13:33:24.443" v="611" actId="20577"/>
+        <pc:sldMkLst>
+          <pc:docMk/>
+          <pc:sldMk cId="1885167440" sldId="289"/>
+        </pc:sldMkLst>
+        <pc:spChg chg="mod">
+          <ac:chgData name="" userId="" providerId="" clId="Web-{EB1AC5F5-222D-4709-B6DA-A14B54B2B7AF}" dt="2019-08-26T13:33:24.443" v="611" actId="20577"/>
+          <ac:spMkLst>
+            <pc:docMk/>
+            <pc:sldMk cId="1885167440" sldId="289"/>
+            <ac:spMk id="3" creationId="{797A8D8B-6BAF-462D-815C-BF243EAB51D0}"/>
+          </ac:spMkLst>
+        </pc:spChg>
+      </pc:sldChg>
+      <pc:sldChg chg="modSp">
+        <pc:chgData name="" userId="" providerId="" clId="Web-{EB1AC5F5-222D-4709-B6DA-A14B54B2B7AF}" dt="2019-08-26T13:38:02.093" v="751" actId="20577"/>
+        <pc:sldMkLst>
+          <pc:docMk/>
+          <pc:sldMk cId="472758218" sldId="290"/>
+        </pc:sldMkLst>
+        <pc:spChg chg="mod">
+          <ac:chgData name="" userId="" providerId="" clId="Web-{EB1AC5F5-222D-4709-B6DA-A14B54B2B7AF}" dt="2019-08-26T13:33:08.286" v="602" actId="20577"/>
+          <ac:spMkLst>
+            <pc:docMk/>
+            <pc:sldMk cId="472758218" sldId="290"/>
+            <ac:spMk id="2" creationId="{CD55EF39-67AC-4AEB-A4F1-538265FC6DA6}"/>
+          </ac:spMkLst>
+        </pc:spChg>
+        <pc:spChg chg="mod">
+          <ac:chgData name="" userId="" providerId="" clId="Web-{EB1AC5F5-222D-4709-B6DA-A14B54B2B7AF}" dt="2019-08-26T13:38:02.093" v="751" actId="20577"/>
+          <ac:spMkLst>
+            <pc:docMk/>
+            <pc:sldMk cId="472758218" sldId="290"/>
+            <ac:spMk id="3" creationId="{797A8D8B-6BAF-462D-815C-BF243EAB51D0}"/>
+          </ac:spMkLst>
+        </pc:spChg>
+      </pc:sldChg>
+      <pc:sldChg chg="del">
+        <pc:chgData name="" userId="" providerId="" clId="Web-{EB1AC5F5-222D-4709-B6DA-A14B54B2B7AF}" dt="2019-08-26T13:41:26.724" v="814"/>
+        <pc:sldMkLst>
+          <pc:docMk/>
+          <pc:sldMk cId="1526033100" sldId="291"/>
+        </pc:sldMkLst>
+      </pc:sldChg>
+      <pc:sldChg chg="modSp">
+        <pc:chgData name="" userId="" providerId="" clId="Web-{EB1AC5F5-222D-4709-B6DA-A14B54B2B7AF}" dt="2019-08-26T13:40:51.754" v="803" actId="20577"/>
+        <pc:sldMkLst>
+          <pc:docMk/>
+          <pc:sldMk cId="3121416065" sldId="298"/>
+        </pc:sldMkLst>
+        <pc:spChg chg="mod">
+          <ac:chgData name="" userId="" providerId="" clId="Web-{EB1AC5F5-222D-4709-B6DA-A14B54B2B7AF}" dt="2019-08-26T13:40:51.754" v="803" actId="20577"/>
+          <ac:spMkLst>
+            <pc:docMk/>
+            <pc:sldMk cId="3121416065" sldId="298"/>
+            <ac:spMk id="3" creationId="{9F376D57-7E23-4CED-A222-AA9C8F994D2E}"/>
+          </ac:spMkLst>
+        </pc:spChg>
+      </pc:sldChg>
+      <pc:sldChg chg="ord">
+        <pc:chgData name="" userId="" providerId="" clId="Web-{EB1AC5F5-222D-4709-B6DA-A14B54B2B7AF}" dt="2019-08-26T13:42:07.569" v="826"/>
+        <pc:sldMkLst>
+          <pc:docMk/>
+          <pc:sldMk cId="105066576" sldId="299"/>
+        </pc:sldMkLst>
+      </pc:sldChg>
+      <pc:sldChg chg="ord">
+        <pc:chgData name="" userId="" providerId="" clId="Web-{EB1AC5F5-222D-4709-B6DA-A14B54B2B7AF}" dt="2019-08-26T13:42:22.960" v="827"/>
+        <pc:sldMkLst>
+          <pc:docMk/>
+          <pc:sldMk cId="3978066937" sldId="300"/>
+        </pc:sldMkLst>
+      </pc:sldChg>
+      <pc:sldChg chg="modSp">
+        <pc:chgData name="" userId="" providerId="" clId="Web-{EB1AC5F5-222D-4709-B6DA-A14B54B2B7AF}" dt="2019-08-26T13:30:47.079" v="600" actId="20577"/>
+        <pc:sldMkLst>
+          <pc:docMk/>
+          <pc:sldMk cId="2078075699" sldId="304"/>
+        </pc:sldMkLst>
+        <pc:spChg chg="mod">
+          <ac:chgData name="" userId="" providerId="" clId="Web-{EB1AC5F5-222D-4709-B6DA-A14B54B2B7AF}" dt="2019-08-26T13:30:47.079" v="600" actId="20577"/>
+          <ac:spMkLst>
+            <pc:docMk/>
+            <pc:sldMk cId="2078075699" sldId="304"/>
+            <ac:spMk id="3" creationId="{F07687A8-64DB-4954-96A8-C40A80C3A991}"/>
+          </ac:spMkLst>
+        </pc:spChg>
+      </pc:sldChg>
+      <pc:sldChg chg="modSp">
+        <pc:chgData name="" userId="" providerId="" clId="Web-{EB1AC5F5-222D-4709-B6DA-A14B54B2B7AF}" dt="2019-08-26T12:37:22.773" v="122" actId="20577"/>
+        <pc:sldMkLst>
+          <pc:docMk/>
+          <pc:sldMk cId="2724069113" sldId="313"/>
+        </pc:sldMkLst>
+        <pc:spChg chg="mod">
+          <ac:chgData name="" userId="" providerId="" clId="Web-{EB1AC5F5-222D-4709-B6DA-A14B54B2B7AF}" dt="2019-08-26T12:37:22.773" v="122" actId="20577"/>
+          <ac:spMkLst>
+            <pc:docMk/>
+            <pc:sldMk cId="2724069113" sldId="313"/>
+            <ac:spMk id="3" creationId="{C149E1D9-0167-4CC4-A969-6A11A6A02303}"/>
+          </ac:spMkLst>
+        </pc:spChg>
+      </pc:sldChg>
+      <pc:sldChg chg="ord">
+        <pc:chgData name="" userId="" providerId="" clId="Web-{EB1AC5F5-222D-4709-B6DA-A14B54B2B7AF}" dt="2019-08-26T13:42:07.569" v="825"/>
+        <pc:sldMkLst>
+          <pc:docMk/>
+          <pc:sldMk cId="3781557145" sldId="314"/>
+        </pc:sldMkLst>
+      </pc:sldChg>
+      <pc:sldChg chg="ord">
+        <pc:chgData name="" userId="" providerId="" clId="Web-{EB1AC5F5-222D-4709-B6DA-A14B54B2B7AF}" dt="2019-08-26T13:42:07.569" v="824"/>
+        <pc:sldMkLst>
+          <pc:docMk/>
+          <pc:sldMk cId="532084759" sldId="315"/>
+        </pc:sldMkLst>
+      </pc:sldChg>
+      <pc:sldChg chg="add replId">
+        <pc:chgData name="" userId="" providerId="" clId="Web-{EB1AC5F5-222D-4709-B6DA-A14B54B2B7AF}" dt="2019-08-26T13:41:05.130" v="805"/>
+        <pc:sldMkLst>
+          <pc:docMk/>
+          <pc:sldMk cId="1569096513" sldId="318"/>
+        </pc:sldMkLst>
+      </pc:sldChg>
+    </pc:docChg>
+  </pc:docChgLst>
+  <pc:docChgLst>
+    <pc:chgData clId="Web-{02BDA07C-30E5-4B06-BBCE-B676B8EC38FC}"/>
+    <pc:docChg chg="modSld">
+      <pc:chgData name="" userId="" providerId="" clId="Web-{02BDA07C-30E5-4B06-BBCE-B676B8EC38FC}" dt="2019-08-21T12:22:54.904" v="218" actId="20577"/>
+      <pc:docMkLst>
+        <pc:docMk/>
+      </pc:docMkLst>
+      <pc:sldChg chg="addSp delSp modSp">
+        <pc:chgData name="" userId="" providerId="" clId="Web-{02BDA07C-30E5-4B06-BBCE-B676B8EC38FC}" dt="2019-08-21T12:11:08.515" v="216" actId="20577"/>
+        <pc:sldMkLst>
+          <pc:docMk/>
+          <pc:sldMk cId="532084759" sldId="315"/>
+        </pc:sldMkLst>
+        <pc:spChg chg="mod">
+          <ac:chgData name="" userId="" providerId="" clId="Web-{02BDA07C-30E5-4B06-BBCE-B676B8EC38FC}" dt="2019-08-21T12:11:08.515" v="216" actId="20577"/>
+          <ac:spMkLst>
+            <pc:docMk/>
+            <pc:sldMk cId="532084759" sldId="315"/>
+            <ac:spMk id="3" creationId="{F66845FC-E103-48DE-9A9F-3292745AF233}"/>
+          </ac:spMkLst>
+        </pc:spChg>
+        <pc:picChg chg="add mod">
+          <ac:chgData name="" userId="" providerId="" clId="Web-{02BDA07C-30E5-4B06-BBCE-B676B8EC38FC}" dt="2019-08-21T11:53:28.776" v="137" actId="14100"/>
+          <ac:picMkLst>
+            <pc:docMk/>
+            <pc:sldMk cId="532084759" sldId="315"/>
+            <ac:picMk id="4" creationId="{2C6F1FF2-2B8F-49D1-BC02-3E1B9D76B5F8}"/>
+          </ac:picMkLst>
+        </pc:picChg>
+        <pc:picChg chg="add mod">
+          <ac:chgData name="" userId="" providerId="" clId="Web-{02BDA07C-30E5-4B06-BBCE-B676B8EC38FC}" dt="2019-08-21T12:05:36.931" v="195" actId="1076"/>
+          <ac:picMkLst>
+            <pc:docMk/>
+            <pc:sldMk cId="532084759" sldId="315"/>
+            <ac:picMk id="6" creationId="{C3569123-B87B-4EBB-8947-519FBBACC331}"/>
+          </ac:picMkLst>
+        </pc:picChg>
+        <pc:picChg chg="add del mod">
+          <ac:chgData name="" userId="" providerId="" clId="Web-{02BDA07C-30E5-4B06-BBCE-B676B8EC38FC}" dt="2019-08-21T12:07:12.542" v="200"/>
+          <ac:picMkLst>
+            <pc:docMk/>
+            <pc:sldMk cId="532084759" sldId="315"/>
+            <ac:picMk id="8" creationId="{1F66282A-0A33-473F-969E-8A62261160CF}"/>
+          </ac:picMkLst>
+        </pc:picChg>
+        <pc:picChg chg="add del mod">
+          <ac:chgData name="" userId="" providerId="" clId="Web-{02BDA07C-30E5-4B06-BBCE-B676B8EC38FC}" dt="2019-08-21T12:07:08.433" v="199"/>
+          <ac:picMkLst>
+            <pc:docMk/>
+            <pc:sldMk cId="532084759" sldId="315"/>
+            <ac:picMk id="10" creationId="{44AA657B-AA60-4AE6-B344-71FEA77309EC}"/>
+          </ac:picMkLst>
+        </pc:picChg>
+        <pc:picChg chg="add mod">
+          <ac:chgData name="" userId="" providerId="" clId="Web-{02BDA07C-30E5-4B06-BBCE-B676B8EC38FC}" dt="2019-08-21T12:07:15.480" v="201" actId="1076"/>
+          <ac:picMkLst>
+            <pc:docMk/>
+            <pc:sldMk cId="532084759" sldId="315"/>
+            <ac:picMk id="12" creationId="{ACB96CE1-0376-4794-8360-71B534BF42CC}"/>
+          </ac:picMkLst>
+        </pc:picChg>
+      </pc:sldChg>
+    </pc:docChg>
+  </pc:docChgLst>
+  <pc:docChgLst>
+    <pc:chgData clId="Web-{3ED89547-50A4-4C8E-8526-F4B6D350C843}"/>
+    <pc:docChg chg="modSld">
+      <pc:chgData name="" userId="" providerId="" clId="Web-{3ED89547-50A4-4C8E-8526-F4B6D350C843}" dt="2019-08-21T14:18:56.600" v="15" actId="20577"/>
+      <pc:docMkLst>
+        <pc:docMk/>
+      </pc:docMkLst>
+      <pc:sldChg chg="modSp">
+        <pc:chgData name="" userId="" providerId="" clId="Web-{3ED89547-50A4-4C8E-8526-F4B6D350C843}" dt="2019-08-21T14:18:56.600" v="14" actId="20577"/>
+        <pc:sldMkLst>
+          <pc:docMk/>
+          <pc:sldMk cId="96228185" sldId="262"/>
+        </pc:sldMkLst>
+        <pc:spChg chg="mod">
+          <ac:chgData name="" userId="" providerId="" clId="Web-{3ED89547-50A4-4C8E-8526-F4B6D350C843}" dt="2019-08-21T14:18:56.600" v="14" actId="20577"/>
+          <ac:spMkLst>
+            <pc:docMk/>
+            <pc:sldMk cId="96228185" sldId="262"/>
+            <ac:spMk id="3" creationId="{A006BD29-4002-41F9-ACEC-5CD14C05D00B}"/>
+          </ac:spMkLst>
+        </pc:spChg>
+      </pc:sldChg>
+    </pc:docChg>
+  </pc:docChgLst>
+  <pc:docChgLst>
+    <pc:chgData clId="Web-{CAB5EA10-C98D-43FC-B0A9-283D1C5EC0A1}"/>
+    <pc:docChg chg="modSld">
+      <pc:chgData name="" userId="" providerId="" clId="Web-{CAB5EA10-C98D-43FC-B0A9-283D1C5EC0A1}" dt="2019-08-22T07:25:07.742" v="2"/>
+      <pc:docMkLst>
+        <pc:docMk/>
+      </pc:docMkLst>
+      <pc:sldChg chg="modNotes">
+        <pc:chgData name="" userId="" providerId="" clId="Web-{CAB5EA10-C98D-43FC-B0A9-283D1C5EC0A1}" dt="2019-08-22T07:25:07.742" v="2"/>
+        <pc:sldMkLst>
+          <pc:docMk/>
+          <pc:sldMk cId="119092984" sldId="302"/>
+        </pc:sldMkLst>
+      </pc:sldChg>
+    </pc:docChg>
+  </pc:docChgLst>
+  <pc:docChgLst>
+    <pc:chgData clId="Web-{0F21CEA2-9FB9-4C5E-9BF9-57F55B3C2973}"/>
+    <pc:docChg chg="modSld">
+      <pc:chgData name="" userId="" providerId="" clId="Web-{0F21CEA2-9FB9-4C5E-9BF9-57F55B3C2973}" dt="2019-08-22T09:39:17.615" v="76" actId="20577"/>
+      <pc:docMkLst>
+        <pc:docMk/>
+      </pc:docMkLst>
+      <pc:sldChg chg="modSp">
+        <pc:chgData name="" userId="" providerId="" clId="Web-{0F21CEA2-9FB9-4C5E-9BF9-57F55B3C2973}" dt="2019-08-22T09:39:17.615" v="75" actId="20577"/>
+        <pc:sldMkLst>
+          <pc:docMk/>
+          <pc:sldMk cId="3874318658" sldId="259"/>
+        </pc:sldMkLst>
+        <pc:spChg chg="mod">
+          <ac:chgData name="" userId="" providerId="" clId="Web-{0F21CEA2-9FB9-4C5E-9BF9-57F55B3C2973}" dt="2019-08-22T09:39:17.615" v="75" actId="20577"/>
+          <ac:spMkLst>
+            <pc:docMk/>
+            <pc:sldMk cId="3874318658" sldId="259"/>
+            <ac:spMk id="3" creationId="{F058EF85-7A26-403D-8EC8-4D6B63992E90}"/>
+          </ac:spMkLst>
+        </pc:spChg>
+      </pc:sldChg>
+      <pc:sldChg chg="modSp">
+        <pc:chgData name="" userId="" providerId="" clId="Web-{0F21CEA2-9FB9-4C5E-9BF9-57F55B3C2973}" dt="2019-08-22T09:39:01.255" v="62" actId="20577"/>
+        <pc:sldMkLst>
+          <pc:docMk/>
+          <pc:sldMk cId="3604236605" sldId="267"/>
+        </pc:sldMkLst>
+        <pc:spChg chg="mod">
+          <ac:chgData name="" userId="" providerId="" clId="Web-{0F21CEA2-9FB9-4C5E-9BF9-57F55B3C2973}" dt="2019-08-22T09:39:01.255" v="62" actId="20577"/>
+          <ac:spMkLst>
+            <pc:docMk/>
+            <pc:sldMk cId="3604236605" sldId="267"/>
+            <ac:spMk id="2" creationId="{87181B6F-95E3-4317-A223-ECC06FCEE759}"/>
+          </ac:spMkLst>
+        </pc:spChg>
+        <pc:spChg chg="mod">
+          <ac:chgData name="" userId="" providerId="" clId="Web-{0F21CEA2-9FB9-4C5E-9BF9-57F55B3C2973}" dt="2019-08-22T09:35:15.173" v="22" actId="20577"/>
+          <ac:spMkLst>
+            <pc:docMk/>
+            <pc:sldMk cId="3604236605" sldId="267"/>
+            <ac:spMk id="3" creationId="{4FE75E9A-5E07-4169-9BC9-B185E9E6E95E}"/>
+          </ac:spMkLst>
+        </pc:spChg>
+      </pc:sldChg>
+      <pc:sldChg chg="modSp">
+        <pc:chgData name="" userId="" providerId="" clId="Web-{0F21CEA2-9FB9-4C5E-9BF9-57F55B3C2973}" dt="2019-08-22T09:37:41.332" v="58" actId="20577"/>
+        <pc:sldMkLst>
+          <pc:docMk/>
+          <pc:sldMk cId="3121416065" sldId="298"/>
+        </pc:sldMkLst>
+        <pc:spChg chg="mod">
+          <ac:chgData name="" userId="" providerId="" clId="Web-{0F21CEA2-9FB9-4C5E-9BF9-57F55B3C2973}" dt="2019-08-22T09:37:41.332" v="58" actId="20577"/>
+          <ac:spMkLst>
+            <pc:docMk/>
+            <pc:sldMk cId="3121416065" sldId="298"/>
+            <ac:spMk id="3" creationId="{9F376D57-7E23-4CED-A222-AA9C8F994D2E}"/>
+          </ac:spMkLst>
+        </pc:spChg>
+      </pc:sldChg>
+    </pc:docChg>
+  </pc:docChgLst>
+  <pc:docChgLst>
+    <pc:chgData clId="Web-{3AC23917-2B73-4D43-8DF5-C2CA22EE809D}"/>
+    <pc:docChg chg="modSld">
+      <pc:chgData name="" userId="" providerId="" clId="Web-{3AC23917-2B73-4D43-8DF5-C2CA22EE809D}" dt="2019-08-22T13:03:57.144" v="29" actId="20577"/>
+      <pc:docMkLst>
+        <pc:docMk/>
+      </pc:docMkLst>
+      <pc:sldChg chg="modSp">
+        <pc:chgData name="" userId="" providerId="" clId="Web-{3AC23917-2B73-4D43-8DF5-C2CA22EE809D}" dt="2019-08-22T13:03:57.144" v="28" actId="20577"/>
+        <pc:sldMkLst>
+          <pc:docMk/>
+          <pc:sldMk cId="966716395" sldId="271"/>
+        </pc:sldMkLst>
+        <pc:spChg chg="mod">
+          <ac:chgData name="" userId="" providerId="" clId="Web-{3AC23917-2B73-4D43-8DF5-C2CA22EE809D}" dt="2019-08-22T13:03:57.144" v="28" actId="20577"/>
+          <ac:spMkLst>
+            <pc:docMk/>
+            <pc:sldMk cId="966716395" sldId="271"/>
+            <ac:spMk id="3" creationId="{C149E1D9-0167-4CC4-A969-6A11A6A02303}"/>
+          </ac:spMkLst>
+        </pc:spChg>
+      </pc:sldChg>
+    </pc:docChg>
+  </pc:docChgLst>
+  <pc:docChgLst>
+    <pc:chgData clId="Web-{6CA45141-8142-4C89-ABF2-B7A7F0B41786}"/>
+    <pc:docChg chg="addSld modSld">
+      <pc:chgData name="" userId="" providerId="" clId="Web-{6CA45141-8142-4C89-ABF2-B7A7F0B41786}" dt="2019-08-16T07:00:59.829" v="362" actId="20577"/>
+      <pc:docMkLst>
+        <pc:docMk/>
+      </pc:docMkLst>
+      <pc:sldChg chg="modSp">
+        <pc:chgData name="" userId="" providerId="" clId="Web-{6CA45141-8142-4C89-ABF2-B7A7F0B41786}" dt="2019-08-16T07:00:59.829" v="361" actId="20577"/>
+        <pc:sldMkLst>
+          <pc:docMk/>
+          <pc:sldMk cId="2474134289" sldId="292"/>
+        </pc:sldMkLst>
+        <pc:spChg chg="mod">
+          <ac:chgData name="" userId="" providerId="" clId="Web-{6CA45141-8142-4C89-ABF2-B7A7F0B41786}" dt="2019-08-16T07:00:59.829" v="361" actId="20577"/>
+          <ac:spMkLst>
+            <pc:docMk/>
+            <pc:sldMk cId="2474134289" sldId="292"/>
+            <ac:spMk id="3" creationId="{48CD3CA2-4BA5-4026-972D-FC907156D6F4}"/>
+          </ac:spMkLst>
+        </pc:spChg>
+      </pc:sldChg>
+      <pc:sldChg chg="modSp">
+        <pc:chgData name="" userId="" providerId="" clId="Web-{6CA45141-8142-4C89-ABF2-B7A7F0B41786}" dt="2019-08-16T06:48:26.877" v="20" actId="20577"/>
+        <pc:sldMkLst>
+          <pc:docMk/>
+          <pc:sldMk cId="399787957" sldId="293"/>
+        </pc:sldMkLst>
+        <pc:spChg chg="mod">
+          <ac:chgData name="" userId="" providerId="" clId="Web-{6CA45141-8142-4C89-ABF2-B7A7F0B41786}" dt="2019-08-16T06:48:26.877" v="20" actId="20577"/>
+          <ac:spMkLst>
+            <pc:docMk/>
+            <pc:sldMk cId="399787957" sldId="293"/>
+            <ac:spMk id="3" creationId="{48CD3CA2-4BA5-4026-972D-FC907156D6F4}"/>
+          </ac:spMkLst>
+        </pc:spChg>
+      </pc:sldChg>
+      <pc:sldChg chg="modSp add replId">
+        <pc:chgData name="" userId="" providerId="" clId="Web-{6CA45141-8142-4C89-ABF2-B7A7F0B41786}" dt="2019-08-16T07:00:34.360" v="329" actId="20577"/>
+        <pc:sldMkLst>
+          <pc:docMk/>
+          <pc:sldMk cId="3749470640" sldId="309"/>
+        </pc:sldMkLst>
+        <pc:spChg chg="mod">
+          <ac:chgData name="" userId="" providerId="" clId="Web-{6CA45141-8142-4C89-ABF2-B7A7F0B41786}" dt="2019-08-16T07:00:34.360" v="329" actId="20577"/>
+          <ac:spMkLst>
+            <pc:docMk/>
+            <pc:sldMk cId="3749470640" sldId="309"/>
+            <ac:spMk id="3" creationId="{48CD3CA2-4BA5-4026-972D-FC907156D6F4}"/>
+          </ac:spMkLst>
+        </pc:spChg>
+      </pc:sldChg>
+    </pc:docChg>
+  </pc:docChgLst>
+  <pc:docChgLst>
+    <pc:chgData clId="Web-{DC28F5D4-777E-4F56-9B7B-C903C0CF1842}"/>
+    <pc:docChg chg="modSld">
+      <pc:chgData name="" userId="" providerId="" clId="Web-{DC28F5D4-777E-4F56-9B7B-C903C0CF1842}" dt="2019-08-19T07:22:02.972" v="64" actId="20577"/>
+      <pc:docMkLst>
+        <pc:docMk/>
+      </pc:docMkLst>
+      <pc:sldChg chg="modSp">
+        <pc:chgData name="" userId="" providerId="" clId="Web-{DC28F5D4-777E-4F56-9B7B-C903C0CF1842}" dt="2019-08-19T07:22:02.971" v="63" actId="20577"/>
+        <pc:sldMkLst>
+          <pc:docMk/>
+          <pc:sldMk cId="3874318658" sldId="259"/>
+        </pc:sldMkLst>
+        <pc:spChg chg="mod">
+          <ac:chgData name="" userId="" providerId="" clId="Web-{DC28F5D4-777E-4F56-9B7B-C903C0CF1842}" dt="2019-08-19T07:22:02.971" v="63" actId="20577"/>
+          <ac:spMkLst>
+            <pc:docMk/>
+            <pc:sldMk cId="3874318658" sldId="259"/>
+            <ac:spMk id="3" creationId="{F058EF85-7A26-403D-8EC8-4D6B63992E90}"/>
+          </ac:spMkLst>
+        </pc:spChg>
+      </pc:sldChg>
+      <pc:sldChg chg="modSp">
+        <pc:chgData name="" userId="" providerId="" clId="Web-{DC28F5D4-777E-4F56-9B7B-C903C0CF1842}" dt="2019-08-19T07:21:07.975" v="51" actId="20577"/>
+        <pc:sldMkLst>
+          <pc:docMk/>
+          <pc:sldMk cId="472758218" sldId="290"/>
+        </pc:sldMkLst>
+        <pc:spChg chg="mod">
+          <ac:chgData name="" userId="" providerId="" clId="Web-{DC28F5D4-777E-4F56-9B7B-C903C0CF1842}" dt="2019-08-19T07:21:07.975" v="51" actId="20577"/>
+          <ac:spMkLst>
+            <pc:docMk/>
+            <pc:sldMk cId="472758218" sldId="290"/>
+            <ac:spMk id="3" creationId="{797A8D8B-6BAF-462D-815C-BF243EAB51D0}"/>
+          </ac:spMkLst>
+        </pc:spChg>
+      </pc:sldChg>
+    </pc:docChg>
+  </pc:docChgLst>
+  <pc:docChgLst>
+    <pc:chgData clId="Web-{27517764-4E0F-456B-99BC-B77E11D93B28}"/>
+    <pc:docChg chg="delSld modSld">
+      <pc:chgData name="" userId="" providerId="" clId="Web-{27517764-4E0F-456B-99BC-B77E11D93B28}" dt="2019-08-26T12:12:49.054" v="587" actId="20577"/>
+      <pc:docMkLst>
+        <pc:docMk/>
+      </pc:docMkLst>
+      <pc:sldChg chg="modSp">
+        <pc:chgData name="" userId="" providerId="" clId="Web-{27517764-4E0F-456B-99BC-B77E11D93B28}" dt="2019-08-26T10:55:44.125" v="76" actId="20577"/>
+        <pc:sldMkLst>
+          <pc:docMk/>
+          <pc:sldMk cId="3874318658" sldId="259"/>
+        </pc:sldMkLst>
+        <pc:spChg chg="mod">
+          <ac:chgData name="" userId="" providerId="" clId="Web-{27517764-4E0F-456B-99BC-B77E11D93B28}" dt="2019-08-26T10:55:44.125" v="76" actId="20577"/>
+          <ac:spMkLst>
+            <pc:docMk/>
+            <pc:sldMk cId="3874318658" sldId="259"/>
+            <ac:spMk id="3" creationId="{F058EF85-7A26-403D-8EC8-4D6B63992E90}"/>
+          </ac:spMkLst>
+        </pc:spChg>
+      </pc:sldChg>
+      <pc:sldChg chg="modSp">
+        <pc:chgData name="" userId="" providerId="" clId="Web-{27517764-4E0F-456B-99BC-B77E11D93B28}" dt="2019-08-26T11:38:09.050" v="471" actId="20577"/>
+        <pc:sldMkLst>
+          <pc:docMk/>
+          <pc:sldMk cId="1378607874" sldId="261"/>
+        </pc:sldMkLst>
+        <pc:spChg chg="mod">
+          <ac:chgData name="" userId="" providerId="" clId="Web-{27517764-4E0F-456B-99BC-B77E11D93B28}" dt="2019-08-26T11:38:09.050" v="471" actId="20577"/>
+          <ac:spMkLst>
+            <pc:docMk/>
+            <pc:sldMk cId="1378607874" sldId="261"/>
+            <ac:spMk id="3" creationId="{A006BD29-4002-41F9-ACEC-5CD14C05D00B}"/>
+          </ac:spMkLst>
+        </pc:spChg>
+      </pc:sldChg>
+      <pc:sldChg chg="modSp modNotes">
+        <pc:chgData name="" userId="" providerId="" clId="Web-{27517764-4E0F-456B-99BC-B77E11D93B28}" dt="2019-08-26T11:46:38.285" v="537" actId="20577"/>
+        <pc:sldMkLst>
+          <pc:docMk/>
+          <pc:sldMk cId="96228185" sldId="262"/>
+        </pc:sldMkLst>
+        <pc:spChg chg="mod">
+          <ac:chgData name="" userId="" providerId="" clId="Web-{27517764-4E0F-456B-99BC-B77E11D93B28}" dt="2019-08-26T11:46:38.285" v="537" actId="20577"/>
+          <ac:spMkLst>
+            <pc:docMk/>
+            <pc:sldMk cId="96228185" sldId="262"/>
+            <ac:spMk id="3" creationId="{A006BD29-4002-41F9-ACEC-5CD14C05D00B}"/>
+          </ac:spMkLst>
+        </pc:spChg>
+      </pc:sldChg>
+      <pc:sldChg chg="del">
+        <pc:chgData name="" userId="" providerId="" clId="Web-{27517764-4E0F-456B-99BC-B77E11D93B28}" dt="2019-08-26T11:48:23.491" v="541"/>
+        <pc:sldMkLst>
+          <pc:docMk/>
+          <pc:sldMk cId="27007685" sldId="263"/>
+        </pc:sldMkLst>
+      </pc:sldChg>
+      <pc:sldChg chg="del">
+        <pc:chgData name="" userId="" providerId="" clId="Web-{27517764-4E0F-456B-99BC-B77E11D93B28}" dt="2019-08-26T11:48:31.054" v="542"/>
+        <pc:sldMkLst>
+          <pc:docMk/>
+          <pc:sldMk cId="1835465480" sldId="264"/>
+        </pc:sldMkLst>
+      </pc:sldChg>
+      <pc:sldChg chg="modSp">
+        <pc:chgData name="" userId="" providerId="" clId="Web-{27517764-4E0F-456B-99BC-B77E11D93B28}" dt="2019-08-26T11:50:21.573" v="547" actId="20577"/>
+        <pc:sldMkLst>
+          <pc:docMk/>
+          <pc:sldMk cId="3234635994" sldId="266"/>
+        </pc:sldMkLst>
+        <pc:spChg chg="mod">
+          <ac:chgData name="" userId="" providerId="" clId="Web-{27517764-4E0F-456B-99BC-B77E11D93B28}" dt="2019-08-26T11:50:21.573" v="547" actId="20577"/>
+          <ac:spMkLst>
+            <pc:docMk/>
+            <pc:sldMk cId="3234635994" sldId="266"/>
+            <ac:spMk id="3" creationId="{62B993F5-9F21-4EFE-A5D9-D7F71AC75C49}"/>
+          </ac:spMkLst>
+        </pc:spChg>
+      </pc:sldChg>
+      <pc:sldChg chg="modSp">
+        <pc:chgData name="" userId="" providerId="" clId="Web-{27517764-4E0F-456B-99BC-B77E11D93B28}" dt="2019-08-26T12:12:49.054" v="586" actId="20577"/>
+        <pc:sldMkLst>
+          <pc:docMk/>
+          <pc:sldMk cId="3604236605" sldId="267"/>
+        </pc:sldMkLst>
+        <pc:spChg chg="mod">
+          <ac:chgData name="" userId="" providerId="" clId="Web-{27517764-4E0F-456B-99BC-B77E11D93B28}" dt="2019-08-26T12:12:49.054" v="586" actId="20577"/>
+          <ac:spMkLst>
+            <pc:docMk/>
+            <pc:sldMk cId="3604236605" sldId="267"/>
+            <ac:spMk id="3" creationId="{4FE75E9A-5E07-4169-9BC9-B185E9E6E95E}"/>
+          </ac:spMkLst>
+        </pc:spChg>
+      </pc:sldChg>
+      <pc:sldChg chg="modSp">
+        <pc:chgData name="" userId="" providerId="" clId="Web-{27517764-4E0F-456B-99BC-B77E11D93B28}" dt="2019-08-26T11:42:06.823" v="504" actId="20577"/>
+        <pc:sldMkLst>
+          <pc:docMk/>
+          <pc:sldMk cId="3108778045" sldId="317"/>
+        </pc:sldMkLst>
+        <pc:spChg chg="mod">
+          <ac:chgData name="" userId="" providerId="" clId="Web-{27517764-4E0F-456B-99BC-B77E11D93B28}" dt="2019-08-26T11:41:52.385" v="477" actId="20577"/>
+          <ac:spMkLst>
+            <pc:docMk/>
+            <pc:sldMk cId="3108778045" sldId="317"/>
+            <ac:spMk id="2" creationId="{D400E92E-E8F0-4A4C-B44D-033F1C5755C4}"/>
+          </ac:spMkLst>
+        </pc:spChg>
+        <pc:spChg chg="mod">
+          <ac:chgData name="" userId="" providerId="" clId="Web-{27517764-4E0F-456B-99BC-B77E11D93B28}" dt="2019-08-26T11:42:06.823" v="504" actId="20577"/>
+          <ac:spMkLst>
+            <pc:docMk/>
+            <pc:sldMk cId="3108778045" sldId="317"/>
+            <ac:spMk id="3" creationId="{A006BD29-4002-41F9-ACEC-5CD14C05D00B}"/>
+          </ac:spMkLst>
+        </pc:spChg>
+      </pc:sldChg>
+      <pc:sldChg chg="del">
+        <pc:chgData name="" userId="" providerId="" clId="Web-{27517764-4E0F-456B-99BC-B77E11D93B28}" dt="2019-08-26T11:48:16.194" v="540"/>
+        <pc:sldMkLst>
+          <pc:docMk/>
+          <pc:sldMk cId="190952704" sldId="318"/>
+        </pc:sldMkLst>
+      </pc:sldChg>
+    </pc:docChg>
+  </pc:docChgLst>
+  <pc:docChgLst>
+    <pc:chgData clId="Web-{A569DFDF-03C5-4444-86DD-0C77AE245AAE}"/>
+    <pc:docChg chg="modSld">
+      <pc:chgData name="" userId="" providerId="" clId="Web-{A569DFDF-03C5-4444-86DD-0C77AE245AAE}" dt="2019-07-05T07:04:46.608" v="98" actId="20577"/>
+      <pc:docMkLst>
+        <pc:docMk/>
+      </pc:docMkLst>
+      <pc:sldChg chg="modSp">
+        <pc:chgData name="" userId="" providerId="" clId="Web-{A569DFDF-03C5-4444-86DD-0C77AE245AAE}" dt="2019-07-05T07:04:46.608" v="97" actId="20577"/>
+        <pc:sldMkLst>
+          <pc:docMk/>
+          <pc:sldMk cId="3479937383" sldId="260"/>
+        </pc:sldMkLst>
+        <pc:spChg chg="mod">
+          <ac:chgData name="" userId="" providerId="" clId="Web-{A569DFDF-03C5-4444-86DD-0C77AE245AAE}" dt="2019-07-05T07:04:46.608" v="97" actId="20577"/>
+          <ac:spMkLst>
+            <pc:docMk/>
+            <pc:sldMk cId="3479937383" sldId="260"/>
+            <ac:spMk id="3" creationId="{A006BD29-4002-41F9-ACEC-5CD14C05D00B}"/>
+          </ac:spMkLst>
+        </pc:spChg>
+      </pc:sldChg>
+      <pc:sldChg chg="modSp">
+        <pc:chgData name="" userId="" providerId="" clId="Web-{A569DFDF-03C5-4444-86DD-0C77AE245AAE}" dt="2019-07-05T07:02:40.450" v="51" actId="20577"/>
+        <pc:sldMkLst>
+          <pc:docMk/>
+          <pc:sldMk cId="1378607874" sldId="261"/>
+        </pc:sldMkLst>
+        <pc:spChg chg="mod">
+          <ac:chgData name="" userId="" providerId="" clId="Web-{A569DFDF-03C5-4444-86DD-0C77AE245AAE}" dt="2019-07-05T07:02:40.450" v="51" actId="20577"/>
+          <ac:spMkLst>
+            <pc:docMk/>
+            <pc:sldMk cId="1378607874" sldId="261"/>
+            <ac:spMk id="3" creationId="{A006BD29-4002-41F9-ACEC-5CD14C05D00B}"/>
+          </ac:spMkLst>
+        </pc:spChg>
+      </pc:sldChg>
+    </pc:docChg>
+  </pc:docChgLst>
+  <pc:docChgLst>
+    <pc:chgData clId="Web-{88B57755-15E1-4E48-B2F9-954B51594687}"/>
+    <pc:docChg chg="addSld modSld">
+      <pc:chgData name="" userId="" providerId="" clId="Web-{88B57755-15E1-4E48-B2F9-954B51594687}" dt="2019-08-20T05:58:16.685" v="2" actId="1076"/>
+      <pc:docMkLst>
+        <pc:docMk/>
+      </pc:docMkLst>
+      <pc:sldChg chg="addSp modSp new">
+        <pc:chgData name="" userId="" providerId="" clId="Web-{88B57755-15E1-4E48-B2F9-954B51594687}" dt="2019-08-20T05:58:16.685" v="2" actId="1076"/>
+        <pc:sldMkLst>
+          <pc:docMk/>
+          <pc:sldMk cId="4039594616" sldId="315"/>
+        </pc:sldMkLst>
+        <pc:spChg chg="add mod">
+          <ac:chgData name="" userId="" providerId="" clId="Web-{88B57755-15E1-4E48-B2F9-954B51594687}" dt="2019-08-20T05:58:16.685" v="2" actId="1076"/>
+          <ac:spMkLst>
+            <pc:docMk/>
+            <pc:sldMk cId="4039594616" sldId="315"/>
+            <ac:spMk id="5" creationId="{A67833DD-C346-4047-89AD-FD561592183C}"/>
           </ac:spMkLst>
         </pc:spChg>
       </pc:sldChg>
@@ -2139,7 +2139,7 @@
           <a:p>
             <a:fld id="{BF41AE80-542F-45BD-8762-11343D5B4444}" type="datetimeFigureOut">
               <a:rPr lang="cs-CZ" smtClean="0"/>
-              <a:t>29.08.2019</a:t>
+              <a:t>22.09.2019</a:t>
             </a:fld>
             <a:endParaRPr lang="cs-CZ"/>
           </a:p>
@@ -2304,7 +2304,7 @@
           <a:p>
             <a:fld id="{17FAD013-4C05-4B85-AC4F-3150E3C875D3}" type="datetimeFigureOut">
               <a:rPr lang="cs-CZ" smtClean="0"/>
-              <a:t>29.08.2019</a:t>
+              <a:t>22.09.2019</a:t>
             </a:fld>
             <a:endParaRPr lang="cs-CZ"/>
           </a:p>
@@ -3701,7 +3701,7 @@
           <a:p>
             <a:fld id="{31641703-497B-490E-8884-3001B241E179}" type="datetimeFigureOut">
               <a:rPr lang="cs-CZ" smtClean="0"/>
-              <a:t>29.08.2019</a:t>
+              <a:t>22.09.2019</a:t>
             </a:fld>
             <a:endParaRPr lang="cs-CZ"/>
           </a:p>
@@ -6184,240 +6184,69 @@
           <a:p>
             <a:r>
               <a:rPr lang="cs-CZ" dirty="0"/>
-              <a:t>Na stroji odkud budete váš </a:t>
+              <a:t>Na serveru, ze kterého se bude plnit DFS </a:t>
+            </a:r>
+            <a:r>
+              <a:rPr lang="cs-CZ" dirty="0" err="1"/>
+              <a:t>repo</a:t>
+            </a:r>
+            <a:r>
+              <a:rPr lang="cs-CZ" dirty="0"/>
+              <a:t> (MGM)</a:t>
+            </a:r>
+          </a:p>
+          <a:p>
+            <a:r>
+              <a:rPr lang="cs-CZ" dirty="0"/>
+              <a:t>S</a:t>
+            </a:r>
+            <a:r>
+              <a:rPr lang="cs-CZ"/>
+              <a:t>pusťte </a:t>
+            </a:r>
+            <a:r>
+              <a:rPr lang="cs-CZ" dirty="0" err="1"/>
+              <a:t>scheduled</a:t>
+            </a:r>
+            <a:r>
+              <a:rPr lang="cs-CZ" dirty="0"/>
+              <a:t> </a:t>
+            </a:r>
+            <a:r>
+              <a:rPr lang="cs-CZ" dirty="0" err="1"/>
+              <a:t>task</a:t>
+            </a:r>
+            <a:r>
+              <a:rPr lang="cs-CZ" dirty="0"/>
+              <a:t> „</a:t>
+            </a:r>
+            <a:r>
+              <a:rPr lang="en-US" dirty="0" err="1"/>
+              <a:t>Repo_Sync</a:t>
+            </a:r>
+            <a:r>
+              <a:rPr lang="cs-CZ" dirty="0"/>
+              <a:t>“ čímž by se měl naplnit DFS </a:t>
             </a:r>
             <a:r>
               <a:rPr lang="cs-CZ" dirty="0" err="1"/>
               <a:t>repozitář</a:t>
             </a:r>
-            <a:r>
-              <a:rPr lang="cs-CZ" dirty="0"/>
-              <a:t> plnit</a:t>
-            </a:r>
-            <a:endParaRPr lang="en-US" dirty="0"/>
+            <a:endParaRPr lang="cs-CZ" dirty="0"/>
           </a:p>
           <a:p>
             <a:pPr lvl="1"/>
             <a:r>
-              <a:rPr lang="cs-CZ" u="sng" dirty="0"/>
-              <a:t>Obsah</a:t>
-            </a:r>
-            <a:r>
-              <a:rPr lang="cs-CZ" dirty="0"/>
-              <a:t> skriptu Export-ScriptsToModule.ps1 z</a:t>
-            </a:r>
-            <a:r>
-              <a:rPr lang="en-US" dirty="0"/>
-              <a:t> </a:t>
-            </a:r>
-            <a:r>
-              <a:rPr lang="en-US" dirty="0" err="1"/>
-              <a:t>naklonovan</a:t>
+              <a:rPr lang="cs-CZ" dirty="0"/>
+              <a:t>Pokud ne, tak zkontrolujte automaticky generovaný transkript log v "$</a:t>
             </a:r>
             <a:r>
               <a:rPr lang="cs-CZ" dirty="0" err="1"/>
-              <a:t>ého</a:t>
-            </a:r>
-            <a:r>
-              <a:rPr lang="cs-CZ" dirty="0"/>
-              <a:t> </a:t>
-            </a:r>
-            <a:r>
-              <a:rPr lang="cs-CZ" dirty="0" err="1"/>
-              <a:t>repo</a:t>
-            </a:r>
-            <a:r>
-              <a:rPr lang="cs-CZ" dirty="0"/>
-              <a:t>\scripts2module\</a:t>
-            </a:r>
-            <a:r>
-              <a:rPr lang="cs-CZ" dirty="0" err="1"/>
-              <a:t>Scripts</a:t>
-            </a:r>
-            <a:r>
-              <a:rPr lang="cs-CZ" dirty="0"/>
-              <a:t> zkopírujte a vložte do PS konzole (tím si zpřístupníte funkci </a:t>
-            </a:r>
-            <a:r>
-              <a:rPr lang="en-US" dirty="0"/>
-              <a:t>Export-</a:t>
-            </a:r>
-            <a:r>
-              <a:rPr lang="en-US" dirty="0" err="1"/>
-              <a:t>ScriptsToModule</a:t>
-            </a:r>
-            <a:r>
-              <a:rPr lang="cs-CZ" dirty="0"/>
-              <a:t>)</a:t>
-            </a:r>
-          </a:p>
-          <a:p>
-            <a:pPr marL="642620" lvl="1"/>
-            <a:r>
-              <a:rPr lang="cs-CZ" dirty="0"/>
-              <a:t>V PS konzoli pak vygenerujte </a:t>
-            </a:r>
-            <a:r>
-              <a:rPr lang="cs-CZ" dirty="0" err="1"/>
-              <a:t>Scripts</a:t>
-            </a:r>
-            <a:r>
-              <a:rPr lang="cs-CZ" dirty="0"/>
-              <a:t> modul příkazem </a:t>
-            </a:r>
-            <a:r>
-              <a:rPr lang="en-US" dirty="0"/>
-              <a:t>Export-</a:t>
-            </a:r>
-            <a:r>
-              <a:rPr lang="en-US" dirty="0" err="1"/>
-              <a:t>ScriptsToModule</a:t>
-            </a:r>
-            <a:r>
-              <a:rPr lang="en-US" dirty="0"/>
-              <a:t> @{"</a:t>
-            </a:r>
-            <a:r>
-              <a:rPr lang="cs-CZ" dirty="0"/>
-              <a:t>CESTAKscripts2module\</a:t>
-            </a:r>
-            <a:r>
-              <a:rPr lang="cs-CZ" dirty="0" err="1"/>
-              <a:t>Scripts</a:t>
-            </a:r>
-            <a:r>
-              <a:rPr lang="en-US" dirty="0"/>
-              <a:t>" = "</a:t>
-            </a:r>
-            <a:r>
-              <a:rPr lang="cs-CZ" dirty="0"/>
-              <a:t>C</a:t>
-            </a:r>
-            <a:r>
-              <a:rPr lang="en-US" dirty="0"/>
-              <a:t>:\</a:t>
-            </a:r>
-            <a:r>
-              <a:rPr lang="cs-CZ" dirty="0"/>
-              <a:t>Temp</a:t>
-            </a:r>
-            <a:r>
-              <a:rPr lang="en-US" dirty="0"/>
-              <a:t>\Scripts"}</a:t>
-            </a:r>
-            <a:r>
-              <a:rPr lang="cs-CZ" dirty="0"/>
-              <a:t> -</a:t>
-            </a:r>
-            <a:r>
-              <a:rPr lang="cs-CZ" dirty="0" err="1"/>
-              <a:t>includeUncommitedUntracked</a:t>
-            </a:r>
-            <a:r>
-              <a:rPr lang="cs-CZ" dirty="0"/>
-              <a:t> -</a:t>
-            </a:r>
-            <a:r>
-              <a:rPr lang="cs-CZ" dirty="0" err="1"/>
-              <a:t>verbose</a:t>
-            </a:r>
-            <a:endParaRPr lang="cs-CZ" dirty="0" err="1">
-              <a:cs typeface="Segoe UI"/>
-            </a:endParaRPr>
-          </a:p>
-          <a:p>
-            <a:pPr lvl="2"/>
-            <a:r>
-              <a:rPr lang="cs-CZ" dirty="0"/>
-              <a:t>Vygenerovaný modul obsahuje funkci Update-</a:t>
-            </a:r>
-            <a:r>
-              <a:rPr lang="cs-CZ" dirty="0" err="1"/>
-              <a:t>Repo</a:t>
-            </a:r>
-            <a:r>
-              <a:rPr lang="cs-CZ" dirty="0"/>
-              <a:t> nutnou pro repo_sync.ps1</a:t>
-            </a:r>
-            <a:endParaRPr lang="cs-CZ" dirty="0">
-              <a:cs typeface="Segoe UI"/>
-            </a:endParaRPr>
-          </a:p>
-          <a:p>
-            <a:pPr marL="642620" lvl="1"/>
-            <a:r>
-              <a:rPr lang="cs-CZ" dirty="0"/>
-              <a:t>Vygenerovaný </a:t>
-            </a:r>
-            <a:r>
-              <a:rPr lang="cs-CZ" err="1"/>
-              <a:t>Scripts</a:t>
-            </a:r>
-            <a:r>
-              <a:rPr lang="cs-CZ" dirty="0"/>
-              <a:t> modul nakopírujte na MGM server do </a:t>
-            </a:r>
-            <a:r>
-              <a:rPr lang="en-US" dirty="0"/>
-              <a:t>C:\Windows\System32\WindowsPowerShell\v1.0\Modules</a:t>
-            </a:r>
-            <a:endParaRPr lang="cs-CZ" dirty="0">
-              <a:cs typeface="Segoe UI"/>
-            </a:endParaRPr>
-          </a:p>
-          <a:p>
-            <a:endParaRPr lang="cs-CZ" dirty="0">
-              <a:cs typeface="Segoe UI"/>
-            </a:endParaRPr>
-          </a:p>
-          <a:p>
-            <a:r>
-              <a:rPr lang="cs-CZ" dirty="0"/>
-              <a:t>Na MGM serveru spusťte </a:t>
-            </a:r>
-            <a:r>
-              <a:rPr lang="cs-CZ" dirty="0" err="1"/>
-              <a:t>scheduled</a:t>
-            </a:r>
-            <a:r>
-              <a:rPr lang="cs-CZ" dirty="0"/>
-              <a:t> </a:t>
-            </a:r>
-            <a:r>
-              <a:rPr lang="cs-CZ" dirty="0" err="1"/>
-              <a:t>task</a:t>
-            </a:r>
-            <a:r>
-              <a:rPr lang="cs-CZ" dirty="0"/>
-              <a:t> „</a:t>
-            </a:r>
-            <a:r>
-              <a:rPr lang="en-US" dirty="0" err="1"/>
-              <a:t>Repo_Sync</a:t>
-            </a:r>
-            <a:r>
-              <a:rPr lang="cs-CZ" dirty="0"/>
-              <a:t>“ čímž by se měl naplnit DFS </a:t>
-            </a:r>
-            <a:r>
-              <a:rPr lang="cs-CZ" dirty="0" err="1"/>
-              <a:t>repozitář</a:t>
-            </a:r>
-            <a:endParaRPr lang="cs-CZ" dirty="0"/>
-          </a:p>
-          <a:p>
-            <a:pPr lvl="1"/>
-            <a:r>
-              <a:rPr lang="cs-CZ" dirty="0"/>
-              <a:t>Pokud ne, tak např. použijte v C:\Windows\Scripts\Repo_sync\repo_sync.ps1 příkaz Start-</a:t>
-            </a:r>
-            <a:r>
-              <a:rPr lang="cs-CZ" dirty="0" err="1"/>
-              <a:t>Transcript</a:t>
-            </a:r>
-            <a:r>
-              <a:rPr lang="cs-CZ" dirty="0"/>
-              <a:t> pro zjištění kde je problém</a:t>
+              <a:t>env:SystemRoot</a:t>
+            </a:r>
+            <a:r>
+              <a:rPr lang="cs-CZ" dirty="0"/>
+              <a:t>\temp\repo_sync.log"</a:t>
             </a:r>
           </a:p>
         </p:txBody>
@@ -7098,28 +6927,6 @@
               <a:t>Prostředí s Windows 10, Server 2012 R2 a výš (respektive testováno na Powershell 5.1)</a:t>
             </a:r>
           </a:p>
-          <a:p>
-            <a:pPr lvl="2"/>
-            <a:r>
-              <a:rPr lang="cs-CZ" dirty="0"/>
-              <a:t>Ale 100</a:t>
-            </a:r>
-            <a:r>
-              <a:rPr lang="en-US" dirty="0"/>
-              <a:t>% p</a:t>
-            </a:r>
-            <a:r>
-              <a:rPr lang="cs-CZ" dirty="0" err="1"/>
-              <a:t>ůjde</a:t>
-            </a:r>
-            <a:r>
-              <a:rPr lang="cs-CZ" dirty="0"/>
-              <a:t> provozovat i na starších OS (po drobných úpravách)</a:t>
-            </a:r>
-            <a:endParaRPr lang="cs-CZ" dirty="0">
-              <a:cs typeface="Segoe UI"/>
-            </a:endParaRPr>
-          </a:p>
         </p:txBody>
       </p:sp>
     </p:spTree>
@@ -7204,8 +7011,12 @@
           <a:lstStyle/>
           <a:p>
             <a:r>
+              <a:rPr lang="cs-CZ" dirty="0"/>
+              <a:t>Použité p</a:t>
+            </a:r>
+            <a:r>
               <a:rPr lang="en-US" dirty="0" err="1"/>
-              <a:t>Pojmy</a:t>
+              <a:t>ojmy</a:t>
             </a:r>
             <a:endParaRPr lang="cs-CZ" dirty="0" err="1">
               <a:cs typeface="Segoe UI"/>

</xml_diff>